<commit_message>
Minor updates before switching to another computer to edit more
</commit_message>
<xml_diff>
--- a/CBG-2014-05-21.pptx
+++ b/CBG-2014-05-21.pptx
@@ -7,6 +7,9 @@
   <p:notesMasterIdLst>
     <p:notesMasterId r:id="rId44"/>
   </p:notesMasterIdLst>
+  <p:handoutMasterIdLst>
+    <p:handoutMasterId r:id="rId45"/>
+  </p:handoutMasterIdLst>
   <p:sldIdLst>
     <p:sldId id="256" r:id="rId2"/>
     <p:sldId id="259" r:id="rId3"/>
@@ -151,6 +154,171 @@
 </p:presentation>
 </file>
 
+<file path=ppt/handoutMasters/handoutMaster1.xml><?xml version="1.0" encoding="utf-8"?>
+<p:handoutMaster xmlns:a="http://schemas.openxmlformats.org/drawingml/2006/main" xmlns:r="http://schemas.openxmlformats.org/officeDocument/2006/relationships" xmlns:p="http://schemas.openxmlformats.org/presentationml/2006/main">
+  <p:cSld>
+    <p:bg>
+      <p:bgRef idx="1001">
+        <a:schemeClr val="bg1"/>
+      </p:bgRef>
+    </p:bg>
+    <p:spTree>
+      <p:nvGrpSpPr>
+        <p:cNvPr id="1" name=""/>
+        <p:cNvGrpSpPr/>
+        <p:nvPr/>
+      </p:nvGrpSpPr>
+      <p:grpSpPr>
+        <a:xfrm>
+          <a:off x="0" y="0"/>
+          <a:ext cx="0" cy="0"/>
+          <a:chOff x="0" y="0"/>
+          <a:chExt cx="0" cy="0"/>
+        </a:xfrm>
+      </p:grpSpPr>
+      <p:sp>
+        <p:nvSpPr>
+          <p:cNvPr id="2" name="Header Placeholder 1"/>
+          <p:cNvSpPr>
+            <a:spLocks noGrp="1"/>
+          </p:cNvSpPr>
+          <p:nvPr>
+            <p:ph type="hdr" sz="quarter"/>
+          </p:nvPr>
+        </p:nvSpPr>
+        <p:spPr>
+          <a:xfrm>
+            <a:off x="0" y="0"/>
+            <a:ext cx="2971800" cy="457200"/>
+          </a:xfrm>
+          <a:prstGeom prst="rect">
+            <a:avLst/>
+          </a:prstGeom>
+        </p:spPr>
+        <p:txBody>
+          <a:bodyPr vert="horz" lIns="91440" tIns="45720" rIns="91440" bIns="45720" rtlCol="0"/>
+          <a:lstStyle>
+            <a:lvl1pPr algn="l">
+              <a:defRPr sz="1200"/>
+            </a:lvl1pPr>
+          </a:lstStyle>
+          <a:p>
+            <a:endParaRPr lang="en-US"/>
+          </a:p>
+        </p:txBody>
+      </p:sp>
+      <p:sp>
+        <p:nvSpPr>
+          <p:cNvPr id="3" name="Date Placeholder 2"/>
+          <p:cNvSpPr>
+            <a:spLocks noGrp="1"/>
+          </p:cNvSpPr>
+          <p:nvPr>
+            <p:ph type="dt" sz="quarter" idx="1"/>
+          </p:nvPr>
+        </p:nvSpPr>
+        <p:spPr>
+          <a:xfrm>
+            <a:off x="3884613" y="0"/>
+            <a:ext cx="2971800" cy="457200"/>
+          </a:xfrm>
+          <a:prstGeom prst="rect">
+            <a:avLst/>
+          </a:prstGeom>
+        </p:spPr>
+        <p:txBody>
+          <a:bodyPr vert="horz" lIns="91440" tIns="45720" rIns="91440" bIns="45720" rtlCol="0"/>
+          <a:lstStyle>
+            <a:lvl1pPr algn="r">
+              <a:defRPr sz="1200"/>
+            </a:lvl1pPr>
+          </a:lstStyle>
+          <a:p>
+            <a:fld id="{BC5D3D7E-4BCA-2742-B668-B45A14F5579D}" type="datetimeFigureOut">
+              <a:rPr lang="en-US" smtClean="0"/>
+              <a:t>5/20/14</a:t>
+            </a:fld>
+            <a:endParaRPr lang="en-US"/>
+          </a:p>
+        </p:txBody>
+      </p:sp>
+      <p:sp>
+        <p:nvSpPr>
+          <p:cNvPr id="4" name="Footer Placeholder 3"/>
+          <p:cNvSpPr>
+            <a:spLocks noGrp="1"/>
+          </p:cNvSpPr>
+          <p:nvPr>
+            <p:ph type="ftr" sz="quarter" idx="2"/>
+          </p:nvPr>
+        </p:nvSpPr>
+        <p:spPr>
+          <a:xfrm>
+            <a:off x="0" y="8685213"/>
+            <a:ext cx="2971800" cy="457200"/>
+          </a:xfrm>
+          <a:prstGeom prst="rect">
+            <a:avLst/>
+          </a:prstGeom>
+        </p:spPr>
+        <p:txBody>
+          <a:bodyPr vert="horz" lIns="91440" tIns="45720" rIns="91440" bIns="45720" rtlCol="0" anchor="b"/>
+          <a:lstStyle>
+            <a:lvl1pPr algn="l">
+              <a:defRPr sz="1200"/>
+            </a:lvl1pPr>
+          </a:lstStyle>
+          <a:p>
+            <a:endParaRPr lang="en-US"/>
+          </a:p>
+        </p:txBody>
+      </p:sp>
+      <p:sp>
+        <p:nvSpPr>
+          <p:cNvPr id="5" name="Slide Number Placeholder 4"/>
+          <p:cNvSpPr>
+            <a:spLocks noGrp="1"/>
+          </p:cNvSpPr>
+          <p:nvPr>
+            <p:ph type="sldNum" sz="quarter" idx="3"/>
+          </p:nvPr>
+        </p:nvSpPr>
+        <p:spPr>
+          <a:xfrm>
+            <a:off x="3884613" y="8685213"/>
+            <a:ext cx="2971800" cy="457200"/>
+          </a:xfrm>
+          <a:prstGeom prst="rect">
+            <a:avLst/>
+          </a:prstGeom>
+        </p:spPr>
+        <p:txBody>
+          <a:bodyPr vert="horz" lIns="91440" tIns="45720" rIns="91440" bIns="45720" rtlCol="0" anchor="b"/>
+          <a:lstStyle>
+            <a:lvl1pPr algn="r">
+              <a:defRPr sz="1200"/>
+            </a:lvl1pPr>
+          </a:lstStyle>
+          <a:p>
+            <a:fld id="{05EB1123-9DCD-8045-8A31-AC0940796E6C}" type="slidenum">
+              <a:rPr lang="en-US" smtClean="0"/>
+              <a:t>‹#›</a:t>
+            </a:fld>
+            <a:endParaRPr lang="en-US"/>
+          </a:p>
+        </p:txBody>
+      </p:sp>
+    </p:spTree>
+    <p:extLst>
+      <p:ext uri="{BB962C8B-B14F-4D97-AF65-F5344CB8AC3E}">
+        <p14:creationId xmlns:p14="http://schemas.microsoft.com/office/powerpoint/2010/main" val="226903401"/>
+      </p:ext>
+    </p:extLst>
+  </p:cSld>
+  <p:clrMap bg1="lt1" tx1="dk1" bg2="lt2" tx2="dk2" accent1="accent1" accent2="accent2" accent3="accent3" accent4="accent4" accent5="accent5" accent6="accent6" hlink="hlink" folHlink="folHlink"/>
+</p:handoutMaster>
+</file>
+
 <file path=ppt/notesMasters/notesMaster1.xml><?xml version="1.0" encoding="utf-8"?>
 <p:notesMaster xmlns:a="http://schemas.openxmlformats.org/drawingml/2006/main" xmlns:r="http://schemas.openxmlformats.org/officeDocument/2006/relationships" xmlns:p="http://schemas.openxmlformats.org/presentationml/2006/main">
   <p:cSld>
@@ -233,7 +401,7 @@
           <a:p>
             <a:fld id="{98EBBA48-4CEA-FF4B-8E04-86A5D1C09742}" type="datetimeFigureOut">
               <a:rPr lang="en-US" smtClean="0"/>
-              <a:t>5/19/14</a:t>
+              <a:t>5/20/14</a:t>
             </a:fld>
             <a:endParaRPr lang="en-US"/>
           </a:p>
@@ -545,6 +713,18 @@
           <a:bodyPr/>
           <a:lstStyle/>
           <a:p>
+            <a:r>
+              <a:rPr lang="en-US" dirty="0" smtClean="0"/>
+              <a:t>I’m going to talk about how to save time</a:t>
+            </a:r>
+            <a:r>
+              <a:rPr lang="en-US" baseline="0" dirty="0" smtClean="0"/>
+              <a:t> when working on computational problems.  The first part will be about a method for building reusable workflows that are self-updating, easy to run</a:t>
+            </a:r>
+            <a:r>
+              <a:rPr lang="en-US" baseline="0" smtClean="0"/>
+              <a:t>, and </a:t>
+            </a:r>
             <a:endParaRPr lang="en-US" dirty="0"/>
           </a:p>
         </p:txBody>
@@ -5206,7 +5386,7 @@
           <a:p>
             <a:fld id="{A925BE74-8160-3B49-8D0F-E557085791B4}" type="datetimeFigureOut">
               <a:rPr lang="en-US" smtClean="0"/>
-              <a:t>5/19/14</a:t>
+              <a:t>5/20/14</a:t>
             </a:fld>
             <a:endParaRPr lang="en-US"/>
           </a:p>
@@ -5376,7 +5556,7 @@
           <a:p>
             <a:fld id="{A925BE74-8160-3B49-8D0F-E557085791B4}" type="datetimeFigureOut">
               <a:rPr lang="en-US" smtClean="0"/>
-              <a:t>5/19/14</a:t>
+              <a:t>5/20/14</a:t>
             </a:fld>
             <a:endParaRPr lang="en-US"/>
           </a:p>
@@ -5556,7 +5736,7 @@
           <a:p>
             <a:fld id="{A925BE74-8160-3B49-8D0F-E557085791B4}" type="datetimeFigureOut">
               <a:rPr lang="en-US" smtClean="0"/>
-              <a:t>5/19/14</a:t>
+              <a:t>5/20/14</a:t>
             </a:fld>
             <a:endParaRPr lang="en-US"/>
           </a:p>
@@ -5726,7 +5906,7 @@
           <a:p>
             <a:fld id="{A925BE74-8160-3B49-8D0F-E557085791B4}" type="datetimeFigureOut">
               <a:rPr lang="en-US" smtClean="0"/>
-              <a:t>5/19/14</a:t>
+              <a:t>5/20/14</a:t>
             </a:fld>
             <a:endParaRPr lang="en-US"/>
           </a:p>
@@ -5972,7 +6152,7 @@
           <a:p>
             <a:fld id="{A925BE74-8160-3B49-8D0F-E557085791B4}" type="datetimeFigureOut">
               <a:rPr lang="en-US" smtClean="0"/>
-              <a:t>5/19/14</a:t>
+              <a:t>5/20/14</a:t>
             </a:fld>
             <a:endParaRPr lang="en-US"/>
           </a:p>
@@ -6260,7 +6440,7 @@
           <a:p>
             <a:fld id="{A925BE74-8160-3B49-8D0F-E557085791B4}" type="datetimeFigureOut">
               <a:rPr lang="en-US" smtClean="0"/>
-              <a:t>5/19/14</a:t>
+              <a:t>5/20/14</a:t>
             </a:fld>
             <a:endParaRPr lang="en-US"/>
           </a:p>
@@ -6682,7 +6862,7 @@
           <a:p>
             <a:fld id="{A925BE74-8160-3B49-8D0F-E557085791B4}" type="datetimeFigureOut">
               <a:rPr lang="en-US" smtClean="0"/>
-              <a:t>5/19/14</a:t>
+              <a:t>5/20/14</a:t>
             </a:fld>
             <a:endParaRPr lang="en-US"/>
           </a:p>
@@ -6800,7 +6980,7 @@
           <a:p>
             <a:fld id="{A925BE74-8160-3B49-8D0F-E557085791B4}" type="datetimeFigureOut">
               <a:rPr lang="en-US" smtClean="0"/>
-              <a:t>5/19/14</a:t>
+              <a:t>5/20/14</a:t>
             </a:fld>
             <a:endParaRPr lang="en-US"/>
           </a:p>
@@ -6895,7 +7075,7 @@
           <a:p>
             <a:fld id="{A925BE74-8160-3B49-8D0F-E557085791B4}" type="datetimeFigureOut">
               <a:rPr lang="en-US" smtClean="0"/>
-              <a:t>5/19/14</a:t>
+              <a:t>5/20/14</a:t>
             </a:fld>
             <a:endParaRPr lang="en-US"/>
           </a:p>
@@ -7172,7 +7352,7 @@
           <a:p>
             <a:fld id="{A925BE74-8160-3B49-8D0F-E557085791B4}" type="datetimeFigureOut">
               <a:rPr lang="en-US" smtClean="0"/>
-              <a:t>5/19/14</a:t>
+              <a:t>5/20/14</a:t>
             </a:fld>
             <a:endParaRPr lang="en-US"/>
           </a:p>
@@ -7425,7 +7605,7 @@
           <a:p>
             <a:fld id="{A925BE74-8160-3B49-8D0F-E557085791B4}" type="datetimeFigureOut">
               <a:rPr lang="en-US" smtClean="0"/>
-              <a:t>5/19/14</a:t>
+              <a:t>5/20/14</a:t>
             </a:fld>
             <a:endParaRPr lang="en-US"/>
           </a:p>
@@ -7638,7 +7818,7 @@
           <a:p>
             <a:fld id="{A925BE74-8160-3B49-8D0F-E557085791B4}" type="datetimeFigureOut">
               <a:rPr lang="en-US" smtClean="0"/>
-              <a:t>5/19/14</a:t>
+              <a:t>5/20/14</a:t>
             </a:fld>
             <a:endParaRPr lang="en-US"/>
           </a:p>
@@ -8037,7 +8217,11 @@
             </a:br>
             <a:r>
               <a:rPr lang="en-US" dirty="0" smtClean="0"/>
-              <a:t>and easy parallel processing</a:t>
+              <a:t>and easy parallel </a:t>
+            </a:r>
+            <a:r>
+              <a:rPr lang="en-US" dirty="0" smtClean="0"/>
+              <a:t>processing</a:t>
             </a:r>
             <a:endParaRPr lang="en-US" dirty="0"/>
           </a:p>
@@ -8084,6 +8268,13 @@
   <p:clrMapOvr>
     <a:masterClrMapping/>
   </p:clrMapOvr>
+  <p:timing>
+    <p:tnLst>
+      <p:par>
+        <p:cTn xmlns:p14="http://schemas.microsoft.com/office/powerpoint/2010/main" id="1" dur="indefinite" restart="never" nodeType="tmRoot"/>
+      </p:par>
+    </p:tnLst>
+  </p:timing>
 </p:sld>
 </file>
 
@@ -12928,6 +13119,13 @@
   <p:clrMapOvr>
     <a:masterClrMapping/>
   </p:clrMapOvr>
+  <p:timing>
+    <p:tnLst>
+      <p:par>
+        <p:cTn xmlns:p14="http://schemas.microsoft.com/office/powerpoint/2010/main" id="1" dur="indefinite" restart="never" nodeType="tmRoot"/>
+      </p:par>
+    </p:tnLst>
+  </p:timing>
 </p:sld>
 </file>
 
@@ -14018,23 +14216,7 @@
           <a:p>
             <a:r>
               <a:rPr lang="en-US" dirty="0" smtClean="0"/>
-              <a:t>Easiest </a:t>
-            </a:r>
-            <a:r>
-              <a:rPr lang="en-US" dirty="0" smtClean="0"/>
-              <a:t>is </a:t>
-            </a:r>
-            <a:r>
-              <a:rPr lang="en-US" dirty="0" smtClean="0"/>
-              <a:t>s</a:t>
-            </a:r>
-            <a:r>
-              <a:rPr lang="en-US" dirty="0" smtClean="0"/>
-              <a:t>eparate </a:t>
-            </a:r>
-            <a:r>
-              <a:rPr lang="en-US" dirty="0" smtClean="0"/>
-              <a:t>input files</a:t>
+              <a:t>Easiest is separate input files</a:t>
             </a:r>
           </a:p>
           <a:p>
@@ -15580,6 +15762,13 @@
   <p:clrMapOvr>
     <a:masterClrMapping/>
   </p:clrMapOvr>
+  <p:timing>
+    <p:tnLst>
+      <p:par>
+        <p:cTn xmlns:p14="http://schemas.microsoft.com/office/powerpoint/2010/main" id="1" dur="indefinite" restart="never" nodeType="tmRoot"/>
+      </p:par>
+    </p:tnLst>
+  </p:timing>
 </p:sld>
 </file>
 
@@ -15717,14 +15906,7 @@
                 <a:latin typeface="Consolas"/>
                 <a:cs typeface="Consolas"/>
               </a:rPr>
-              <a:t> </a:t>
-            </a:r>
-            <a:r>
-              <a:rPr lang="en-US" dirty="0" smtClean="0">
-                <a:latin typeface="Consolas"/>
-                <a:cs typeface="Consolas"/>
-              </a:rPr>
-              <a:t>| </a:t>
+              <a:t> | </a:t>
             </a:r>
             <a:r>
               <a:rPr lang="en-US" dirty="0" err="1" smtClean="0">
@@ -16305,14 +16487,7 @@
                 <a:latin typeface="Consolas"/>
                 <a:cs typeface="Consolas"/>
               </a:rPr>
-              <a:t> </a:t>
-            </a:r>
-            <a:r>
-              <a:rPr lang="en-US" sz="2800" dirty="0" smtClean="0">
-                <a:latin typeface="Consolas"/>
-                <a:cs typeface="Consolas"/>
-              </a:rPr>
-              <a:t>::: *.</a:t>
+              <a:t> ::: *.</a:t>
             </a:r>
             <a:r>
               <a:rPr lang="en-US" sz="2800" dirty="0" err="1" smtClean="0">
@@ -16546,14 +16721,7 @@
                 <a:latin typeface="Consolas"/>
                 <a:cs typeface="Consolas"/>
               </a:rPr>
-              <a:t> </a:t>
-            </a:r>
-            <a:r>
-              <a:rPr lang="en-US" sz="2800" dirty="0" smtClean="0">
-                <a:latin typeface="Consolas"/>
-                <a:cs typeface="Consolas"/>
-              </a:rPr>
-              <a:t>::: *.</a:t>
+              <a:t> ::: *.</a:t>
             </a:r>
             <a:r>
               <a:rPr lang="en-US" sz="2800" dirty="0" err="1" smtClean="0">
@@ -21315,4 +21483,324 @@
   </a:objectDefaults>
   <a:extraClrSchemeLst/>
 </a:theme>
+</file>
+
+<file path=ppt/theme/theme3.xml><?xml version="1.0" encoding="utf-8"?>
+<a:theme xmlns:a="http://schemas.openxmlformats.org/drawingml/2006/main" name="Office Theme">
+  <a:themeElements>
+    <a:clrScheme name="Office">
+      <a:dk1>
+        <a:sysClr val="windowText" lastClr="000000"/>
+      </a:dk1>
+      <a:lt1>
+        <a:sysClr val="window" lastClr="FFFFFF"/>
+      </a:lt1>
+      <a:dk2>
+        <a:srgbClr val="1F497D"/>
+      </a:dk2>
+      <a:lt2>
+        <a:srgbClr val="EEECE1"/>
+      </a:lt2>
+      <a:accent1>
+        <a:srgbClr val="4F81BD"/>
+      </a:accent1>
+      <a:accent2>
+        <a:srgbClr val="C0504D"/>
+      </a:accent2>
+      <a:accent3>
+        <a:srgbClr val="9BBB59"/>
+      </a:accent3>
+      <a:accent4>
+        <a:srgbClr val="8064A2"/>
+      </a:accent4>
+      <a:accent5>
+        <a:srgbClr val="4BACC6"/>
+      </a:accent5>
+      <a:accent6>
+        <a:srgbClr val="F79646"/>
+      </a:accent6>
+      <a:hlink>
+        <a:srgbClr val="0000FF"/>
+      </a:hlink>
+      <a:folHlink>
+        <a:srgbClr val="800080"/>
+      </a:folHlink>
+    </a:clrScheme>
+    <a:fontScheme name="Office">
+      <a:majorFont>
+        <a:latin typeface="Calibri"/>
+        <a:ea typeface=""/>
+        <a:cs typeface=""/>
+        <a:font script="Jpan" typeface="ＭＳ Ｐゴシック"/>
+        <a:font script="Hang" typeface="맑은 고딕"/>
+        <a:font script="Hans" typeface="宋体"/>
+        <a:font script="Hant" typeface="新細明體"/>
+        <a:font script="Arab" typeface="Times New Roman"/>
+        <a:font script="Hebr" typeface="Times New Roman"/>
+        <a:font script="Thai" typeface="Angsana New"/>
+        <a:font script="Ethi" typeface="Nyala"/>
+        <a:font script="Beng" typeface="Vrinda"/>
+        <a:font script="Gujr" typeface="Shruti"/>
+        <a:font script="Khmr" typeface="MoolBoran"/>
+        <a:font script="Knda" typeface="Tunga"/>
+        <a:font script="Guru" typeface="Raavi"/>
+        <a:font script="Cans" typeface="Euphemia"/>
+        <a:font script="Cher" typeface="Plantagenet Cherokee"/>
+        <a:font script="Yiii" typeface="Microsoft Yi Baiti"/>
+        <a:font script="Tibt" typeface="Microsoft Himalaya"/>
+        <a:font script="Thaa" typeface="MV Boli"/>
+        <a:font script="Deva" typeface="Mangal"/>
+        <a:font script="Telu" typeface="Gautami"/>
+        <a:font script="Taml" typeface="Latha"/>
+        <a:font script="Syrc" typeface="Estrangelo Edessa"/>
+        <a:font script="Orya" typeface="Kalinga"/>
+        <a:font script="Mlym" typeface="Kartika"/>
+        <a:font script="Laoo" typeface="DokChampa"/>
+        <a:font script="Sinh" typeface="Iskoola Pota"/>
+        <a:font script="Mong" typeface="Mongolian Baiti"/>
+        <a:font script="Viet" typeface="Times New Roman"/>
+        <a:font script="Uigh" typeface="Microsoft Uighur"/>
+        <a:font script="Geor" typeface="Sylfaen"/>
+      </a:majorFont>
+      <a:minorFont>
+        <a:latin typeface="Calibri"/>
+        <a:ea typeface=""/>
+        <a:cs typeface=""/>
+        <a:font script="Jpan" typeface="ＭＳ Ｐゴシック"/>
+        <a:font script="Hang" typeface="맑은 고딕"/>
+        <a:font script="Hans" typeface="宋体"/>
+        <a:font script="Hant" typeface="新細明體"/>
+        <a:font script="Arab" typeface="Arial"/>
+        <a:font script="Hebr" typeface="Arial"/>
+        <a:font script="Thai" typeface="Cordia New"/>
+        <a:font script="Ethi" typeface="Nyala"/>
+        <a:font script="Beng" typeface="Vrinda"/>
+        <a:font script="Gujr" typeface="Shruti"/>
+        <a:font script="Khmr" typeface="DaunPenh"/>
+        <a:font script="Knda" typeface="Tunga"/>
+        <a:font script="Guru" typeface="Raavi"/>
+        <a:font script="Cans" typeface="Euphemia"/>
+        <a:font script="Cher" typeface="Plantagenet Cherokee"/>
+        <a:font script="Yiii" typeface="Microsoft Yi Baiti"/>
+        <a:font script="Tibt" typeface="Microsoft Himalaya"/>
+        <a:font script="Thaa" typeface="MV Boli"/>
+        <a:font script="Deva" typeface="Mangal"/>
+        <a:font script="Telu" typeface="Gautami"/>
+        <a:font script="Taml" typeface="Latha"/>
+        <a:font script="Syrc" typeface="Estrangelo Edessa"/>
+        <a:font script="Orya" typeface="Kalinga"/>
+        <a:font script="Mlym" typeface="Kartika"/>
+        <a:font script="Laoo" typeface="DokChampa"/>
+        <a:font script="Sinh" typeface="Iskoola Pota"/>
+        <a:font script="Mong" typeface="Mongolian Baiti"/>
+        <a:font script="Viet" typeface="Arial"/>
+        <a:font script="Uigh" typeface="Microsoft Uighur"/>
+        <a:font script="Geor" typeface="Sylfaen"/>
+      </a:minorFont>
+    </a:fontScheme>
+    <a:fmtScheme name="Office">
+      <a:fillStyleLst>
+        <a:solidFill>
+          <a:schemeClr val="phClr"/>
+        </a:solidFill>
+        <a:gradFill rotWithShape="1">
+          <a:gsLst>
+            <a:gs pos="0">
+              <a:schemeClr val="phClr">
+                <a:tint val="50000"/>
+                <a:satMod val="300000"/>
+              </a:schemeClr>
+            </a:gs>
+            <a:gs pos="35000">
+              <a:schemeClr val="phClr">
+                <a:tint val="37000"/>
+                <a:satMod val="300000"/>
+              </a:schemeClr>
+            </a:gs>
+            <a:gs pos="100000">
+              <a:schemeClr val="phClr">
+                <a:tint val="15000"/>
+                <a:satMod val="350000"/>
+              </a:schemeClr>
+            </a:gs>
+          </a:gsLst>
+          <a:lin ang="16200000" scaled="1"/>
+        </a:gradFill>
+        <a:gradFill rotWithShape="1">
+          <a:gsLst>
+            <a:gs pos="0">
+              <a:schemeClr val="phClr">
+                <a:tint val="100000"/>
+                <a:shade val="100000"/>
+                <a:satMod val="130000"/>
+              </a:schemeClr>
+            </a:gs>
+            <a:gs pos="100000">
+              <a:schemeClr val="phClr">
+                <a:tint val="50000"/>
+                <a:shade val="100000"/>
+                <a:satMod val="350000"/>
+              </a:schemeClr>
+            </a:gs>
+          </a:gsLst>
+          <a:lin ang="16200000" scaled="0"/>
+        </a:gradFill>
+      </a:fillStyleLst>
+      <a:lnStyleLst>
+        <a:ln w="9525" cap="flat" cmpd="sng" algn="ctr">
+          <a:solidFill>
+            <a:schemeClr val="phClr">
+              <a:shade val="95000"/>
+              <a:satMod val="105000"/>
+            </a:schemeClr>
+          </a:solidFill>
+          <a:prstDash val="solid"/>
+        </a:ln>
+        <a:ln w="25400" cap="flat" cmpd="sng" algn="ctr">
+          <a:solidFill>
+            <a:schemeClr val="phClr"/>
+          </a:solidFill>
+          <a:prstDash val="solid"/>
+        </a:ln>
+        <a:ln w="38100" cap="flat" cmpd="sng" algn="ctr">
+          <a:solidFill>
+            <a:schemeClr val="phClr"/>
+          </a:solidFill>
+          <a:prstDash val="solid"/>
+        </a:ln>
+      </a:lnStyleLst>
+      <a:effectStyleLst>
+        <a:effectStyle>
+          <a:effectLst>
+            <a:outerShdw blurRad="40000" dist="20000" dir="5400000" rotWithShape="0">
+              <a:srgbClr val="000000">
+                <a:alpha val="38000"/>
+              </a:srgbClr>
+            </a:outerShdw>
+          </a:effectLst>
+        </a:effectStyle>
+        <a:effectStyle>
+          <a:effectLst>
+            <a:outerShdw blurRad="40000" dist="23000" dir="5400000" rotWithShape="0">
+              <a:srgbClr val="000000">
+                <a:alpha val="35000"/>
+              </a:srgbClr>
+            </a:outerShdw>
+          </a:effectLst>
+        </a:effectStyle>
+        <a:effectStyle>
+          <a:effectLst>
+            <a:outerShdw blurRad="40000" dist="23000" dir="5400000" rotWithShape="0">
+              <a:srgbClr val="000000">
+                <a:alpha val="35000"/>
+              </a:srgbClr>
+            </a:outerShdw>
+          </a:effectLst>
+          <a:scene3d>
+            <a:camera prst="orthographicFront">
+              <a:rot lat="0" lon="0" rev="0"/>
+            </a:camera>
+            <a:lightRig rig="threePt" dir="t">
+              <a:rot lat="0" lon="0" rev="1200000"/>
+            </a:lightRig>
+          </a:scene3d>
+          <a:sp3d>
+            <a:bevelT w="63500" h="25400"/>
+          </a:sp3d>
+        </a:effectStyle>
+      </a:effectStyleLst>
+      <a:bgFillStyleLst>
+        <a:solidFill>
+          <a:schemeClr val="phClr"/>
+        </a:solidFill>
+        <a:gradFill rotWithShape="1">
+          <a:gsLst>
+            <a:gs pos="0">
+              <a:schemeClr val="phClr">
+                <a:tint val="40000"/>
+                <a:satMod val="350000"/>
+              </a:schemeClr>
+            </a:gs>
+            <a:gs pos="40000">
+              <a:schemeClr val="phClr">
+                <a:tint val="45000"/>
+                <a:shade val="99000"/>
+                <a:satMod val="350000"/>
+              </a:schemeClr>
+            </a:gs>
+            <a:gs pos="100000">
+              <a:schemeClr val="phClr">
+                <a:shade val="20000"/>
+                <a:satMod val="255000"/>
+              </a:schemeClr>
+            </a:gs>
+          </a:gsLst>
+          <a:path path="circle">
+            <a:fillToRect l="50000" t="-80000" r="50000" b="180000"/>
+          </a:path>
+        </a:gradFill>
+        <a:gradFill rotWithShape="1">
+          <a:gsLst>
+            <a:gs pos="0">
+              <a:schemeClr val="phClr">
+                <a:tint val="80000"/>
+                <a:satMod val="300000"/>
+              </a:schemeClr>
+            </a:gs>
+            <a:gs pos="100000">
+              <a:schemeClr val="phClr">
+                <a:shade val="30000"/>
+                <a:satMod val="200000"/>
+              </a:schemeClr>
+            </a:gs>
+          </a:gsLst>
+          <a:path path="circle">
+            <a:fillToRect l="50000" t="50000" r="50000" b="50000"/>
+          </a:path>
+        </a:gradFill>
+      </a:bgFillStyleLst>
+    </a:fmtScheme>
+  </a:themeElements>
+  <a:objectDefaults>
+    <a:spDef>
+      <a:spPr/>
+      <a:bodyPr/>
+      <a:lstStyle/>
+      <a:style>
+        <a:lnRef idx="1">
+          <a:schemeClr val="accent1"/>
+        </a:lnRef>
+        <a:fillRef idx="3">
+          <a:schemeClr val="accent1"/>
+        </a:fillRef>
+        <a:effectRef idx="2">
+          <a:schemeClr val="accent1"/>
+        </a:effectRef>
+        <a:fontRef idx="minor">
+          <a:schemeClr val="lt1"/>
+        </a:fontRef>
+      </a:style>
+    </a:spDef>
+    <a:lnDef>
+      <a:spPr/>
+      <a:bodyPr/>
+      <a:lstStyle/>
+      <a:style>
+        <a:lnRef idx="2">
+          <a:schemeClr val="accent1"/>
+        </a:lnRef>
+        <a:fillRef idx="0">
+          <a:schemeClr val="accent1"/>
+        </a:fillRef>
+        <a:effectRef idx="1">
+          <a:schemeClr val="accent1"/>
+        </a:effectRef>
+        <a:fontRef idx="minor">
+          <a:schemeClr val="tx1"/>
+        </a:fontRef>
+      </a:style>
+    </a:lnDef>
+  </a:objectDefaults>
+  <a:extraClrSchemeLst/>
+</a:theme>
 </file>
</xml_diff>

<commit_message>
Correct minor typos noted during the presentation today
</commit_message>
<xml_diff>
--- a/CBG-2014-05-21.pptx
+++ b/CBG-2014-05-21.pptx
@@ -1,6 +1,6 @@
 
 <file path=ppt/presentation.xml><?xml version="1.0" encoding="utf-8"?>
-<p:presentation xmlns:a="http://schemas.openxmlformats.org/drawingml/2006/main" xmlns:r="http://schemas.openxmlformats.org/officeDocument/2006/relationships" xmlns:mc="http://schemas.openxmlformats.org/markup-compatibility/2006" xmlns:mv="urn:schemas-microsoft-com:mac:vml" xmlns:p="http://schemas.openxmlformats.org/presentationml/2006/main" mc:Ignorable="mv" mc:PreserveAttributes="mv:*" saveSubsetFonts="1" autoCompressPictures="0">
+<p:presentation xmlns:a="http://schemas.openxmlformats.org/drawingml/2006/main" xmlns:r="http://schemas.openxmlformats.org/officeDocument/2006/relationships" xmlns:p="http://schemas.openxmlformats.org/presentationml/2006/main" saveSubsetFonts="1" autoCompressPictures="0">
   <p:sldMasterIdLst>
     <p:sldMasterId id="2147483648" r:id="rId1"/>
   </p:sldMasterIdLst>
@@ -158,7 +158,7 @@
 </file>
 
 <file path=ppt/handoutMasters/handoutMaster1.xml><?xml version="1.0" encoding="utf-8"?>
-<p:handoutMaster xmlns:a="http://schemas.openxmlformats.org/drawingml/2006/main" xmlns:r="http://schemas.openxmlformats.org/officeDocument/2006/relationships" xmlns:mc="http://schemas.openxmlformats.org/markup-compatibility/2006" xmlns:mv="urn:schemas-microsoft-com:mac:vml" xmlns:p="http://schemas.openxmlformats.org/presentationml/2006/main" mc:Ignorable="mv" mc:PreserveAttributes="mv:*">
+<p:handoutMaster xmlns:a="http://schemas.openxmlformats.org/drawingml/2006/main" xmlns:r="http://schemas.openxmlformats.org/officeDocument/2006/relationships" xmlns:p="http://schemas.openxmlformats.org/presentationml/2006/main">
   <p:cSld>
     <p:bg>
       <p:bgRef idx="1001">
@@ -240,7 +240,7 @@
             <a:fld id="{BC5D3D7E-4BCA-2742-B668-B45A14F5579D}" type="datetimeFigureOut">
               <a:rPr lang="en-US" smtClean="0"/>
               <a:pPr/>
-              <a:t>5/20/14</a:t>
+              <a:t>5/21/14</a:t>
             </a:fld>
             <a:endParaRPr lang="en-US"/>
           </a:p>
@@ -316,7 +316,7 @@
     </p:spTree>
     <p:extLst>
       <p:ext uri="{BB962C8B-B14F-4D97-AF65-F5344CB8AC3E}">
-        <p14:creationId xmlns:p14="http://schemas.microsoft.com/office/powerpoint/2010/main" xmlns:p="http://schemas.openxmlformats.org/presentationml/2006/main" xmlns:r="http://schemas.openxmlformats.org/officeDocument/2006/relationships" xmlns:a="http://schemas.openxmlformats.org/drawingml/2006/main" xmlns="" val="226903401"/>
+        <p14:creationId xmlns:p14="http://schemas.microsoft.com/office/powerpoint/2010/main" val="226903401"/>
       </p:ext>
     </p:extLst>
   </p:cSld>
@@ -325,7 +325,7 @@
 </file>
 
 <file path=ppt/notesMasters/notesMaster1.xml><?xml version="1.0" encoding="utf-8"?>
-<p:notesMaster xmlns:a="http://schemas.openxmlformats.org/drawingml/2006/main" xmlns:r="http://schemas.openxmlformats.org/officeDocument/2006/relationships" xmlns:mc="http://schemas.openxmlformats.org/markup-compatibility/2006" xmlns:mv="urn:schemas-microsoft-com:mac:vml" xmlns:p="http://schemas.openxmlformats.org/presentationml/2006/main" mc:Ignorable="mv" mc:PreserveAttributes="mv:*">
+<p:notesMaster xmlns:a="http://schemas.openxmlformats.org/drawingml/2006/main" xmlns:r="http://schemas.openxmlformats.org/officeDocument/2006/relationships" xmlns:p="http://schemas.openxmlformats.org/presentationml/2006/main">
   <p:cSld>
     <p:bg>
       <p:bgRef idx="1001">
@@ -407,7 +407,7 @@
             <a:fld id="{98EBBA48-4CEA-FF4B-8E04-86A5D1C09742}" type="datetimeFigureOut">
               <a:rPr lang="en-US" smtClean="0"/>
               <a:pPr/>
-              <a:t>5/20/14</a:t>
+              <a:t>5/21/14</a:t>
             </a:fld>
             <a:endParaRPr lang="en-US"/>
           </a:p>
@@ -576,7 +576,7 @@
     </p:spTree>
     <p:extLst>
       <p:ext uri="{BB962C8B-B14F-4D97-AF65-F5344CB8AC3E}">
-        <p14:creationId xmlns:p14="http://schemas.microsoft.com/office/powerpoint/2010/main" xmlns:p="http://schemas.openxmlformats.org/presentationml/2006/main" xmlns:r="http://schemas.openxmlformats.org/officeDocument/2006/relationships" xmlns:a="http://schemas.openxmlformats.org/drawingml/2006/main" xmlns="" val="2445727180"/>
+        <p14:creationId xmlns:p14="http://schemas.microsoft.com/office/powerpoint/2010/main" val="2445727180"/>
       </p:ext>
     </p:extLst>
   </p:cSld>
@@ -677,7 +677,7 @@
 </file>
 
 <file path=ppt/notesSlides/notesSlide1.xml><?xml version="1.0" encoding="utf-8"?>
-<p:notes xmlns:a="http://schemas.openxmlformats.org/drawingml/2006/main" xmlns:r="http://schemas.openxmlformats.org/officeDocument/2006/relationships" xmlns:mc="http://schemas.openxmlformats.org/markup-compatibility/2006" xmlns:mv="urn:schemas-microsoft-com:mac:vml" xmlns:p="http://schemas.openxmlformats.org/presentationml/2006/main" mc:Ignorable="mv" mc:PreserveAttributes="mv:*">
+<p:notes xmlns:a="http://schemas.openxmlformats.org/drawingml/2006/main" xmlns:r="http://schemas.openxmlformats.org/officeDocument/2006/relationships" xmlns:p="http://schemas.openxmlformats.org/presentationml/2006/main">
   <p:cSld>
     <p:spTree>
       <p:nvGrpSpPr>
@@ -726,11 +726,7 @@
             </a:r>
             <a:r>
               <a:rPr lang="en-US" baseline="0" dirty="0" smtClean="0"/>
-              <a:t> when working on computational problems.  The first part will be about a method for building reusable workflows that </a:t>
-            </a:r>
-            <a:r>
-              <a:rPr lang="en-US" baseline="0" dirty="0" smtClean="0"/>
-              <a:t>are simple to run, able to grow from simple to complex as your project demands, and self-updating when source data changes.  The second part will be about parallel processing using this workflow system and also other tools.</a:t>
+              <a:t> when working on computational problems.  The first part will be about a method for building reusable workflows that are simple to run, able to grow from simple to complex as your project demands, and self-updating when source data changes.  The second part will be about parallel processing using this workflow system and also other tools.</a:t>
             </a:r>
             <a:endParaRPr lang="en-US" dirty="0"/>
           </a:p>
@@ -763,7 +759,7 @@
     </p:spTree>
     <p:extLst>
       <p:ext uri="{BB962C8B-B14F-4D97-AF65-F5344CB8AC3E}">
-        <p14:creationId xmlns:p14="http://schemas.microsoft.com/office/powerpoint/2010/main" xmlns:p="http://schemas.openxmlformats.org/presentationml/2006/main" xmlns:r="http://schemas.openxmlformats.org/officeDocument/2006/relationships" xmlns:a="http://schemas.openxmlformats.org/drawingml/2006/main" xmlns="" val="3819383451"/>
+        <p14:creationId xmlns:p14="http://schemas.microsoft.com/office/powerpoint/2010/main" val="3819383451"/>
       </p:ext>
     </p:extLst>
   </p:cSld>
@@ -774,7 +770,7 @@
 </file>
 
 <file path=ppt/notesSlides/notesSlide10.xml><?xml version="1.0" encoding="utf-8"?>
-<p:notes xmlns:a="http://schemas.openxmlformats.org/drawingml/2006/main" xmlns:r="http://schemas.openxmlformats.org/officeDocument/2006/relationships" xmlns:mc="http://schemas.openxmlformats.org/markup-compatibility/2006" xmlns:mv="urn:schemas-microsoft-com:mac:vml" xmlns:p="http://schemas.openxmlformats.org/presentationml/2006/main" mc:Ignorable="mv" mc:PreserveAttributes="mv:*">
+<p:notes xmlns:a="http://schemas.openxmlformats.org/drawingml/2006/main" xmlns:r="http://schemas.openxmlformats.org/officeDocument/2006/relationships" xmlns:p="http://schemas.openxmlformats.org/presentationml/2006/main">
   <p:cSld>
     <p:spTree>
       <p:nvGrpSpPr>
@@ -828,19 +824,7 @@
           <a:p>
             <a:r>
               <a:rPr lang="en-US" baseline="0" dirty="0" smtClean="0"/>
-              <a:t>Note that our </a:t>
-            </a:r>
-            <a:r>
-              <a:rPr lang="en-US" baseline="0" dirty="0" smtClean="0"/>
-              <a:t>recipes are simpler</a:t>
-            </a:r>
-            <a:r>
-              <a:rPr lang="en-US" baseline="0" dirty="0" smtClean="0"/>
-              <a:t> by </a:t>
-            </a:r>
-            <a:r>
-              <a:rPr lang="en-US" baseline="0" dirty="0" smtClean="0"/>
-              <a:t>making a separate recipe to describe how to make the nexus file out of the aligned </a:t>
+              <a:t>Note that our recipes are simpler by making a separate recipe to describe how to make the nexus file out of the aligned </a:t>
             </a:r>
             <a:r>
               <a:rPr lang="en-US" baseline="0" dirty="0" err="1" smtClean="0"/>
@@ -897,7 +881,7 @@
     </p:spTree>
     <p:extLst>
       <p:ext uri="{BB962C8B-B14F-4D97-AF65-F5344CB8AC3E}">
-        <p14:creationId xmlns:p14="http://schemas.microsoft.com/office/powerpoint/2010/main" xmlns:p="http://schemas.openxmlformats.org/presentationml/2006/main" xmlns:r="http://schemas.openxmlformats.org/officeDocument/2006/relationships" xmlns:a="http://schemas.openxmlformats.org/drawingml/2006/main" xmlns="" val="2586950902"/>
+        <p14:creationId xmlns:p14="http://schemas.microsoft.com/office/powerpoint/2010/main" val="2586950902"/>
       </p:ext>
     </p:extLst>
   </p:cSld>
@@ -908,7 +892,7 @@
 </file>
 
 <file path=ppt/notesSlides/notesSlide11.xml><?xml version="1.0" encoding="utf-8"?>
-<p:notes xmlns:a="http://schemas.openxmlformats.org/drawingml/2006/main" xmlns:r="http://schemas.openxmlformats.org/officeDocument/2006/relationships" xmlns:mc="http://schemas.openxmlformats.org/markup-compatibility/2006" xmlns:mv="urn:schemas-microsoft-com:mac:vml" xmlns:p="http://schemas.openxmlformats.org/presentationml/2006/main" mc:Ignorable="mv" mc:PreserveAttributes="mv:*">
+<p:notes xmlns:a="http://schemas.openxmlformats.org/drawingml/2006/main" xmlns:r="http://schemas.openxmlformats.org/officeDocument/2006/relationships" xmlns:p="http://schemas.openxmlformats.org/presentationml/2006/main">
   <p:cSld>
     <p:spTree>
       <p:nvGrpSpPr>
@@ -962,17 +946,8 @@
           <a:p>
             <a:r>
               <a:rPr lang="en-US" baseline="0" dirty="0" smtClean="0"/>
-              <a:t>Alright.  We </a:t>
-            </a:r>
-            <a:r>
-              <a:rPr lang="en-US" baseline="0" dirty="0" smtClean="0"/>
-              <a:t>have a workflow to get amino acid frequencies from a set of nucleotide </a:t>
-            </a:r>
-            <a:r>
-              <a:rPr lang="en-US" baseline="0" dirty="0" smtClean="0"/>
-              <a:t>sequences.  That’s great!</a:t>
-            </a:r>
-            <a:endParaRPr lang="en-US" baseline="0" dirty="0" smtClean="0"/>
+              <a:t>Alright.  We have a workflow to get amino acid frequencies from a set of nucleotide sequences.  That’s great!</a:t>
+            </a:r>
           </a:p>
           <a:p>
             <a:endParaRPr lang="en-US" baseline="0" dirty="0" smtClean="0"/>
@@ -1028,7 +1003,7 @@
     </p:spTree>
     <p:extLst>
       <p:ext uri="{BB962C8B-B14F-4D97-AF65-F5344CB8AC3E}">
-        <p14:creationId xmlns:p14="http://schemas.microsoft.com/office/powerpoint/2010/main" xmlns:p="http://schemas.openxmlformats.org/presentationml/2006/main" xmlns:r="http://schemas.openxmlformats.org/officeDocument/2006/relationships" xmlns:a="http://schemas.openxmlformats.org/drawingml/2006/main" xmlns="" val="2586950902"/>
+        <p14:creationId xmlns:p14="http://schemas.microsoft.com/office/powerpoint/2010/main" val="2586950902"/>
       </p:ext>
     </p:extLst>
   </p:cSld>
@@ -1039,7 +1014,7 @@
 </file>
 
 <file path=ppt/notesSlides/notesSlide12.xml><?xml version="1.0" encoding="utf-8"?>
-<p:notes xmlns:a="http://schemas.openxmlformats.org/drawingml/2006/main" xmlns:r="http://schemas.openxmlformats.org/officeDocument/2006/relationships" xmlns:mc="http://schemas.openxmlformats.org/markup-compatibility/2006" xmlns:mv="urn:schemas-microsoft-com:mac:vml" xmlns:p="http://schemas.openxmlformats.org/presentationml/2006/main" mc:Ignorable="mv" mc:PreserveAttributes="mv:*">
+<p:notes xmlns:a="http://schemas.openxmlformats.org/drawingml/2006/main" xmlns:r="http://schemas.openxmlformats.org/officeDocument/2006/relationships" xmlns:p="http://schemas.openxmlformats.org/presentationml/2006/main">
   <p:cSld>
     <p:spTree>
       <p:nvGrpSpPr>
@@ -1084,15 +1059,7 @@
           <a:p>
             <a:r>
               <a:rPr lang="en-US" baseline="0" dirty="0" smtClean="0"/>
-              <a:t>Luckily, make supports this by writing recipes that use</a:t>
-            </a:r>
-            <a:r>
-              <a:rPr lang="en-US" baseline="0" dirty="0" smtClean="0"/>
-              <a:t> wildcards </a:t>
-            </a:r>
-            <a:r>
-              <a:rPr lang="en-US" baseline="0" dirty="0" smtClean="0"/>
-              <a:t>in the target and prerequisites.  The % is a wildcard here and represents the same name on each side of the colon.</a:t>
+              <a:t>Luckily, make supports this by writing recipes that use wildcards in the target and prerequisites.  The % is a wildcard here and represents the same name on each side of the colon.</a:t>
             </a:r>
           </a:p>
           <a:p>
@@ -1109,11 +1076,7 @@
             </a:r>
             <a:r>
               <a:rPr lang="en-US" baseline="0" dirty="0" smtClean="0"/>
-              <a:t> </a:t>
-            </a:r>
-            <a:r>
-              <a:rPr lang="en-US" baseline="0" dirty="0" smtClean="0"/>
-              <a:t>and produce a </a:t>
+              <a:t> and produce a </a:t>
             </a:r>
             <a:r>
               <a:rPr lang="en-US" baseline="0" dirty="0" err="1" smtClean="0"/>
@@ -1121,11 +1084,7 @@
             </a:r>
             <a:r>
               <a:rPr lang="en-US" baseline="0" dirty="0" smtClean="0"/>
-              <a:t> </a:t>
-            </a:r>
-            <a:r>
-              <a:rPr lang="en-US" baseline="0" dirty="0" smtClean="0"/>
-              <a:t>just by typing: make </a:t>
+              <a:t> just by typing: make </a:t>
             </a:r>
             <a:r>
               <a:rPr lang="en-US" baseline="0" dirty="0" err="1" smtClean="0"/>
@@ -1171,7 +1130,7 @@
     </p:spTree>
     <p:extLst>
       <p:ext uri="{BB962C8B-B14F-4D97-AF65-F5344CB8AC3E}">
-        <p14:creationId xmlns:p14="http://schemas.microsoft.com/office/powerpoint/2010/main" xmlns:p="http://schemas.openxmlformats.org/presentationml/2006/main" xmlns:r="http://schemas.openxmlformats.org/officeDocument/2006/relationships" xmlns:a="http://schemas.openxmlformats.org/drawingml/2006/main" xmlns="" val="2586950902"/>
+        <p14:creationId xmlns:p14="http://schemas.microsoft.com/office/powerpoint/2010/main" val="2586950902"/>
       </p:ext>
     </p:extLst>
   </p:cSld>
@@ -1182,7 +1141,7 @@
 </file>
 
 <file path=ppt/notesSlides/notesSlide13.xml><?xml version="1.0" encoding="utf-8"?>
-<p:notes xmlns:a="http://schemas.openxmlformats.org/drawingml/2006/main" xmlns:r="http://schemas.openxmlformats.org/officeDocument/2006/relationships" xmlns:mc="http://schemas.openxmlformats.org/markup-compatibility/2006" xmlns:mv="urn:schemas-microsoft-com:mac:vml" xmlns:p="http://schemas.openxmlformats.org/presentationml/2006/main" mc:Ignorable="mv" mc:PreserveAttributes="mv:*">
+<p:notes xmlns:a="http://schemas.openxmlformats.org/drawingml/2006/main" xmlns:r="http://schemas.openxmlformats.org/officeDocument/2006/relationships" xmlns:p="http://schemas.openxmlformats.org/presentationml/2006/main">
   <p:cSld>
     <p:spTree>
       <p:nvGrpSpPr>
@@ -1317,7 +1276,7 @@
     </p:spTree>
     <p:extLst>
       <p:ext uri="{BB962C8B-B14F-4D97-AF65-F5344CB8AC3E}">
-        <p14:creationId xmlns:p14="http://schemas.microsoft.com/office/powerpoint/2010/main" xmlns:p="http://schemas.openxmlformats.org/presentationml/2006/main" xmlns:r="http://schemas.openxmlformats.org/officeDocument/2006/relationships" xmlns:a="http://schemas.openxmlformats.org/drawingml/2006/main" xmlns="" val="2586950902"/>
+        <p14:creationId xmlns:p14="http://schemas.microsoft.com/office/powerpoint/2010/main" val="2586950902"/>
       </p:ext>
     </p:extLst>
   </p:cSld>
@@ -1328,7 +1287,7 @@
 </file>
 
 <file path=ppt/notesSlides/notesSlide14.xml><?xml version="1.0" encoding="utf-8"?>
-<p:notes xmlns:a="http://schemas.openxmlformats.org/drawingml/2006/main" xmlns:r="http://schemas.openxmlformats.org/officeDocument/2006/relationships" xmlns:mc="http://schemas.openxmlformats.org/markup-compatibility/2006" xmlns:mv="urn:schemas-microsoft-com:mac:vml" xmlns:p="http://schemas.openxmlformats.org/presentationml/2006/main" mc:Ignorable="mv" mc:PreserveAttributes="mv:*">
+<p:notes xmlns:a="http://schemas.openxmlformats.org/drawingml/2006/main" xmlns:r="http://schemas.openxmlformats.org/officeDocument/2006/relationships" xmlns:p="http://schemas.openxmlformats.org/presentationml/2006/main">
   <p:cSld>
     <p:spTree>
       <p:nvGrpSpPr>
@@ -1414,11 +1373,7 @@
             </a:r>
             <a:r>
               <a:rPr lang="en-US" baseline="0" dirty="0" smtClean="0"/>
-              <a:t>.  It’s important to note that if I already have a</a:t>
-            </a:r>
-            <a:r>
-              <a:rPr lang="en-US" baseline="0" dirty="0" smtClean="0"/>
-              <a:t> </a:t>
+              <a:t>.  It’s important to note that if I already have a </a:t>
             </a:r>
             <a:r>
               <a:rPr lang="en-US" baseline="0" dirty="0" err="1" smtClean="0"/>
@@ -1426,15 +1381,7 @@
             </a:r>
             <a:r>
               <a:rPr lang="en-US" baseline="0" dirty="0" smtClean="0"/>
-              <a:t> </a:t>
-            </a:r>
-            <a:r>
-              <a:rPr lang="en-US" baseline="0" dirty="0" smtClean="0"/>
-              <a:t>file from somewhere else, I can still run `make</a:t>
-            </a:r>
-            <a:r>
-              <a:rPr lang="en-US" baseline="0" dirty="0" smtClean="0"/>
-              <a:t> </a:t>
+              <a:t> file from somewhere else, I can still run `make </a:t>
             </a:r>
             <a:r>
               <a:rPr lang="en-US" baseline="0" dirty="0" err="1" smtClean="0"/>
@@ -1442,13 +1389,8 @@
             </a:r>
             <a:r>
               <a:rPr lang="en-US" baseline="0" dirty="0" smtClean="0"/>
-              <a:t>` and make will realize it doesn’t need to run the first rule to translate from </a:t>
-            </a:r>
-            <a:r>
-              <a:rPr lang="en-US" baseline="0" dirty="0" smtClean="0"/>
-              <a:t>nucleotides to amino acids.</a:t>
-            </a:r>
-            <a:endParaRPr lang="en-US" baseline="0" dirty="0" smtClean="0"/>
+              <a:t>` and make will realize it doesn’t need to run the first rule to translate from nucleotides to amino acids.</a:t>
+            </a:r>
           </a:p>
           <a:p>
             <a:endParaRPr lang="en-US" baseline="0" dirty="0" smtClean="0"/>
@@ -1473,15 +1415,7 @@
           <a:p>
             <a:r>
               <a:rPr lang="en-US" baseline="0" dirty="0" smtClean="0"/>
-              <a:t>Now, normally </a:t>
-            </a:r>
-            <a:r>
-              <a:rPr lang="en-US" baseline="0" dirty="0" smtClean="0"/>
-              <a:t>make will delete intermediate files after it’s done with them.  Intermediate files are any files you didn’t ask for, but that it had to produce to get from your input to the output you asked for.  In the case of going from</a:t>
-            </a:r>
-            <a:r>
-              <a:rPr lang="en-US" baseline="0" dirty="0" smtClean="0"/>
-              <a:t> </a:t>
+              <a:t>Now, normally make will delete intermediate files after it’s done with them.  Intermediate files are any files you didn’t ask for, but that it had to produce to get from your input to the output you asked for.  In the case of going from </a:t>
             </a:r>
             <a:r>
               <a:rPr lang="en-US" baseline="0" dirty="0" err="1" smtClean="0"/>
@@ -1489,15 +1423,7 @@
             </a:r>
             <a:r>
               <a:rPr lang="en-US" baseline="0" dirty="0" smtClean="0"/>
-              <a:t> </a:t>
-            </a:r>
-            <a:r>
-              <a:rPr lang="en-US" baseline="0" dirty="0" smtClean="0"/>
-              <a:t>to</a:t>
-            </a:r>
-            <a:r>
-              <a:rPr lang="en-US" baseline="0" dirty="0" smtClean="0"/>
-              <a:t> </a:t>
+              <a:t> to </a:t>
             </a:r>
             <a:r>
               <a:rPr lang="en-US" baseline="0" dirty="0" err="1" smtClean="0"/>
@@ -1505,11 +1431,7 @@
             </a:r>
             <a:r>
               <a:rPr lang="en-US" baseline="0" dirty="0" smtClean="0"/>
-              <a:t>, there are two intermediate files:</a:t>
-            </a:r>
-            <a:r>
-              <a:rPr lang="en-US" baseline="0" dirty="0" smtClean="0"/>
-              <a:t> </a:t>
+              <a:t>, there are two intermediate files: </a:t>
             </a:r>
             <a:r>
               <a:rPr lang="en-US" baseline="0" dirty="0" err="1" smtClean="0"/>
@@ -1517,15 +1439,7 @@
             </a:r>
             <a:r>
               <a:rPr lang="en-US" baseline="0" dirty="0" smtClean="0"/>
-              <a:t> </a:t>
-            </a:r>
-            <a:r>
-              <a:rPr lang="en-US" baseline="0" dirty="0" smtClean="0"/>
-              <a:t>and</a:t>
-            </a:r>
-            <a:r>
-              <a:rPr lang="en-US" baseline="0" dirty="0" smtClean="0"/>
-              <a:t> </a:t>
+              <a:t> and </a:t>
             </a:r>
             <a:r>
               <a:rPr lang="en-US" baseline="0" dirty="0" err="1" smtClean="0"/>
@@ -1533,11 +1447,7 @@
             </a:r>
             <a:r>
               <a:rPr lang="en-US" baseline="0" dirty="0" smtClean="0"/>
-              <a:t> </a:t>
-            </a:r>
-            <a:r>
-              <a:rPr lang="en-US" baseline="0" dirty="0" smtClean="0"/>
-              <a:t>which make will delete when it’s done.  This is just a cleanliness thing so you have less files to look at in your directory.  But sometimes you want to keep those files around, especially if they take a while to produce.  muscle, for example, might take a long time on a large set of sequences.  There’s a way to tell make that it shouldn’t delete certain intermediate files, that certain files are…  precious.</a:t>
+              <a:t> which make will delete when it’s done.  This is just a cleanliness thing so you have less files to look at in your directory.  But sometimes you want to keep those files around, especially if they take a while to produce.  muscle, for example, might take a long time on a large set of sequences.  There’s a way to tell make that it shouldn’t delete certain intermediate files, that certain files are…  precious.</a:t>
             </a:r>
           </a:p>
         </p:txBody>
@@ -1569,7 +1479,7 @@
     </p:spTree>
     <p:extLst>
       <p:ext uri="{BB962C8B-B14F-4D97-AF65-F5344CB8AC3E}">
-        <p14:creationId xmlns:p14="http://schemas.microsoft.com/office/powerpoint/2010/main" xmlns:p="http://schemas.openxmlformats.org/presentationml/2006/main" xmlns:r="http://schemas.openxmlformats.org/officeDocument/2006/relationships" xmlns:a="http://schemas.openxmlformats.org/drawingml/2006/main" xmlns="" val="2586950902"/>
+        <p14:creationId xmlns:p14="http://schemas.microsoft.com/office/powerpoint/2010/main" val="2586950902"/>
       </p:ext>
     </p:extLst>
   </p:cSld>
@@ -1580,7 +1490,7 @@
 </file>
 
 <file path=ppt/notesSlides/notesSlide15.xml><?xml version="1.0" encoding="utf-8"?>
-<p:notes xmlns:a="http://schemas.openxmlformats.org/drawingml/2006/main" xmlns:r="http://schemas.openxmlformats.org/officeDocument/2006/relationships" xmlns:mc="http://schemas.openxmlformats.org/markup-compatibility/2006" xmlns:mv="urn:schemas-microsoft-com:mac:vml" xmlns:p="http://schemas.openxmlformats.org/presentationml/2006/main" mc:Ignorable="mv" mc:PreserveAttributes="mv:*">
+<p:notes xmlns:a="http://schemas.openxmlformats.org/drawingml/2006/main" xmlns:r="http://schemas.openxmlformats.org/officeDocument/2006/relationships" xmlns:p="http://schemas.openxmlformats.org/presentationml/2006/main">
   <p:cSld>
     <p:spTree>
       <p:nvGrpSpPr>
@@ -1625,15 +1535,7 @@
           <a:p>
             <a:r>
               <a:rPr lang="en-US" baseline="0" dirty="0" smtClean="0"/>
-              <a:t>… using a special target name.  The target </a:t>
-            </a:r>
-            <a:r>
-              <a:rPr lang="en-US" baseline="0" dirty="0" smtClean="0"/>
-              <a:t>“.PRECIOUS” does this and any prerequisites you specify won’t be deleted even if they’re intermediate files</a:t>
-            </a:r>
-            <a:r>
-              <a:rPr lang="en-US" baseline="0" dirty="0" smtClean="0"/>
-              <a:t>.  Note that the prerequisites of .PRECIOUS should be other targets.</a:t>
+              <a:t>… using a special target name.  The target “.PRECIOUS” does this and any prerequisites you specify won’t be deleted even if they’re intermediate files.  Note that the prerequisites of .PRECIOUS should be other targets.</a:t>
             </a:r>
           </a:p>
           <a:p>
@@ -1682,7 +1584,7 @@
     </p:spTree>
     <p:extLst>
       <p:ext uri="{BB962C8B-B14F-4D97-AF65-F5344CB8AC3E}">
-        <p14:creationId xmlns:p14="http://schemas.microsoft.com/office/powerpoint/2010/main" xmlns:p="http://schemas.openxmlformats.org/presentationml/2006/main" xmlns:r="http://schemas.openxmlformats.org/officeDocument/2006/relationships" xmlns:a="http://schemas.openxmlformats.org/drawingml/2006/main" xmlns="" val="2586950902"/>
+        <p14:creationId xmlns:p14="http://schemas.microsoft.com/office/powerpoint/2010/main" val="2586950902"/>
       </p:ext>
     </p:extLst>
   </p:cSld>
@@ -1693,7 +1595,7 @@
 </file>
 
 <file path=ppt/notesSlides/notesSlide16.xml><?xml version="1.0" encoding="utf-8"?>
-<p:notes xmlns:a="http://schemas.openxmlformats.org/drawingml/2006/main" xmlns:r="http://schemas.openxmlformats.org/officeDocument/2006/relationships" xmlns:mc="http://schemas.openxmlformats.org/markup-compatibility/2006" xmlns:mv="urn:schemas-microsoft-com:mac:vml" xmlns:p="http://schemas.openxmlformats.org/presentationml/2006/main" mc:Ignorable="mv" mc:PreserveAttributes="mv:*">
+<p:notes xmlns:a="http://schemas.openxmlformats.org/drawingml/2006/main" xmlns:r="http://schemas.openxmlformats.org/officeDocument/2006/relationships" xmlns:p="http://schemas.openxmlformats.org/presentationml/2006/main">
   <p:cSld>
     <p:spTree>
       <p:nvGrpSpPr>
@@ -1759,24 +1661,13 @@
             </a:r>
             <a:r>
               <a:rPr lang="en-US" baseline="0" dirty="0" smtClean="0"/>
-              <a:t> are one of those features and they help reduce </a:t>
+              <a:t> are one of those features and they help reduce repetition in directory names or other commonly used parameters.  Variable names longer than a single character need to be surrounded by parentheses.  $&lt; and $@ are just automatic variables</a:t>
             </a:r>
             <a:r>
               <a:rPr lang="en-US" baseline="0" dirty="0" smtClean="0"/>
-              <a:t>repetition in directory names or other commonly used parameters.</a:t>
-            </a:r>
-            <a:r>
-              <a:rPr lang="en-US" baseline="0" dirty="0" smtClean="0"/>
-              <a:t>  Variable </a:t>
-            </a:r>
-            <a:r>
-              <a:rPr lang="en-US" baseline="0" dirty="0" smtClean="0"/>
-              <a:t>names longer than a single character need to be surrounded by parentheses</a:t>
-            </a:r>
-            <a:r>
-              <a:rPr lang="en-US" baseline="0" dirty="0" smtClean="0"/>
-              <a:t>.  $&lt; and $@ are just automatic variables.</a:t>
-            </a:r>
+              <a:t>.  := is the assignment operator, and surrounding whitespace doesn’t matter.</a:t>
+            </a:r>
+            <a:endParaRPr lang="en-US" baseline="0" dirty="0" smtClean="0"/>
           </a:p>
           <a:p>
             <a:endParaRPr lang="en-US" baseline="0" dirty="0" smtClean="0"/>
@@ -1802,23 +1693,11 @@
           <a:p>
             <a:r>
               <a:rPr lang="en-US" dirty="0" smtClean="0"/>
-              <a:t>From these two examples, you can </a:t>
-            </a:r>
-            <a:r>
-              <a:rPr lang="en-US" dirty="0" smtClean="0"/>
-              <a:t>see that targets don’t have to be files.  Make doesn’t create a target file itself, that’s up to the recipe.</a:t>
+              <a:t>From these two examples, you can see that targets don’t have to be files.  Make doesn’t create a target file itself, that’s up to the recipe.</a:t>
             </a:r>
             <a:r>
               <a:rPr lang="en-US" baseline="0" dirty="0" smtClean="0"/>
-              <a:t>  So targets may just be a convenient name for a recipe to run a bunch of commands that</a:t>
-            </a:r>
-            <a:r>
-              <a:rPr lang="en-US" baseline="0" dirty="0" smtClean="0"/>
-              <a:t> don’t actually </a:t>
-            </a:r>
-            <a:r>
-              <a:rPr lang="en-US" baseline="0" dirty="0" smtClean="0"/>
-              <a:t>produce a file.</a:t>
+              <a:t>  So targets may just be a convenient name for a recipe to run a bunch of commands that don’t actually produce a file.</a:t>
             </a:r>
             <a:endParaRPr lang="en-US" dirty="0"/>
           </a:p>
@@ -1851,7 +1730,7 @@
     </p:spTree>
     <p:extLst>
       <p:ext uri="{BB962C8B-B14F-4D97-AF65-F5344CB8AC3E}">
-        <p14:creationId xmlns:p14="http://schemas.microsoft.com/office/powerpoint/2010/main" xmlns:p="http://schemas.openxmlformats.org/presentationml/2006/main" xmlns:r="http://schemas.openxmlformats.org/officeDocument/2006/relationships" xmlns:a="http://schemas.openxmlformats.org/drawingml/2006/main" xmlns="" val="819834836"/>
+        <p14:creationId xmlns:p14="http://schemas.microsoft.com/office/powerpoint/2010/main" val="819834836"/>
       </p:ext>
     </p:extLst>
   </p:cSld>
@@ -1862,7 +1741,7 @@
 </file>
 
 <file path=ppt/notesSlides/notesSlide17.xml><?xml version="1.0" encoding="utf-8"?>
-<p:notes xmlns:a="http://schemas.openxmlformats.org/drawingml/2006/main" xmlns:r="http://schemas.openxmlformats.org/officeDocument/2006/relationships" xmlns:mc="http://schemas.openxmlformats.org/markup-compatibility/2006" xmlns:mv="urn:schemas-microsoft-com:mac:vml" xmlns:p="http://schemas.openxmlformats.org/presentationml/2006/main" mc:Ignorable="mv" mc:PreserveAttributes="mv:*">
+<p:notes xmlns:a="http://schemas.openxmlformats.org/drawingml/2006/main" xmlns:r="http://schemas.openxmlformats.org/officeDocument/2006/relationships" xmlns:p="http://schemas.openxmlformats.org/presentationml/2006/main">
   <p:cSld>
     <p:spTree>
       <p:nvGrpSpPr>
@@ -1924,31 +1803,7 @@
             </a:pPr>
             <a:r>
               <a:rPr lang="en-US" baseline="0" dirty="0" smtClean="0"/>
-              <a:t>You can also create targets </a:t>
-            </a:r>
-            <a:r>
-              <a:rPr lang="en-US" baseline="0" dirty="0" smtClean="0"/>
-              <a:t>whose </a:t>
-            </a:r>
-            <a:r>
-              <a:rPr lang="en-US" baseline="0" dirty="0" smtClean="0"/>
-              <a:t>sole purpose is to list a bunch of other targets as prerequisites, which is a way of running multiple targets at once which don’t depend on each </a:t>
-            </a:r>
-            <a:r>
-              <a:rPr lang="en-US" baseline="0" dirty="0" smtClean="0"/>
-              <a:t>other.  In this case, the target “all” will produce </a:t>
-            </a:r>
-            <a:r>
-              <a:rPr lang="en-US" baseline="0" dirty="0" smtClean="0"/>
-              <a:t>a number of specific files from</a:t>
-            </a:r>
-            <a:r>
-              <a:rPr lang="en-US" baseline="0" dirty="0" smtClean="0"/>
-              <a:t> our previous set of </a:t>
-            </a:r>
-            <a:r>
-              <a:rPr lang="en-US" baseline="0" dirty="0" smtClean="0"/>
-              <a:t>generalized recipes.</a:t>
+              <a:t>You can also create targets whose sole purpose is to list a bunch of other targets as prerequisites, which is a way of running multiple targets at once which don’t depend on each other.  In this case, the target “all” will produce a number of specific files from our previous set of generalized recipes.</a:t>
             </a:r>
             <a:endParaRPr lang="en-US" dirty="0" smtClean="0"/>
           </a:p>
@@ -1962,11 +1817,7 @@
             </a:r>
             <a:r>
               <a:rPr lang="en-US" baseline="0" dirty="0" smtClean="0"/>
-              <a:t> also don’t have to be</a:t>
-            </a:r>
-            <a:r>
-              <a:rPr lang="en-US" baseline="0" dirty="0" smtClean="0"/>
-              <a:t> other recipes.  </a:t>
+              <a:t> also don’t have to be other recipes.  </a:t>
             </a:r>
             <a:r>
               <a:rPr lang="en-US" dirty="0" smtClean="0"/>
@@ -1974,21 +1825,8 @@
             </a:r>
             <a:r>
               <a:rPr lang="en-US" baseline="0" dirty="0" smtClean="0"/>
-              <a:t> are just the targets or files that a recipe needs to run and that when they change the recipe needs to be re-run.  You can list your own programs as prerequisites and then make will know it needs to</a:t>
-            </a:r>
-            <a:r>
-              <a:rPr lang="en-US" baseline="0" dirty="0" smtClean="0"/>
-              <a:t> regenerate the </a:t>
-            </a:r>
-            <a:r>
-              <a:rPr lang="en-US" baseline="0" dirty="0" smtClean="0"/>
-              <a:t>files the next time you ask for them after updating your program.  Make will know when you fix </a:t>
-            </a:r>
-            <a:r>
-              <a:rPr lang="en-US" baseline="0" dirty="0" smtClean="0"/>
-              <a:t>bugs or change your analysis change! </a:t>
-            </a:r>
-            <a:endParaRPr lang="en-US" baseline="0" dirty="0" smtClean="0"/>
+              <a:t> are just the targets or files that a recipe needs to run and that when they change the recipe needs to be re-run.  You can list your own programs as prerequisites and then make will know it needs to regenerate the files the next time you ask for them after updating your program.  Make will know when you fix bugs or change your analysis change! </a:t>
+            </a:r>
           </a:p>
         </p:txBody>
       </p:sp>
@@ -2019,7 +1857,7 @@
     </p:spTree>
     <p:extLst>
       <p:ext uri="{BB962C8B-B14F-4D97-AF65-F5344CB8AC3E}">
-        <p14:creationId xmlns:p14="http://schemas.microsoft.com/office/powerpoint/2010/main" xmlns:p="http://schemas.openxmlformats.org/presentationml/2006/main" xmlns:r="http://schemas.openxmlformats.org/officeDocument/2006/relationships" xmlns:a="http://schemas.openxmlformats.org/drawingml/2006/main" xmlns="" val="819834836"/>
+        <p14:creationId xmlns:p14="http://schemas.microsoft.com/office/powerpoint/2010/main" val="819834836"/>
       </p:ext>
     </p:extLst>
   </p:cSld>
@@ -2030,7 +1868,7 @@
 </file>
 
 <file path=ppt/notesSlides/notesSlide18.xml><?xml version="1.0" encoding="utf-8"?>
-<p:notes xmlns:a="http://schemas.openxmlformats.org/drawingml/2006/main" xmlns:r="http://schemas.openxmlformats.org/officeDocument/2006/relationships" xmlns:mc="http://schemas.openxmlformats.org/markup-compatibility/2006" xmlns:mv="urn:schemas-microsoft-com:mac:vml" xmlns:p="http://schemas.openxmlformats.org/presentationml/2006/main" mc:Ignorable="mv" mc:PreserveAttributes="mv:*">
+<p:notes xmlns:a="http://schemas.openxmlformats.org/drawingml/2006/main" xmlns:r="http://schemas.openxmlformats.org/officeDocument/2006/relationships" xmlns:p="http://schemas.openxmlformats.org/presentationml/2006/main">
   <p:cSld>
     <p:spTree>
       <p:nvGrpSpPr>
@@ -2218,7 +2056,7 @@
     </p:spTree>
     <p:extLst>
       <p:ext uri="{BB962C8B-B14F-4D97-AF65-F5344CB8AC3E}">
-        <p14:creationId xmlns:p14="http://schemas.microsoft.com/office/powerpoint/2010/main" xmlns:p="http://schemas.openxmlformats.org/presentationml/2006/main" xmlns:r="http://schemas.openxmlformats.org/officeDocument/2006/relationships" xmlns:a="http://schemas.openxmlformats.org/drawingml/2006/main" xmlns="" val="819834836"/>
+        <p14:creationId xmlns:p14="http://schemas.microsoft.com/office/powerpoint/2010/main" val="819834836"/>
       </p:ext>
     </p:extLst>
   </p:cSld>
@@ -2229,7 +2067,7 @@
 </file>
 
 <file path=ppt/notesSlides/notesSlide19.xml><?xml version="1.0" encoding="utf-8"?>
-<p:notes xmlns:a="http://schemas.openxmlformats.org/drawingml/2006/main" xmlns:r="http://schemas.openxmlformats.org/officeDocument/2006/relationships" xmlns:mc="http://schemas.openxmlformats.org/markup-compatibility/2006" xmlns:mv="urn:schemas-microsoft-com:mac:vml" xmlns:p="http://schemas.openxmlformats.org/presentationml/2006/main" mc:Ignorable="mv" mc:PreserveAttributes="mv:*">
+<p:notes xmlns:a="http://schemas.openxmlformats.org/drawingml/2006/main" xmlns:r="http://schemas.openxmlformats.org/officeDocument/2006/relationships" xmlns:p="http://schemas.openxmlformats.org/presentationml/2006/main">
   <p:cSld>
     <p:spTree>
       <p:nvGrpSpPr>
@@ -2300,24 +2138,16 @@
           <a:p>
             <a:r>
               <a:rPr lang="en-US" baseline="0" dirty="0" smtClean="0"/>
-              <a:t>The most common by far is that the action part </a:t>
-            </a:r>
+              <a:t>The most common by far is that the action part of a recipe must use hard tabs for the first indent, not spaces.  This is often a source of problems.  All editors should have a way of highlighting hard tabs vs. spaces.</a:t>
+            </a:r>
+          </a:p>
+          <a:p>
+            <a:endParaRPr lang="en-US" baseline="0" dirty="0" smtClean="0"/>
+          </a:p>
+          <a:p>
             <a:r>
               <a:rPr lang="en-US" baseline="0" dirty="0" smtClean="0"/>
-              <a:t>of a recipe must use hard tabs for the first indent, not spaces.  This is often a source of problems.  All editors should have a way of highlighting hard tabs vs. spaces.</a:t>
-            </a:r>
-          </a:p>
-          <a:p>
-            <a:endParaRPr lang="en-US" baseline="0" dirty="0" smtClean="0"/>
-          </a:p>
-          <a:p>
-            <a:r>
-              <a:rPr lang="en-US" baseline="0" dirty="0" smtClean="0"/>
-              <a:t>The next is that make doesn’t regenerate files if the input hasn’t changed but the recipe itself has.  When </a:t>
-            </a:r>
-            <a:r>
-              <a:rPr lang="en-US" baseline="0" dirty="0" smtClean="0"/>
-              <a:t>a </a:t>
+              <a:t>The next is that make doesn’t regenerate files if the input hasn’t changed but the recipe itself has.  When a </a:t>
             </a:r>
             <a:r>
               <a:rPr lang="en-US" baseline="0" dirty="0" err="1" smtClean="0"/>
@@ -2325,31 +2155,7 @@
             </a:r>
             <a:r>
               <a:rPr lang="en-US" baseline="0" dirty="0" smtClean="0"/>
-              <a:t> changes, you often need to rerun the recipes.  Since the</a:t>
-            </a:r>
-            <a:r>
-              <a:rPr lang="en-US" baseline="0" dirty="0" smtClean="0"/>
-              <a:t> timestamps </a:t>
-            </a:r>
-            <a:r>
-              <a:rPr lang="en-US" baseline="0" dirty="0" smtClean="0"/>
-              <a:t>of the input and output files don’t change, just running make won’t do that.  To get around this, you can run `make -B` to force run a target and all dependent targets.  You can also update the timestamps of all your input files </a:t>
-            </a:r>
-            <a:r>
-              <a:rPr lang="en-US" baseline="0" dirty="0" smtClean="0"/>
-              <a:t>using the </a:t>
-            </a:r>
-            <a:r>
-              <a:rPr lang="en-US" baseline="0" dirty="0" smtClean="0"/>
-              <a:t>`touch`</a:t>
-            </a:r>
-            <a:r>
-              <a:rPr lang="en-US" baseline="0" dirty="0" smtClean="0"/>
-              <a:t> command and </a:t>
-            </a:r>
-            <a:r>
-              <a:rPr lang="en-US" baseline="0" dirty="0" smtClean="0"/>
-              <a:t>then rerun your targets with make.</a:t>
+              <a:t> changes, you often need to rerun the recipes.  Since the timestamps of the input and output files don’t change, just running make won’t do that.  To get around this, you can run `make -B` to force run a target and all dependent targets.  You can also update the timestamps of all your input files using the `touch` command and then rerun your targets with make.</a:t>
             </a:r>
           </a:p>
           <a:p>
@@ -2366,11 +2172,7 @@
             </a:r>
             <a:r>
               <a:rPr lang="en-US" dirty="0" smtClean="0"/>
-              <a:t>make’s </a:t>
-            </a:r>
-            <a:r>
-              <a:rPr lang="en-US" dirty="0" smtClean="0"/>
-              <a:t>default </a:t>
+              <a:t>make’s default </a:t>
             </a:r>
             <a:r>
               <a:rPr lang="en-US" dirty="0" err="1" smtClean="0"/>
@@ -2378,19 +2180,7 @@
             </a:r>
             <a:r>
               <a:rPr lang="en-US" dirty="0" smtClean="0"/>
-              <a:t> on errors is</a:t>
-            </a:r>
-            <a:r>
-              <a:rPr lang="en-US" dirty="0" smtClean="0"/>
-              <a:t> sometimes less </a:t>
-            </a:r>
-            <a:r>
-              <a:rPr lang="en-US" dirty="0" smtClean="0"/>
-              <a:t>than </a:t>
-            </a:r>
-            <a:r>
-              <a:rPr lang="en-US" dirty="0" smtClean="0"/>
-              <a:t>ideal if you’re using pipelines, such as when we piped the</a:t>
+              <a:t> on errors is sometimes less than ideal if you’re using pipelines, such as when we piped the</a:t>
             </a:r>
             <a:r>
               <a:rPr lang="en-US" baseline="0" dirty="0" smtClean="0"/>
@@ -2398,15 +2188,7 @@
             </a:r>
             <a:r>
               <a:rPr lang="en-US" dirty="0" smtClean="0"/>
-              <a:t>.  </a:t>
-            </a:r>
-            <a:r>
-              <a:rPr lang="en-US" dirty="0" smtClean="0"/>
-              <a:t>Only the </a:t>
-            </a:r>
-            <a:r>
-              <a:rPr lang="en-US" dirty="0" smtClean="0"/>
-              <a:t>success</a:t>
+              <a:t>.  Only the success</a:t>
             </a:r>
             <a:r>
               <a:rPr lang="en-US" baseline="0" dirty="0" smtClean="0"/>
@@ -2414,80 +2196,20 @@
             </a:r>
             <a:r>
               <a:rPr lang="en-US" dirty="0" smtClean="0"/>
-              <a:t>failure </a:t>
-            </a:r>
-            <a:r>
-              <a:rPr lang="en-US" dirty="0" smtClean="0"/>
-              <a:t>status of the</a:t>
+              <a:t>failure status of the</a:t>
             </a:r>
             <a:r>
               <a:rPr lang="en-US" baseline="0" dirty="0" smtClean="0"/>
-              <a:t> last command in a pipeline is </a:t>
-            </a:r>
+              <a:t> last command in a pipeline is considered for errors, even if a command in the middle fails partway through the data.  You can change this by using the first two lines here which change the command shell make uses to run your recipes and sets an option for the shell.</a:t>
+            </a:r>
+          </a:p>
+          <a:p>
+            <a:endParaRPr lang="en-US" baseline="0" dirty="0" smtClean="0"/>
+          </a:p>
+          <a:p>
             <a:r>
               <a:rPr lang="en-US" baseline="0" dirty="0" smtClean="0"/>
-              <a:t>considered for errors, </a:t>
-            </a:r>
-            <a:r>
-              <a:rPr lang="en-US" baseline="0" dirty="0" smtClean="0"/>
-              <a:t>even if a command in the middle fails partway through the data</a:t>
-            </a:r>
-            <a:r>
-              <a:rPr lang="en-US" baseline="0" dirty="0" smtClean="0"/>
-              <a:t>.  You can change this by using the first two lines here which change the command shell make uses to run your recipes and sets an option for the shell.</a:t>
-            </a:r>
-          </a:p>
-          <a:p>
-            <a:endParaRPr lang="en-US" baseline="0" dirty="0" smtClean="0"/>
-          </a:p>
-          <a:p>
-            <a:r>
-              <a:rPr lang="en-US" baseline="0" dirty="0" smtClean="0"/>
-              <a:t>When make does catch an error, it leaves any partially made target files around</a:t>
-            </a:r>
-            <a:r>
-              <a:rPr lang="en-US" baseline="0" dirty="0" smtClean="0"/>
-              <a:t>.  This can be confusing at first if you don’t notice there was an error.  </a:t>
-            </a:r>
-            <a:r>
-              <a:rPr lang="en-US" baseline="0" dirty="0" smtClean="0"/>
-              <a:t>You can include the special empty target</a:t>
-            </a:r>
-            <a:r>
-              <a:rPr lang="en-US" baseline="0" dirty="0" smtClean="0"/>
-              <a:t> “.</a:t>
-            </a:r>
-            <a:r>
-              <a:rPr lang="en-US" baseline="0" dirty="0" smtClean="0"/>
-              <a:t>DELETE_ON_ERROR</a:t>
-            </a:r>
-            <a:r>
-              <a:rPr lang="en-US" baseline="0" dirty="0" smtClean="0"/>
-              <a:t>:” </a:t>
-            </a:r>
-            <a:r>
-              <a:rPr lang="en-US" baseline="0" dirty="0" smtClean="0"/>
-              <a:t>to</a:t>
-            </a:r>
-            <a:r>
-              <a:rPr lang="en-US" baseline="0" dirty="0" smtClean="0"/>
-              <a:t> force make to delete </a:t>
-            </a:r>
-            <a:r>
-              <a:rPr lang="en-US" baseline="0" dirty="0" smtClean="0"/>
-              <a:t>any partially-complete target files if the </a:t>
-            </a:r>
-            <a:r>
-              <a:rPr lang="en-US" baseline="0" dirty="0" smtClean="0"/>
-              <a:t>recipe fails.  This avoids manually </a:t>
-            </a:r>
-            <a:r>
-              <a:rPr lang="en-US" baseline="0" dirty="0" smtClean="0"/>
-              <a:t>running other recipes later which may use the partial </a:t>
-            </a:r>
-            <a:r>
-              <a:rPr lang="en-US" baseline="0" dirty="0" smtClean="0"/>
-              <a:t>data left around.</a:t>
+              <a:t>When make does catch an error, it leaves any partially made target files around.  This can be confusing at first if you don’t notice there was an error.  You can include the special empty target “.DELETE_ON_ERROR:” to force make to delete any partially-complete target files if the recipe fails.  This avoids manually running other recipes later which may use the partial data left around.</a:t>
             </a:r>
           </a:p>
           <a:p>
@@ -2506,7 +2228,6 @@
               <a:rPr lang="en-US" baseline="0" dirty="0" smtClean="0"/>
               <a:t>.</a:t>
             </a:r>
-            <a:endParaRPr lang="en-US" baseline="0" dirty="0" smtClean="0"/>
           </a:p>
         </p:txBody>
       </p:sp>
@@ -2537,7 +2258,7 @@
     </p:spTree>
     <p:extLst>
       <p:ext uri="{BB962C8B-B14F-4D97-AF65-F5344CB8AC3E}">
-        <p14:creationId xmlns:p14="http://schemas.microsoft.com/office/powerpoint/2010/main" xmlns:p="http://schemas.openxmlformats.org/presentationml/2006/main" xmlns:r="http://schemas.openxmlformats.org/officeDocument/2006/relationships" xmlns:a="http://schemas.openxmlformats.org/drawingml/2006/main" xmlns="" val="304220976"/>
+        <p14:creationId xmlns:p14="http://schemas.microsoft.com/office/powerpoint/2010/main" val="304220976"/>
       </p:ext>
     </p:extLst>
   </p:cSld>
@@ -2548,7 +2269,7 @@
 </file>
 
 <file path=ppt/notesSlides/notesSlide2.xml><?xml version="1.0" encoding="utf-8"?>
-<p:notes xmlns:a="http://schemas.openxmlformats.org/drawingml/2006/main" xmlns:r="http://schemas.openxmlformats.org/officeDocument/2006/relationships" xmlns:mc="http://schemas.openxmlformats.org/markup-compatibility/2006" xmlns:mv="urn:schemas-microsoft-com:mac:vml" xmlns:p="http://schemas.openxmlformats.org/presentationml/2006/main" mc:Ignorable="mv" mc:PreserveAttributes="mv:*">
+<p:notes xmlns:a="http://schemas.openxmlformats.org/drawingml/2006/main" xmlns:r="http://schemas.openxmlformats.org/officeDocument/2006/relationships" xmlns:p="http://schemas.openxmlformats.org/presentationml/2006/main">
   <p:cSld>
     <p:spTree>
       <p:nvGrpSpPr>
@@ -2593,15 +2314,7 @@
           <a:p>
             <a:r>
               <a:rPr lang="en-US" dirty="0" smtClean="0"/>
-              <a:t>These are your </a:t>
-            </a:r>
-            <a:r>
-              <a:rPr lang="en-US" dirty="0" smtClean="0"/>
-              <a:t>computational or analytical </a:t>
-            </a:r>
-            <a:r>
-              <a:rPr lang="en-US" dirty="0" smtClean="0"/>
-              <a:t>methods</a:t>
+              <a:t>These are your computational or analytical methods</a:t>
             </a:r>
             <a:r>
               <a:rPr lang="en-US" baseline="0" dirty="0" smtClean="0"/>
@@ -2614,15 +2327,7 @@
           <a:p>
             <a:r>
               <a:rPr lang="en-US" baseline="0" dirty="0" smtClean="0"/>
-              <a:t>Pretty much whatever </a:t>
-            </a:r>
-            <a:r>
-              <a:rPr lang="en-US" baseline="0" dirty="0" smtClean="0"/>
-              <a:t>you did to go from the raw data to your charts and graphs and final data </a:t>
-            </a:r>
-            <a:r>
-              <a:rPr lang="en-US" baseline="0" dirty="0" smtClean="0"/>
-              <a:t>tables is part of a workflow.</a:t>
+              <a:t>Pretty much whatever you did to go from the raw data to your charts and graphs and final data tables is part of a workflow.</a:t>
             </a:r>
           </a:p>
           <a:p>
@@ -2633,7 +2338,6 @@
               <a:rPr lang="en-US" baseline="0" dirty="0" smtClean="0"/>
               <a:t>Yours may be usually entirely manual, but hopefully they’re automated to some degree.  I’m going to talk about automation.</a:t>
             </a:r>
-            <a:endParaRPr lang="en-US" baseline="0" dirty="0" smtClean="0"/>
           </a:p>
         </p:txBody>
       </p:sp>
@@ -2664,7 +2368,7 @@
     </p:spTree>
     <p:extLst>
       <p:ext uri="{BB962C8B-B14F-4D97-AF65-F5344CB8AC3E}">
-        <p14:creationId xmlns:p14="http://schemas.microsoft.com/office/powerpoint/2010/main" xmlns:p="http://schemas.openxmlformats.org/presentationml/2006/main" xmlns:r="http://schemas.openxmlformats.org/officeDocument/2006/relationships" xmlns:a="http://schemas.openxmlformats.org/drawingml/2006/main" xmlns="" val="528165026"/>
+        <p14:creationId xmlns:p14="http://schemas.microsoft.com/office/powerpoint/2010/main" val="528165026"/>
       </p:ext>
     </p:extLst>
   </p:cSld>
@@ -2675,7 +2379,7 @@
 </file>
 
 <file path=ppt/notesSlides/notesSlide20.xml><?xml version="1.0" encoding="utf-8"?>
-<p:notes xmlns:a="http://schemas.openxmlformats.org/drawingml/2006/main" xmlns:r="http://schemas.openxmlformats.org/officeDocument/2006/relationships" xmlns:mc="http://schemas.openxmlformats.org/markup-compatibility/2006" xmlns:mv="urn:schemas-microsoft-com:mac:vml" xmlns:p="http://schemas.openxmlformats.org/presentationml/2006/main" mc:Ignorable="mv" mc:PreserveAttributes="mv:*">
+<p:notes xmlns:a="http://schemas.openxmlformats.org/drawingml/2006/main" xmlns:r="http://schemas.openxmlformats.org/officeDocument/2006/relationships" xmlns:p="http://schemas.openxmlformats.org/presentationml/2006/main">
   <p:cSld>
     <p:spTree>
       <p:nvGrpSpPr>
@@ -2765,7 +2469,7 @@
 </file>
 
 <file path=ppt/notesSlides/notesSlide21.xml><?xml version="1.0" encoding="utf-8"?>
-<p:notes xmlns:a="http://schemas.openxmlformats.org/drawingml/2006/main" xmlns:r="http://schemas.openxmlformats.org/officeDocument/2006/relationships" xmlns:mc="http://schemas.openxmlformats.org/markup-compatibility/2006" xmlns:mv="urn:schemas-microsoft-com:mac:vml" xmlns:p="http://schemas.openxmlformats.org/presentationml/2006/main" mc:Ignorable="mv" mc:PreserveAttributes="mv:*">
+<p:notes xmlns:a="http://schemas.openxmlformats.org/drawingml/2006/main" xmlns:r="http://schemas.openxmlformats.org/officeDocument/2006/relationships" xmlns:p="http://schemas.openxmlformats.org/presentationml/2006/main">
   <p:cSld>
     <p:spTree>
       <p:nvGrpSpPr>
@@ -2810,13 +2514,8 @@
           <a:p>
             <a:r>
               <a:rPr lang="en-US" baseline="0" dirty="0" smtClean="0"/>
-              <a:t>The easiest thing to parallelize is when you have a bunch of separate input files to do the same thing to and it takes a while to do it.  But that said, you can also split up a single input file if you’re running tasks over individual things in that input file.  For example, and I’ll show this in a minute with blast, you might be doing something to every sequence in </a:t>
-            </a:r>
-            <a:r>
-              <a:rPr lang="en-US" baseline="0" dirty="0" smtClean="0"/>
-              <a:t>a single file.</a:t>
-            </a:r>
-            <a:endParaRPr lang="en-US" baseline="0" dirty="0" smtClean="0"/>
+              <a:t>The easiest thing to parallelize is when you have a bunch of separate input files to do the same thing to and it takes a while to do it.  But that said, you can also split up a single input file if you’re running tasks over individual things in that input file.  For example, and I’ll show this in a minute with blast, you might be doing something to every sequence in a single file.</a:t>
+            </a:r>
           </a:p>
           <a:p>
             <a:endParaRPr lang="en-US" baseline="0" dirty="0" smtClean="0"/>
@@ -2893,7 +2592,7 @@
     </p:spTree>
     <p:extLst>
       <p:ext uri="{BB962C8B-B14F-4D97-AF65-F5344CB8AC3E}">
-        <p14:creationId xmlns:p14="http://schemas.microsoft.com/office/powerpoint/2010/main" xmlns:p="http://schemas.openxmlformats.org/presentationml/2006/main" xmlns:r="http://schemas.openxmlformats.org/officeDocument/2006/relationships" xmlns:a="http://schemas.openxmlformats.org/drawingml/2006/main" xmlns="" val="1357787156"/>
+        <p14:creationId xmlns:p14="http://schemas.microsoft.com/office/powerpoint/2010/main" val="1357787156"/>
       </p:ext>
     </p:extLst>
   </p:cSld>
@@ -2904,7 +2603,7 @@
 </file>
 
 <file path=ppt/notesSlides/notesSlide22.xml><?xml version="1.0" encoding="utf-8"?>
-<p:notes xmlns:a="http://schemas.openxmlformats.org/drawingml/2006/main" xmlns:r="http://schemas.openxmlformats.org/officeDocument/2006/relationships" xmlns:mc="http://schemas.openxmlformats.org/markup-compatibility/2006" xmlns:mv="urn:schemas-microsoft-com:mac:vml" xmlns:p="http://schemas.openxmlformats.org/presentationml/2006/main" mc:Ignorable="mv" mc:PreserveAttributes="mv:*">
+<p:notes xmlns:a="http://schemas.openxmlformats.org/drawingml/2006/main" xmlns:r="http://schemas.openxmlformats.org/officeDocument/2006/relationships" xmlns:p="http://schemas.openxmlformats.org/presentationml/2006/main">
   <p:cSld>
     <p:spTree>
       <p:nvGrpSpPr>
@@ -2974,13 +2673,8 @@
             </a:r>
             <a:r>
               <a:rPr lang="en-US" baseline="0" dirty="0" smtClean="0"/>
-              <a:t> will pay back </a:t>
-            </a:r>
-            <a:r>
-              <a:rPr lang="en-US" baseline="0" dirty="0" smtClean="0"/>
-              <a:t>again, because make can parallelize your workflow for you.</a:t>
-            </a:r>
-            <a:endParaRPr lang="en-US" baseline="0" dirty="0" smtClean="0"/>
+              <a:t> will pay back again, because make can parallelize your workflow for you.</a:t>
+            </a:r>
           </a:p>
         </p:txBody>
       </p:sp>
@@ -3011,7 +2705,7 @@
     </p:spTree>
     <p:extLst>
       <p:ext uri="{BB962C8B-B14F-4D97-AF65-F5344CB8AC3E}">
-        <p14:creationId xmlns:p14="http://schemas.microsoft.com/office/powerpoint/2010/main" xmlns:p="http://schemas.openxmlformats.org/presentationml/2006/main" xmlns:r="http://schemas.openxmlformats.org/officeDocument/2006/relationships" xmlns:a="http://schemas.openxmlformats.org/drawingml/2006/main" xmlns="" val="2586950902"/>
+        <p14:creationId xmlns:p14="http://schemas.microsoft.com/office/powerpoint/2010/main" val="2586950902"/>
       </p:ext>
     </p:extLst>
   </p:cSld>
@@ -3022,7 +2716,7 @@
 </file>
 
 <file path=ppt/notesSlides/notesSlide23.xml><?xml version="1.0" encoding="utf-8"?>
-<p:notes xmlns:a="http://schemas.openxmlformats.org/drawingml/2006/main" xmlns:r="http://schemas.openxmlformats.org/officeDocument/2006/relationships" xmlns:mc="http://schemas.openxmlformats.org/markup-compatibility/2006" xmlns:mv="urn:schemas-microsoft-com:mac:vml" xmlns:p="http://schemas.openxmlformats.org/presentationml/2006/main" mc:Ignorable="mv" mc:PreserveAttributes="mv:*">
+<p:notes xmlns:a="http://schemas.openxmlformats.org/drawingml/2006/main" xmlns:r="http://schemas.openxmlformats.org/officeDocument/2006/relationships" xmlns:p="http://schemas.openxmlformats.org/presentationml/2006/main">
   <p:cSld>
     <p:spTree>
       <p:nvGrpSpPr>
@@ -3067,11 +2761,7 @@
           <a:p>
             <a:r>
               <a:rPr lang="en-US" dirty="0" smtClean="0"/>
-              <a:t>Given two </a:t>
-            </a:r>
-            <a:r>
-              <a:rPr lang="en-US" dirty="0" smtClean="0"/>
-              <a:t>files, </a:t>
+              <a:t>Given two files, </a:t>
             </a:r>
             <a:r>
               <a:rPr lang="en-US" dirty="0" err="1" smtClean="0"/>
@@ -3087,19 +2777,11 @@
             </a:r>
             <a:r>
               <a:rPr lang="en-US" dirty="0" smtClean="0"/>
-              <a:t>, </a:t>
-            </a:r>
-            <a:r>
-              <a:rPr lang="en-US" dirty="0" smtClean="0"/>
-              <a:t>you’d get</a:t>
+              <a:t>, you’d get</a:t>
             </a:r>
             <a:r>
               <a:rPr lang="en-US" baseline="0" dirty="0" smtClean="0"/>
-              <a:t> amino acid frequencies like this.  The second make example does the same </a:t>
-            </a:r>
-            <a:r>
-              <a:rPr lang="en-US" baseline="0" dirty="0" smtClean="0"/>
-              <a:t>thing, just using a shorter combination syntax.</a:t>
+              <a:t> amino acid frequencies like this.  The second make example does the same thing, just using a shorter combination syntax.</a:t>
             </a:r>
           </a:p>
         </p:txBody>
@@ -3131,7 +2813,7 @@
     </p:spTree>
     <p:extLst>
       <p:ext uri="{BB962C8B-B14F-4D97-AF65-F5344CB8AC3E}">
-        <p14:creationId xmlns:p14="http://schemas.microsoft.com/office/powerpoint/2010/main" xmlns:p="http://schemas.openxmlformats.org/presentationml/2006/main" xmlns:r="http://schemas.openxmlformats.org/officeDocument/2006/relationships" xmlns:a="http://schemas.openxmlformats.org/drawingml/2006/main" xmlns="" val="3368468736"/>
+        <p14:creationId xmlns:p14="http://schemas.microsoft.com/office/powerpoint/2010/main" val="3368468736"/>
       </p:ext>
     </p:extLst>
   </p:cSld>
@@ -3142,7 +2824,7 @@
 </file>
 
 <file path=ppt/notesSlides/notesSlide24.xml><?xml version="1.0" encoding="utf-8"?>
-<p:notes xmlns:a="http://schemas.openxmlformats.org/drawingml/2006/main" xmlns:r="http://schemas.openxmlformats.org/officeDocument/2006/relationships" xmlns:mc="http://schemas.openxmlformats.org/markup-compatibility/2006" xmlns:mv="urn:schemas-microsoft-com:mac:vml" xmlns:p="http://schemas.openxmlformats.org/presentationml/2006/main" mc:Ignorable="mv" mc:PreserveAttributes="mv:*">
+<p:notes xmlns:a="http://schemas.openxmlformats.org/drawingml/2006/main" xmlns:r="http://schemas.openxmlformats.org/officeDocument/2006/relationships" xmlns:p="http://schemas.openxmlformats.org/presentationml/2006/main">
   <p:cSld>
     <p:spTree>
       <p:nvGrpSpPr>
@@ -3216,7 +2898,7 @@
     </p:spTree>
     <p:extLst>
       <p:ext uri="{BB962C8B-B14F-4D97-AF65-F5344CB8AC3E}">
-        <p14:creationId xmlns:p14="http://schemas.microsoft.com/office/powerpoint/2010/main" xmlns:p="http://schemas.openxmlformats.org/presentationml/2006/main" xmlns:r="http://schemas.openxmlformats.org/officeDocument/2006/relationships" xmlns:a="http://schemas.openxmlformats.org/drawingml/2006/main" xmlns="" val="3368468736"/>
+        <p14:creationId xmlns:p14="http://schemas.microsoft.com/office/powerpoint/2010/main" val="3368468736"/>
       </p:ext>
     </p:extLst>
   </p:cSld>
@@ -3227,7 +2909,7 @@
 </file>
 
 <file path=ppt/notesSlides/notesSlide25.xml><?xml version="1.0" encoding="utf-8"?>
-<p:notes xmlns:a="http://schemas.openxmlformats.org/drawingml/2006/main" xmlns:r="http://schemas.openxmlformats.org/officeDocument/2006/relationships" xmlns:mc="http://schemas.openxmlformats.org/markup-compatibility/2006" xmlns:mv="urn:schemas-microsoft-com:mac:vml" xmlns:p="http://schemas.openxmlformats.org/presentationml/2006/main" mc:Ignorable="mv" mc:PreserveAttributes="mv:*">
+<p:notes xmlns:a="http://schemas.openxmlformats.org/drawingml/2006/main" xmlns:r="http://schemas.openxmlformats.org/officeDocument/2006/relationships" xmlns:p="http://schemas.openxmlformats.org/presentationml/2006/main">
   <p:cSld>
     <p:spTree>
       <p:nvGrpSpPr>
@@ -3272,15 +2954,7 @@
           <a:p>
             <a:r>
               <a:rPr lang="en-US" baseline="0" dirty="0" smtClean="0"/>
-              <a:t>Maybe you’d do something like </a:t>
-            </a:r>
-            <a:r>
-              <a:rPr lang="en-US" baseline="0" dirty="0" smtClean="0"/>
-              <a:t>this, listing out all the patient ids.  </a:t>
-            </a:r>
-            <a:r>
-              <a:rPr lang="en-US" baseline="0" dirty="0" smtClean="0"/>
-              <a:t>Make is going to process those one after the other though, and that’ll take a while.  Probably not too long for our simple example, but consider if the alignments were large or you were doing a more computationally intensively task.</a:t>
+              <a:t>Maybe you’d do something like this, listing out all the patient ids.  Make is going to process those one after the other though, and that’ll take a while.  Probably not too long for our simple example, but consider if the alignments were large or you were doing a more computationally intensively task.</a:t>
             </a:r>
           </a:p>
           <a:p>
@@ -3329,7 +3003,7 @@
     </p:spTree>
     <p:extLst>
       <p:ext uri="{BB962C8B-B14F-4D97-AF65-F5344CB8AC3E}">
-        <p14:creationId xmlns:p14="http://schemas.microsoft.com/office/powerpoint/2010/main" xmlns:p="http://schemas.openxmlformats.org/presentationml/2006/main" xmlns:r="http://schemas.openxmlformats.org/officeDocument/2006/relationships" xmlns:a="http://schemas.openxmlformats.org/drawingml/2006/main" xmlns="" val="3368468736"/>
+        <p14:creationId xmlns:p14="http://schemas.microsoft.com/office/powerpoint/2010/main" val="3368468736"/>
       </p:ext>
     </p:extLst>
   </p:cSld>
@@ -3340,7 +3014,7 @@
 </file>
 
 <file path=ppt/notesSlides/notesSlide26.xml><?xml version="1.0" encoding="utf-8"?>
-<p:notes xmlns:a="http://schemas.openxmlformats.org/drawingml/2006/main" xmlns:r="http://schemas.openxmlformats.org/officeDocument/2006/relationships" xmlns:mc="http://schemas.openxmlformats.org/markup-compatibility/2006" xmlns:mv="urn:schemas-microsoft-com:mac:vml" xmlns:p="http://schemas.openxmlformats.org/presentationml/2006/main" mc:Ignorable="mv" mc:PreserveAttributes="mv:*">
+<p:notes xmlns:a="http://schemas.openxmlformats.org/drawingml/2006/main" xmlns:r="http://schemas.openxmlformats.org/officeDocument/2006/relationships" xmlns:p="http://schemas.openxmlformats.org/presentationml/2006/main">
   <p:cSld>
     <p:spTree>
       <p:nvGrpSpPr>
@@ -3449,11 +3123,7 @@
             </a:pPr>
             <a:r>
               <a:rPr lang="en-US" baseline="0" dirty="0" smtClean="0"/>
-              <a:t>And… it’s </a:t>
-            </a:r>
-            <a:r>
-              <a:rPr lang="en-US" baseline="0" dirty="0" smtClean="0"/>
-              <a:t>really that easy if you have a </a:t>
+              <a:t>And… it’s really that easy if you have a </a:t>
             </a:r>
             <a:r>
               <a:rPr lang="en-US" baseline="0" dirty="0" err="1" smtClean="0"/>
@@ -3461,15 +3131,7 @@
             </a:r>
             <a:r>
               <a:rPr lang="en-US" baseline="0" dirty="0" smtClean="0"/>
-              <a:t>.  It’s one </a:t>
-            </a:r>
-            <a:r>
-              <a:rPr lang="en-US" baseline="0" dirty="0" smtClean="0"/>
-              <a:t>of the benefits of describing your workflows with make.  Like any software, of course, it’s possible for it to break if you missed a prerequisite input file for a recipe.  If you’re running individual steps by hand, you might not notice until you try to run them in parallel because previously the file from recipe 1 always happened to exist before you ran recipe 2</a:t>
-            </a:r>
-            <a:r>
-              <a:rPr lang="en-US" baseline="0" dirty="0" smtClean="0"/>
-              <a:t>.  If you didn’t tell make that, however, it might run recipe 2 before recipe 1 when running in parallel.</a:t>
+              <a:t>.  It’s one of the benefits of describing your workflows with make.  Like any software, of course, it’s possible for it to break if you missed a prerequisite input file for a recipe.  If you’re running individual steps by hand, you might not notice until you try to run them in parallel because previously the file from recipe 1 always happened to exist before you ran recipe 2.  If you didn’t tell make that, however, it might run recipe 2 before recipe 1 when running in parallel.</a:t>
             </a:r>
           </a:p>
           <a:p>
@@ -3552,7 +3214,7 @@
     </p:spTree>
     <p:extLst>
       <p:ext uri="{BB962C8B-B14F-4D97-AF65-F5344CB8AC3E}">
-        <p14:creationId xmlns:p14="http://schemas.microsoft.com/office/powerpoint/2010/main" xmlns:p="http://schemas.openxmlformats.org/presentationml/2006/main" xmlns:r="http://schemas.openxmlformats.org/officeDocument/2006/relationships" xmlns:a="http://schemas.openxmlformats.org/drawingml/2006/main" xmlns="" val="3368468736"/>
+        <p14:creationId xmlns:p14="http://schemas.microsoft.com/office/powerpoint/2010/main" val="3368468736"/>
       </p:ext>
     </p:extLst>
   </p:cSld>
@@ -3563,7 +3225,7 @@
 </file>
 
 <file path=ppt/notesSlides/notesSlide27.xml><?xml version="1.0" encoding="utf-8"?>
-<p:notes xmlns:a="http://schemas.openxmlformats.org/drawingml/2006/main" xmlns:r="http://schemas.openxmlformats.org/officeDocument/2006/relationships" xmlns:mc="http://schemas.openxmlformats.org/markup-compatibility/2006" xmlns:mv="urn:schemas-microsoft-com:mac:vml" xmlns:p="http://schemas.openxmlformats.org/presentationml/2006/main" mc:Ignorable="mv" mc:PreserveAttributes="mv:*">
+<p:notes xmlns:a="http://schemas.openxmlformats.org/drawingml/2006/main" xmlns:r="http://schemas.openxmlformats.org/officeDocument/2006/relationships" xmlns:p="http://schemas.openxmlformats.org/presentationml/2006/main">
   <p:cSld>
     <p:spTree>
       <p:nvGrpSpPr>
@@ -3616,11 +3278,7 @@
             </a:r>
             <a:r>
               <a:rPr lang="en-US" baseline="0" dirty="0" smtClean="0"/>
-              <a:t> on Mac or Linux</a:t>
-            </a:r>
-            <a:r>
-              <a:rPr lang="en-US" baseline="0" dirty="0" smtClean="0"/>
-              <a:t>.  The Mac example is from my desktop and the Linux example is from </a:t>
+              <a:t> on Mac or Linux.  The Mac example is from my desktop and the Linux example is from </a:t>
             </a:r>
             <a:r>
               <a:rPr lang="en-US" baseline="0" dirty="0" err="1" smtClean="0"/>
@@ -3637,11 +3295,7 @@
           <a:p>
             <a:r>
               <a:rPr lang="en-US" baseline="0" dirty="0" smtClean="0"/>
-              <a:t>On Linux, each “socket” is a physical CPU, so multiply Cores per socket by the number of Sockets to get the total number of cores</a:t>
-            </a:r>
-            <a:r>
-              <a:rPr lang="en-US" baseline="0" dirty="0" smtClean="0"/>
-              <a:t>.</a:t>
+              <a:t>On Linux, each “socket” is a physical CPU, so multiply Cores per socket by the number of Sockets to get the total number of cores.</a:t>
             </a:r>
           </a:p>
         </p:txBody>
@@ -3673,7 +3327,7 @@
     </p:spTree>
     <p:extLst>
       <p:ext uri="{BB962C8B-B14F-4D97-AF65-F5344CB8AC3E}">
-        <p14:creationId xmlns:p14="http://schemas.microsoft.com/office/powerpoint/2010/main" xmlns:p="http://schemas.openxmlformats.org/presentationml/2006/main" xmlns:r="http://schemas.openxmlformats.org/officeDocument/2006/relationships" xmlns:a="http://schemas.openxmlformats.org/drawingml/2006/main" xmlns="" val="275358108"/>
+        <p14:creationId xmlns:p14="http://schemas.microsoft.com/office/powerpoint/2010/main" val="275358108"/>
       </p:ext>
     </p:extLst>
   </p:cSld>
@@ -3684,7 +3338,7 @@
 </file>
 
 <file path=ppt/notesSlides/notesSlide28.xml><?xml version="1.0" encoding="utf-8"?>
-<p:notes xmlns:a="http://schemas.openxmlformats.org/drawingml/2006/main" xmlns:r="http://schemas.openxmlformats.org/officeDocument/2006/relationships" xmlns:mc="http://schemas.openxmlformats.org/markup-compatibility/2006" xmlns:mv="urn:schemas-microsoft-com:mac:vml" xmlns:p="http://schemas.openxmlformats.org/presentationml/2006/main" mc:Ignorable="mv" mc:PreserveAttributes="mv:*">
+<p:notes xmlns:a="http://schemas.openxmlformats.org/drawingml/2006/main" xmlns:r="http://schemas.openxmlformats.org/officeDocument/2006/relationships" xmlns:p="http://schemas.openxmlformats.org/presentationml/2006/main">
   <p:cSld>
     <p:spTree>
       <p:nvGrpSpPr>
@@ -3791,7 +3445,7 @@
 </file>
 
 <file path=ppt/notesSlides/notesSlide29.xml><?xml version="1.0" encoding="utf-8"?>
-<p:notes xmlns:a="http://schemas.openxmlformats.org/drawingml/2006/main" xmlns:r="http://schemas.openxmlformats.org/officeDocument/2006/relationships" xmlns:mc="http://schemas.openxmlformats.org/markup-compatibility/2006" xmlns:mv="urn:schemas-microsoft-com:mac:vml" xmlns:p="http://schemas.openxmlformats.org/presentationml/2006/main" mc:Ignorable="mv" mc:PreserveAttributes="mv:*">
+<p:notes xmlns:a="http://schemas.openxmlformats.org/drawingml/2006/main" xmlns:r="http://schemas.openxmlformats.org/officeDocument/2006/relationships" xmlns:p="http://schemas.openxmlformats.org/presentationml/2006/main">
   <p:cSld>
     <p:spTree>
       <p:nvGrpSpPr>
@@ -3844,11 +3498,7 @@
             </a:r>
             <a:r>
               <a:rPr lang="en-US" baseline="0" dirty="0" smtClean="0"/>
-              <a:t>, but you don’t want to.  You may know about using an ampersand to run</a:t>
-            </a:r>
-            <a:r>
-              <a:rPr lang="en-US" baseline="0" dirty="0" smtClean="0"/>
-              <a:t> </a:t>
+              <a:t>, but you don’t want to.  You may know about using an ampersand to run </a:t>
             </a:r>
             <a:r>
               <a:rPr lang="en-US" baseline="0" dirty="0" err="1" smtClean="0"/>
@@ -3856,17 +3506,8 @@
             </a:r>
             <a:r>
               <a:rPr lang="en-US" baseline="0" dirty="0" smtClean="0"/>
-              <a:t> in </a:t>
-            </a:r>
-            <a:r>
-              <a:rPr lang="en-US" baseline="0" dirty="0" smtClean="0"/>
-              <a:t>the background which makes the loop complete quickly, and then you wait around for all the .new files to pop into existence.  That’s fine for a handful of files, but if you have more than a couple dozen files, you’ll bog down the computer with too many jobs</a:t>
-            </a:r>
-            <a:r>
-              <a:rPr lang="en-US" baseline="0" dirty="0" smtClean="0"/>
-              <a:t>.  And if something goes wrong, you may have runaway processes chewing up time.</a:t>
-            </a:r>
-            <a:endParaRPr lang="en-US" baseline="0" dirty="0" smtClean="0"/>
+              <a:t> in the background which makes the loop complete quickly, and then you wait around for all the .new files to pop into existence.  That’s fine for a handful of files, but if you have more than a couple dozen files, you’ll bog down the computer with too many jobs.  And if something goes wrong, you may have runaway processes chewing up time.</a:t>
+            </a:r>
           </a:p>
         </p:txBody>
       </p:sp>
@@ -3897,7 +3538,7 @@
     </p:spTree>
     <p:extLst>
       <p:ext uri="{BB962C8B-B14F-4D97-AF65-F5344CB8AC3E}">
-        <p14:creationId xmlns:p14="http://schemas.microsoft.com/office/powerpoint/2010/main" xmlns:p="http://schemas.openxmlformats.org/presentationml/2006/main" xmlns:r="http://schemas.openxmlformats.org/officeDocument/2006/relationships" xmlns:a="http://schemas.openxmlformats.org/drawingml/2006/main" xmlns="" val="1357787156"/>
+        <p14:creationId xmlns:p14="http://schemas.microsoft.com/office/powerpoint/2010/main" val="1357787156"/>
       </p:ext>
     </p:extLst>
   </p:cSld>
@@ -3908,7 +3549,7 @@
 </file>
 
 <file path=ppt/notesSlides/notesSlide3.xml><?xml version="1.0" encoding="utf-8"?>
-<p:notes xmlns:a="http://schemas.openxmlformats.org/drawingml/2006/main" xmlns:r="http://schemas.openxmlformats.org/officeDocument/2006/relationships" xmlns:mc="http://schemas.openxmlformats.org/markup-compatibility/2006" xmlns:mv="urn:schemas-microsoft-com:mac:vml" xmlns:p="http://schemas.openxmlformats.org/presentationml/2006/main" mc:Ignorable="mv" mc:PreserveAttributes="mv:*">
+<p:notes xmlns:a="http://schemas.openxmlformats.org/drawingml/2006/main" xmlns:r="http://schemas.openxmlformats.org/officeDocument/2006/relationships" xmlns:p="http://schemas.openxmlformats.org/presentationml/2006/main">
   <p:cSld>
     <p:spTree>
       <p:nvGrpSpPr>
@@ -3962,11 +3603,16 @@
           <a:p>
             <a:r>
               <a:rPr lang="en-US" baseline="0" dirty="0" smtClean="0"/>
-              <a:t>Workflows should be reproducible.  Reproducible </a:t>
-            </a:r>
+              <a:t>Workflows should be reproducible.  Reproducible doesn’t just mean people in other labs.  It means people in your lab and even you, a few months or few years later.</a:t>
+            </a:r>
+          </a:p>
+          <a:p>
+            <a:endParaRPr lang="en-US" baseline="0" dirty="0" smtClean="0"/>
+          </a:p>
+          <a:p>
             <a:r>
               <a:rPr lang="en-US" baseline="0" dirty="0" smtClean="0"/>
-              <a:t>doesn’t just mean people in other labs.  It means people in your lab and even you, a few months or few years later.</a:t>
+              <a:t>Workflows should be documented.  Documentation includes software versions, source code, data input/output, and more, but the steps you took to process and analyze the data is the huge one.</a:t>
             </a:r>
           </a:p>
           <a:p>
@@ -3975,50 +3621,8 @@
           <a:p>
             <a:r>
               <a:rPr lang="en-US" baseline="0" dirty="0" smtClean="0"/>
-              <a:t>Workflows should be documented.  Documentation includes </a:t>
-            </a:r>
-            <a:r>
-              <a:rPr lang="en-US" baseline="0" dirty="0" smtClean="0"/>
-              <a:t>software versions,</a:t>
-            </a:r>
-            <a:r>
-              <a:rPr lang="en-US" baseline="0" dirty="0" smtClean="0"/>
-              <a:t> source code, </a:t>
-            </a:r>
-            <a:r>
-              <a:rPr lang="en-US" baseline="0" dirty="0" smtClean="0"/>
-              <a:t>data input/output, and more, but the steps you took to process and analyze the data is</a:t>
-            </a:r>
-            <a:r>
-              <a:rPr lang="en-US" baseline="0" dirty="0" smtClean="0"/>
-              <a:t> the </a:t>
-            </a:r>
-            <a:r>
-              <a:rPr lang="en-US" baseline="0" dirty="0" smtClean="0"/>
-              <a:t>huge one.</a:t>
-            </a:r>
-          </a:p>
-          <a:p>
-            <a:endParaRPr lang="en-US" baseline="0" dirty="0" smtClean="0"/>
-          </a:p>
-          <a:p>
-            <a:r>
-              <a:rPr lang="en-US" baseline="0" dirty="0" smtClean="0"/>
-              <a:t>If all of those hold about your workflow, then you’d also like it to be easy and fast rather than tedious and slow.  Not only do you not</a:t>
-            </a:r>
-            <a:r>
-              <a:rPr lang="en-US" baseline="0" dirty="0" smtClean="0"/>
-              <a:t> spend </a:t>
-            </a:r>
-            <a:r>
-              <a:rPr lang="en-US" baseline="0" dirty="0" smtClean="0"/>
-              <a:t>needless time waiting, but there are tangible benefits in terms of thinking critically about a problem when you can iterate quickly trying out new ideas or fixing problems in the analysis.  If it takes you 8 hours to run an analysis, fixing problems is frustrating and you’re afraid to make changes and try new </a:t>
-            </a:r>
-            <a:r>
-              <a:rPr lang="en-US" baseline="0" dirty="0" smtClean="0"/>
-              <a:t>things and experiment with different approaches to solving your problems.</a:t>
-            </a:r>
-            <a:endParaRPr lang="en-US" baseline="0" dirty="0" smtClean="0"/>
+              <a:t>If all of those hold about your workflow, then you’d also like it to be easy and fast rather than tedious and slow.  Not only do you not spend needless time waiting, but there are tangible benefits in terms of thinking critically about a problem when you can iterate quickly trying out new ideas or fixing problems in the analysis.  If it takes you 8 hours to run an analysis, fixing problems is frustrating and you’re afraid to make changes and try new things and experiment with different approaches to solving your problems.</a:t>
+            </a:r>
           </a:p>
         </p:txBody>
       </p:sp>
@@ -4049,7 +3653,7 @@
     </p:spTree>
     <p:extLst>
       <p:ext uri="{BB962C8B-B14F-4D97-AF65-F5344CB8AC3E}">
-        <p14:creationId xmlns:p14="http://schemas.microsoft.com/office/powerpoint/2010/main" xmlns:p="http://schemas.openxmlformats.org/presentationml/2006/main" xmlns:r="http://schemas.openxmlformats.org/officeDocument/2006/relationships" xmlns:a="http://schemas.openxmlformats.org/drawingml/2006/main" xmlns="" val="528165026"/>
+        <p14:creationId xmlns:p14="http://schemas.microsoft.com/office/powerpoint/2010/main" val="528165026"/>
       </p:ext>
     </p:extLst>
   </p:cSld>
@@ -4060,7 +3664,7 @@
 </file>
 
 <file path=ppt/notesSlides/notesSlide30.xml><?xml version="1.0" encoding="utf-8"?>
-<p:notes xmlns:a="http://schemas.openxmlformats.org/drawingml/2006/main" xmlns:r="http://schemas.openxmlformats.org/officeDocument/2006/relationships" xmlns:mc="http://schemas.openxmlformats.org/markup-compatibility/2006" xmlns:mv="urn:schemas-microsoft-com:mac:vml" xmlns:p="http://schemas.openxmlformats.org/presentationml/2006/main" mc:Ignorable="mv" mc:PreserveAttributes="mv:*">
+<p:notes xmlns:a="http://schemas.openxmlformats.org/drawingml/2006/main" xmlns:r="http://schemas.openxmlformats.org/officeDocument/2006/relationships" xmlns:p="http://schemas.openxmlformats.org/presentationml/2006/main">
   <p:cSld>
     <p:spTree>
       <p:nvGrpSpPr>
@@ -4105,57 +3709,25 @@
           <a:p>
             <a:r>
               <a:rPr lang="en-US" baseline="0" dirty="0" smtClean="0"/>
-              <a:t>Enter a tool called “parallel”.  It helps you run other programs in parallel and does a lot to handle input and output to each job.  It’s the Leatherman of command-line parallel processing.  I’d compare it to a Swiss Army knife, but </a:t>
-            </a:r>
+              <a:t>Enter a tool called “parallel”.  It helps you run other programs in parallel and does a lot to handle input and output to each job.  It’s the Leatherman of command-line parallel processing.  I’d compare it to a Swiss Army knife, but that’s really not fair to the knife.</a:t>
+            </a:r>
+          </a:p>
+          <a:p>
+            <a:endParaRPr lang="en-US" baseline="0" dirty="0" smtClean="0"/>
+          </a:p>
+          <a:p>
             <a:r>
               <a:rPr lang="en-US" baseline="0" dirty="0" smtClean="0"/>
-              <a:t>that’s really </a:t>
-            </a:r>
+              <a:t>In it’s most basic form, parallel just replaces your loops.  In more complicated forms, it can split up your input and rejoin the output back together.</a:t>
+            </a:r>
+          </a:p>
+          <a:p>
+            <a:endParaRPr lang="en-US" baseline="0" dirty="0" smtClean="0"/>
+          </a:p>
+          <a:p>
             <a:r>
               <a:rPr lang="en-US" baseline="0" dirty="0" smtClean="0"/>
-              <a:t>not fair to</a:t>
-            </a:r>
-            <a:r>
-              <a:rPr lang="en-US" baseline="0" dirty="0" smtClean="0"/>
-              <a:t> the knife.</a:t>
-            </a:r>
-          </a:p>
-          <a:p>
-            <a:endParaRPr lang="en-US" baseline="0" dirty="0" smtClean="0"/>
-          </a:p>
-          <a:p>
-            <a:r>
-              <a:rPr lang="en-US" baseline="0" dirty="0" smtClean="0"/>
-              <a:t>In it’s most basic form, parallel</a:t>
-            </a:r>
-            <a:r>
-              <a:rPr lang="en-US" baseline="0" dirty="0" smtClean="0"/>
-              <a:t> just replaces </a:t>
-            </a:r>
-            <a:r>
-              <a:rPr lang="en-US" baseline="0" dirty="0" smtClean="0"/>
-              <a:t>your loops.  In more complicated forms, it can split up your input and rejoin the output back together.</a:t>
-            </a:r>
-          </a:p>
-          <a:p>
-            <a:endParaRPr lang="en-US" baseline="0" dirty="0" smtClean="0"/>
-          </a:p>
-          <a:p>
-            <a:r>
-              <a:rPr lang="en-US" baseline="0" dirty="0" smtClean="0"/>
-              <a:t>Like make, it also has a -j option, but by default it will use as many jobs as the computer has cores. </a:t>
-            </a:r>
-            <a:r>
-              <a:rPr lang="en-US" baseline="0" dirty="0" smtClean="0"/>
-              <a:t> That’s handy</a:t>
-            </a:r>
-            <a:r>
-              <a:rPr lang="en-US" baseline="0" dirty="0" smtClean="0"/>
-              <a:t>!  You can run the same command on your desktop as the server and it’ll just magically go faster on the server without thinking about the number of </a:t>
-            </a:r>
-            <a:r>
-              <a:rPr lang="en-US" baseline="0" dirty="0" smtClean="0"/>
-              <a:t>cores involved.</a:t>
+              <a:t>Like make, it also has a -j option, but by default it will use as many jobs as the computer has cores.  That’s handy!  You can run the same command on your desktop as the server and it’ll just magically go faster on the server without thinking about the number of cores involved.</a:t>
             </a:r>
           </a:p>
           <a:p>
@@ -4202,7 +3774,7 @@
     </p:spTree>
     <p:extLst>
       <p:ext uri="{BB962C8B-B14F-4D97-AF65-F5344CB8AC3E}">
-        <p14:creationId xmlns:p14="http://schemas.microsoft.com/office/powerpoint/2010/main" xmlns:p="http://schemas.openxmlformats.org/presentationml/2006/main" xmlns:r="http://schemas.openxmlformats.org/officeDocument/2006/relationships" xmlns:a="http://schemas.openxmlformats.org/drawingml/2006/main" xmlns="" val="1357787156"/>
+        <p14:creationId xmlns:p14="http://schemas.microsoft.com/office/powerpoint/2010/main" val="1357787156"/>
       </p:ext>
     </p:extLst>
   </p:cSld>
@@ -4213,7 +3785,7 @@
 </file>
 
 <file path=ppt/notesSlides/notesSlide31.xml><?xml version="1.0" encoding="utf-8"?>
-<p:notes xmlns:a="http://schemas.openxmlformats.org/drawingml/2006/main" xmlns:r="http://schemas.openxmlformats.org/officeDocument/2006/relationships" xmlns:mc="http://schemas.openxmlformats.org/markup-compatibility/2006" xmlns:mv="urn:schemas-microsoft-com:mac:vml" xmlns:p="http://schemas.openxmlformats.org/presentationml/2006/main" mc:Ignorable="mv" mc:PreserveAttributes="mv:*">
+<p:notes xmlns:a="http://schemas.openxmlformats.org/drawingml/2006/main" xmlns:r="http://schemas.openxmlformats.org/officeDocument/2006/relationships" xmlns:p="http://schemas.openxmlformats.org/presentationml/2006/main">
   <p:cSld>
     <p:spTree>
       <p:nvGrpSpPr>
@@ -4262,11 +3834,7 @@
             </a:r>
             <a:r>
               <a:rPr lang="en-US" baseline="0" dirty="0" smtClean="0"/>
-              <a:t> invocation I </a:t>
-            </a:r>
-            <a:r>
-              <a:rPr lang="en-US" baseline="0" dirty="0" smtClean="0"/>
-              <a:t>put together to very efficiently run </a:t>
+              <a:t> invocation I put together to very efficiently run </a:t>
             </a:r>
             <a:r>
               <a:rPr lang="en-US" baseline="0" dirty="0" err="1" smtClean="0"/>
@@ -4355,13 +3923,8 @@
             </a:r>
             <a:r>
               <a:rPr lang="en-US" baseline="0" dirty="0" smtClean="0"/>
-              <a:t> using this command takes 3 minutes</a:t>
-            </a:r>
-            <a:r>
-              <a:rPr lang="en-US" baseline="0" dirty="0" smtClean="0"/>
-              <a:t>.  That’s a 20-fold decrease.</a:t>
-            </a:r>
-            <a:endParaRPr lang="en-US" baseline="0" dirty="0" smtClean="0"/>
+              <a:t> using this command takes 3 minutes.  That’s a 20-fold decrease.</a:t>
+            </a:r>
           </a:p>
         </p:txBody>
       </p:sp>
@@ -4392,7 +3955,7 @@
     </p:spTree>
     <p:extLst>
       <p:ext uri="{BB962C8B-B14F-4D97-AF65-F5344CB8AC3E}">
-        <p14:creationId xmlns:p14="http://schemas.microsoft.com/office/powerpoint/2010/main" xmlns:p="http://schemas.openxmlformats.org/presentationml/2006/main" xmlns:r="http://schemas.openxmlformats.org/officeDocument/2006/relationships" xmlns:a="http://schemas.openxmlformats.org/drawingml/2006/main" xmlns="" val="3904060915"/>
+        <p14:creationId xmlns:p14="http://schemas.microsoft.com/office/powerpoint/2010/main" val="3904060915"/>
       </p:ext>
     </p:extLst>
   </p:cSld>
@@ -4403,7 +3966,7 @@
 </file>
 
 <file path=ppt/notesSlides/notesSlide32.xml><?xml version="1.0" encoding="utf-8"?>
-<p:notes xmlns:a="http://schemas.openxmlformats.org/drawingml/2006/main" xmlns:r="http://schemas.openxmlformats.org/officeDocument/2006/relationships" xmlns:mc="http://schemas.openxmlformats.org/markup-compatibility/2006" xmlns:mv="urn:schemas-microsoft-com:mac:vml" xmlns:p="http://schemas.openxmlformats.org/presentationml/2006/main" mc:Ignorable="mv" mc:PreserveAttributes="mv:*">
+<p:notes xmlns:a="http://schemas.openxmlformats.org/drawingml/2006/main" xmlns:r="http://schemas.openxmlformats.org/officeDocument/2006/relationships" xmlns:p="http://schemas.openxmlformats.org/presentationml/2006/main">
   <p:cSld>
     <p:spTree>
       <p:nvGrpSpPr>
@@ -4448,15 +4011,7 @@
           <a:p>
             <a:r>
               <a:rPr lang="en-US" baseline="0" dirty="0" smtClean="0"/>
-              <a:t>The</a:t>
-            </a:r>
-            <a:r>
-              <a:rPr lang="en-US" baseline="0" dirty="0" smtClean="0"/>
-              <a:t> first thing </a:t>
-            </a:r>
-            <a:r>
-              <a:rPr lang="en-US" baseline="0" dirty="0" smtClean="0"/>
-              <a:t>I want to note is actually at the end.  The file </a:t>
+              <a:t>The first thing I want to note is actually at the end.  The file </a:t>
             </a:r>
             <a:r>
               <a:rPr lang="en-US" baseline="0" dirty="0" err="1" smtClean="0"/>
@@ -4504,7 +4059,7 @@
     </p:spTree>
     <p:extLst>
       <p:ext uri="{BB962C8B-B14F-4D97-AF65-F5344CB8AC3E}">
-        <p14:creationId xmlns:p14="http://schemas.microsoft.com/office/powerpoint/2010/main" xmlns:p="http://schemas.openxmlformats.org/presentationml/2006/main" xmlns:r="http://schemas.openxmlformats.org/officeDocument/2006/relationships" xmlns:a="http://schemas.openxmlformats.org/drawingml/2006/main" xmlns="" val="3904060915"/>
+        <p14:creationId xmlns:p14="http://schemas.microsoft.com/office/powerpoint/2010/main" val="3904060915"/>
       </p:ext>
     </p:extLst>
   </p:cSld>
@@ -4515,7 +4070,7 @@
 </file>
 
 <file path=ppt/notesSlides/notesSlide33.xml><?xml version="1.0" encoding="utf-8"?>
-<p:notes xmlns:a="http://schemas.openxmlformats.org/drawingml/2006/main" xmlns:r="http://schemas.openxmlformats.org/officeDocument/2006/relationships" xmlns:mc="http://schemas.openxmlformats.org/markup-compatibility/2006" xmlns:mv="urn:schemas-microsoft-com:mac:vml" xmlns:p="http://schemas.openxmlformats.org/presentationml/2006/main" mc:Ignorable="mv" mc:PreserveAttributes="mv:*">
+<p:notes xmlns:a="http://schemas.openxmlformats.org/drawingml/2006/main" xmlns:r="http://schemas.openxmlformats.org/officeDocument/2006/relationships" xmlns:p="http://schemas.openxmlformats.org/presentationml/2006/main">
   <p:cSld>
     <p:spTree>
       <p:nvGrpSpPr>
@@ -4560,11 +4115,7 @@
           <a:p>
             <a:r>
               <a:rPr lang="en-US" baseline="0" dirty="0" smtClean="0"/>
-              <a:t>The next thing to note is what parallel is doing with that input for each job. </a:t>
-            </a:r>
-            <a:r>
-              <a:rPr lang="en-US" baseline="0" dirty="0" smtClean="0"/>
-              <a:t> The --</a:t>
+              <a:t>The next thing to note is what parallel is doing with that input for each job.  The --</a:t>
             </a:r>
             <a:r>
               <a:rPr lang="en-US" baseline="0" dirty="0" err="1" smtClean="0"/>
@@ -4572,35 +4123,7 @@
             </a:r>
             <a:r>
               <a:rPr lang="en-US" baseline="0" dirty="0" smtClean="0"/>
-              <a:t> option </a:t>
-            </a:r>
-            <a:r>
-              <a:rPr lang="en-US" baseline="0" dirty="0" smtClean="0"/>
-              <a:t>tells parallel to split up the input into multiple “records”.  In this case, I’m telling parallel that records start with a “&gt;”, which should be familiar to you as the start of a FASTA sequence.  I’m also telling parallel </a:t>
-            </a:r>
-            <a:r>
-              <a:rPr lang="en-US" baseline="0" dirty="0" smtClean="0"/>
-              <a:t>with the </a:t>
-            </a:r>
-            <a:r>
-              <a:rPr lang="en-US" baseline="0" dirty="0" smtClean="0"/>
-              <a:t>-</a:t>
-            </a:r>
-            <a:r>
-              <a:rPr lang="en-US" baseline="0" dirty="0" smtClean="0"/>
-              <a:t>N1 option </a:t>
-            </a:r>
-            <a:r>
-              <a:rPr lang="en-US" baseline="0" dirty="0" smtClean="0"/>
-              <a:t>to only pass one record at a time to blast.  This means we’ll run one blast job for every sequence, but the number of jobs running at the same time is</a:t>
-            </a:r>
-            <a:r>
-              <a:rPr lang="en-US" baseline="0" dirty="0" smtClean="0"/>
-              <a:t> still limited </a:t>
-            </a:r>
-            <a:r>
-              <a:rPr lang="en-US" baseline="0" dirty="0" smtClean="0"/>
-              <a:t>by the number of cores.</a:t>
+              <a:t> option tells parallel to split up the input into multiple “records”.  In this case, I’m telling parallel that records start with a “&gt;”, which should be familiar to you as the start of a FASTA sequence.  I’m also telling parallel with the -N1 option to only pass one record at a time to blast.  This means we’ll run one blast job for every sequence, but the number of jobs running at the same time is still limited by the number of cores.</a:t>
             </a:r>
           </a:p>
         </p:txBody>
@@ -4632,7 +4155,7 @@
     </p:spTree>
     <p:extLst>
       <p:ext uri="{BB962C8B-B14F-4D97-AF65-F5344CB8AC3E}">
-        <p14:creationId xmlns:p14="http://schemas.microsoft.com/office/powerpoint/2010/main" xmlns:p="http://schemas.openxmlformats.org/presentationml/2006/main" xmlns:r="http://schemas.openxmlformats.org/officeDocument/2006/relationships" xmlns:a="http://schemas.openxmlformats.org/drawingml/2006/main" xmlns="" val="3904060915"/>
+        <p14:creationId xmlns:p14="http://schemas.microsoft.com/office/powerpoint/2010/main" val="3904060915"/>
       </p:ext>
     </p:extLst>
   </p:cSld>
@@ -4643,7 +4166,7 @@
 </file>
 
 <file path=ppt/notesSlides/notesSlide34.xml><?xml version="1.0" encoding="utf-8"?>
-<p:notes xmlns:a="http://schemas.openxmlformats.org/drawingml/2006/main" xmlns:r="http://schemas.openxmlformats.org/officeDocument/2006/relationships" xmlns:mc="http://schemas.openxmlformats.org/markup-compatibility/2006" xmlns:mv="urn:schemas-microsoft-com:mac:vml" xmlns:p="http://schemas.openxmlformats.org/presentationml/2006/main" mc:Ignorable="mv" mc:PreserveAttributes="mv:*">
+<p:notes xmlns:a="http://schemas.openxmlformats.org/drawingml/2006/main" xmlns:r="http://schemas.openxmlformats.org/officeDocument/2006/relationships" xmlns:p="http://schemas.openxmlformats.org/presentationml/2006/main">
   <p:cSld>
     <p:spTree>
       <p:nvGrpSpPr>
@@ -4688,31 +4211,7 @@
           <a:p>
             <a:r>
               <a:rPr lang="en-US" baseline="0" dirty="0" smtClean="0"/>
-              <a:t>Since parallel is splitting up the input file, we no longer have a filename for blast to process.  Instead, we tell parallel to pipe the query sequence to blast </a:t>
-            </a:r>
-            <a:r>
-              <a:rPr lang="en-US" baseline="0" dirty="0" smtClean="0"/>
-              <a:t>as a </a:t>
-            </a:r>
-            <a:r>
-              <a:rPr lang="en-US" baseline="0" dirty="0" smtClean="0"/>
-              <a:t>standard </a:t>
-            </a:r>
-            <a:r>
-              <a:rPr lang="en-US" baseline="0" dirty="0" smtClean="0"/>
-              <a:t>input stream.  </a:t>
-            </a:r>
-            <a:r>
-              <a:rPr lang="en-US" baseline="0" dirty="0" smtClean="0"/>
-              <a:t>And we also tell blast that the query sequences are from</a:t>
-            </a:r>
-            <a:r>
-              <a:rPr lang="en-US" baseline="0" dirty="0" smtClean="0"/>
-              <a:t> the input stream.  </a:t>
-            </a:r>
-            <a:r>
-              <a:rPr lang="en-US" baseline="0" dirty="0" smtClean="0"/>
-              <a:t>The dash in place of a filename is a Unix convention to specify “</a:t>
+              <a:t>Since parallel is splitting up the input file, we no longer have a filename for blast to process.  Instead, we tell parallel to pipe the query sequence to blast as a standard input stream.  And we also tell blast that the query sequences are from the input stream.  The dash in place of a filename is a Unix convention to specify “</a:t>
             </a:r>
             <a:r>
               <a:rPr lang="en-US" baseline="0" dirty="0" err="1" smtClean="0"/>
@@ -4752,7 +4251,7 @@
     </p:spTree>
     <p:extLst>
       <p:ext uri="{BB962C8B-B14F-4D97-AF65-F5344CB8AC3E}">
-        <p14:creationId xmlns:p14="http://schemas.microsoft.com/office/powerpoint/2010/main" xmlns:p="http://schemas.openxmlformats.org/presentationml/2006/main" xmlns:r="http://schemas.openxmlformats.org/officeDocument/2006/relationships" xmlns:a="http://schemas.openxmlformats.org/drawingml/2006/main" xmlns="" val="3904060915"/>
+        <p14:creationId xmlns:p14="http://schemas.microsoft.com/office/powerpoint/2010/main" val="3904060915"/>
       </p:ext>
     </p:extLst>
   </p:cSld>
@@ -4763,7 +4262,7 @@
 </file>
 
 <file path=ppt/notesSlides/notesSlide35.xml><?xml version="1.0" encoding="utf-8"?>
-<p:notes xmlns:a="http://schemas.openxmlformats.org/drawingml/2006/main" xmlns:r="http://schemas.openxmlformats.org/officeDocument/2006/relationships" xmlns:mc="http://schemas.openxmlformats.org/markup-compatibility/2006" xmlns:mv="urn:schemas-microsoft-com:mac:vml" xmlns:p="http://schemas.openxmlformats.org/presentationml/2006/main" mc:Ignorable="mv" mc:PreserveAttributes="mv:*">
+<p:notes xmlns:a="http://schemas.openxmlformats.org/drawingml/2006/main" xmlns:r="http://schemas.openxmlformats.org/officeDocument/2006/relationships" xmlns:p="http://schemas.openxmlformats.org/presentationml/2006/main">
   <p:cSld>
     <p:spTree>
       <p:nvGrpSpPr>
@@ -4858,19 +4357,7 @@
           <a:p>
             <a:r>
               <a:rPr lang="en-US" baseline="0" dirty="0" smtClean="0"/>
-              <a:t>When parallelizing anything, it’s </a:t>
-            </a:r>
-            <a:r>
-              <a:rPr lang="en-US" baseline="0" dirty="0" smtClean="0"/>
-              <a:t>important to choose an output format which can be joined together easily.  There are options for</a:t>
-            </a:r>
-            <a:r>
-              <a:rPr lang="en-US" baseline="0" dirty="0" smtClean="0"/>
-              <a:t> joining output </a:t>
-            </a:r>
-            <a:r>
-              <a:rPr lang="en-US" baseline="0" dirty="0" smtClean="0"/>
-              <a:t>formats that can’t just be </a:t>
+              <a:t>When parallelizing anything, it’s important to choose an output format which can be joined together easily.  There are options for joining output formats that can’t just be </a:t>
             </a:r>
             <a:r>
               <a:rPr lang="en-US" baseline="0" dirty="0" err="1" smtClean="0"/>
@@ -4878,15 +4365,7 @@
             </a:r>
             <a:r>
               <a:rPr lang="en-US" baseline="0" dirty="0" smtClean="0"/>
-              <a:t> together, but explaining those is for another day.  If </a:t>
-            </a:r>
-            <a:r>
-              <a:rPr lang="en-US" baseline="0" dirty="0" smtClean="0"/>
-              <a:t>you do </a:t>
-            </a:r>
-            <a:r>
-              <a:rPr lang="en-US" baseline="0" dirty="0" smtClean="0"/>
-              <a:t>find yourself in this boat, you can always have each blast job produce its own result file instead of joining them all together.</a:t>
+              <a:t> together, but explaining those is for another day.  If you do find yourself in this boat, you can always have each blast job produce its own result file instead of joining them all together.</a:t>
             </a:r>
           </a:p>
         </p:txBody>
@@ -4918,7 +4397,7 @@
     </p:spTree>
     <p:extLst>
       <p:ext uri="{BB962C8B-B14F-4D97-AF65-F5344CB8AC3E}">
-        <p14:creationId xmlns:p14="http://schemas.microsoft.com/office/powerpoint/2010/main" xmlns:p="http://schemas.openxmlformats.org/presentationml/2006/main" xmlns:r="http://schemas.openxmlformats.org/officeDocument/2006/relationships" xmlns:a="http://schemas.openxmlformats.org/drawingml/2006/main" xmlns="" val="3904060915"/>
+        <p14:creationId xmlns:p14="http://schemas.microsoft.com/office/powerpoint/2010/main" val="3904060915"/>
       </p:ext>
     </p:extLst>
   </p:cSld>
@@ -4929,7 +4408,7 @@
 </file>
 
 <file path=ppt/notesSlides/notesSlide36.xml><?xml version="1.0" encoding="utf-8"?>
-<p:notes xmlns:a="http://schemas.openxmlformats.org/drawingml/2006/main" xmlns:r="http://schemas.openxmlformats.org/officeDocument/2006/relationships" xmlns:mc="http://schemas.openxmlformats.org/markup-compatibility/2006" xmlns:mv="urn:schemas-microsoft-com:mac:vml" xmlns:p="http://schemas.openxmlformats.org/presentationml/2006/main" mc:Ignorable="mv" mc:PreserveAttributes="mv:*">
+<p:notes xmlns:a="http://schemas.openxmlformats.org/drawingml/2006/main" xmlns:r="http://schemas.openxmlformats.org/officeDocument/2006/relationships" xmlns:p="http://schemas.openxmlformats.org/presentationml/2006/main">
   <p:cSld>
     <p:spTree>
       <p:nvGrpSpPr>
@@ -4974,21 +4453,8 @@
           <a:p>
             <a:r>
               <a:rPr lang="en-US" baseline="0" dirty="0" smtClean="0"/>
-              <a:t>For example, you could do this to get a pairwise output </a:t>
-            </a:r>
-            <a:r>
-              <a:rPr lang="en-US" baseline="0" dirty="0" smtClean="0"/>
-              <a:t>file (format 0) </a:t>
-            </a:r>
-            <a:r>
-              <a:rPr lang="en-US" baseline="0" dirty="0" smtClean="0"/>
-              <a:t>for each blast job.  Parallel substitutes {#} for the input record number, so you’ll get as many files as you have input sequences</a:t>
-            </a:r>
-            <a:r>
-              <a:rPr lang="en-US" baseline="0" dirty="0" smtClean="0"/>
-              <a:t>.  Note that we’re no longer redirecting parallel’s output to a file.</a:t>
-            </a:r>
-            <a:endParaRPr lang="en-US" baseline="0" dirty="0" smtClean="0"/>
+              <a:t>For example, you could do this to get a pairwise output file (format 0) for each blast job.  Parallel substitutes {#} for the input record number, so you’ll get as many files as you have input sequences.  Note that we’re no longer redirecting parallel’s output to a file.</a:t>
+            </a:r>
           </a:p>
         </p:txBody>
       </p:sp>
@@ -5019,7 +4485,7 @@
     </p:spTree>
     <p:extLst>
       <p:ext uri="{BB962C8B-B14F-4D97-AF65-F5344CB8AC3E}">
-        <p14:creationId xmlns:p14="http://schemas.microsoft.com/office/powerpoint/2010/main" xmlns:p="http://schemas.openxmlformats.org/presentationml/2006/main" xmlns:r="http://schemas.openxmlformats.org/officeDocument/2006/relationships" xmlns:a="http://schemas.openxmlformats.org/drawingml/2006/main" xmlns="" val="3904060915"/>
+        <p14:creationId xmlns:p14="http://schemas.microsoft.com/office/powerpoint/2010/main" val="3904060915"/>
       </p:ext>
     </p:extLst>
   </p:cSld>
@@ -5030,7 +4496,7 @@
 </file>
 
 <file path=ppt/notesSlides/notesSlide37.xml><?xml version="1.0" encoding="utf-8"?>
-<p:notes xmlns:a="http://schemas.openxmlformats.org/drawingml/2006/main" xmlns:r="http://schemas.openxmlformats.org/officeDocument/2006/relationships" xmlns:mc="http://schemas.openxmlformats.org/markup-compatibility/2006" xmlns:mv="urn:schemas-microsoft-com:mac:vml" xmlns:p="http://schemas.openxmlformats.org/presentationml/2006/main" mc:Ignorable="mv" mc:PreserveAttributes="mv:*">
+<p:notes xmlns:a="http://schemas.openxmlformats.org/drawingml/2006/main" xmlns:r="http://schemas.openxmlformats.org/officeDocument/2006/relationships" xmlns:p="http://schemas.openxmlformats.org/presentationml/2006/main">
   <p:cSld>
     <p:spTree>
       <p:nvGrpSpPr>
@@ -5093,7 +4559,6 @@
               <a:rPr lang="en-US" baseline="0" dirty="0" smtClean="0"/>
               <a:t> you can use too.</a:t>
             </a:r>
-            <a:endParaRPr lang="en-US" baseline="0" dirty="0" smtClean="0"/>
           </a:p>
         </p:txBody>
       </p:sp>
@@ -5124,7 +4589,7 @@
     </p:spTree>
     <p:extLst>
       <p:ext uri="{BB962C8B-B14F-4D97-AF65-F5344CB8AC3E}">
-        <p14:creationId xmlns:p14="http://schemas.microsoft.com/office/powerpoint/2010/main" xmlns:p="http://schemas.openxmlformats.org/presentationml/2006/main" xmlns:r="http://schemas.openxmlformats.org/officeDocument/2006/relationships" xmlns:a="http://schemas.openxmlformats.org/drawingml/2006/main" xmlns="" val="3904060915"/>
+        <p14:creationId xmlns:p14="http://schemas.microsoft.com/office/powerpoint/2010/main" val="3904060915"/>
       </p:ext>
     </p:extLst>
   </p:cSld>
@@ -5135,7 +4600,7 @@
 </file>
 
 <file path=ppt/notesSlides/notesSlide38.xml><?xml version="1.0" encoding="utf-8"?>
-<p:notes xmlns:a="http://schemas.openxmlformats.org/drawingml/2006/main" xmlns:r="http://schemas.openxmlformats.org/officeDocument/2006/relationships" xmlns:mc="http://schemas.openxmlformats.org/markup-compatibility/2006" xmlns:mv="urn:schemas-microsoft-com:mac:vml" xmlns:p="http://schemas.openxmlformats.org/presentationml/2006/main" mc:Ignorable="mv" mc:PreserveAttributes="mv:*">
+<p:notes xmlns:a="http://schemas.openxmlformats.org/drawingml/2006/main" xmlns:r="http://schemas.openxmlformats.org/officeDocument/2006/relationships" xmlns:p="http://schemas.openxmlformats.org/presentationml/2006/main">
   <p:cSld>
     <p:spTree>
       <p:nvGrpSpPr>
@@ -5210,7 +4675,11 @@
             </a:r>
             <a:r>
               <a:rPr lang="en-US" baseline="0" dirty="0" smtClean="0"/>
-              <a:t>.  You might already have this, so try running make first.</a:t>
+              <a:t>.  You might already have this, so try running make first</a:t>
+            </a:r>
+            <a:r>
+              <a:rPr lang="en-US" baseline="0" dirty="0" smtClean="0"/>
+              <a:t>.  Newer versions of OS X may ask if you want to install it if it’s not already installed.</a:t>
             </a:r>
             <a:endParaRPr lang="en-US" dirty="0"/>
           </a:p>
@@ -5249,7 +4718,7 @@
 </file>
 
 <file path=ppt/notesSlides/notesSlide39.xml><?xml version="1.0" encoding="utf-8"?>
-<p:notes xmlns:a="http://schemas.openxmlformats.org/drawingml/2006/main" xmlns:r="http://schemas.openxmlformats.org/officeDocument/2006/relationships" xmlns:mc="http://schemas.openxmlformats.org/markup-compatibility/2006" xmlns:mv="urn:schemas-microsoft-com:mac:vml" xmlns:p="http://schemas.openxmlformats.org/presentationml/2006/main" mc:Ignorable="mv" mc:PreserveAttributes="mv:*">
+<p:notes xmlns:a="http://schemas.openxmlformats.org/drawingml/2006/main" xmlns:r="http://schemas.openxmlformats.org/officeDocument/2006/relationships" xmlns:p="http://schemas.openxmlformats.org/presentationml/2006/main">
   <p:cSld>
     <p:spTree>
       <p:nvGrpSpPr>
@@ -5308,11 +4777,7 @@
           <a:p>
             <a:r>
               <a:rPr lang="en-US" dirty="0" smtClean="0"/>
-              <a:t>The </a:t>
-            </a:r>
-            <a:r>
-              <a:rPr lang="en-US" dirty="0" smtClean="0"/>
-              <a:t>make</a:t>
+              <a:t>The make</a:t>
             </a:r>
             <a:r>
               <a:rPr lang="en-US" baseline="0" dirty="0" smtClean="0"/>
@@ -5325,23 +4790,7 @@
           <a:p>
             <a:r>
               <a:rPr lang="en-US" baseline="0" dirty="0" smtClean="0"/>
-              <a:t>The parallel tutorial is a little friendlier and better yet is chock full of examples showing how it works.  There are other substitution patterns than just</a:t>
-            </a:r>
-            <a:r>
-              <a:rPr lang="en-US" baseline="0" dirty="0" smtClean="0"/>
-              <a:t> the two I showed, </a:t>
-            </a:r>
-            <a:r>
-              <a:rPr lang="en-US" baseline="0" dirty="0" smtClean="0"/>
-              <a:t>for example,</a:t>
-            </a:r>
-            <a:r>
-              <a:rPr lang="en-US" baseline="0" dirty="0" smtClean="0"/>
-              <a:t> many of which </a:t>
-            </a:r>
-            <a:r>
-              <a:rPr lang="en-US" baseline="0" dirty="0" smtClean="0"/>
-              <a:t>are often useful.</a:t>
+              <a:t>The parallel tutorial is a little friendlier and better yet is chock full of examples showing how it works.  There are other substitution patterns than just the two I showed, for example, many of which are often useful.</a:t>
             </a:r>
             <a:endParaRPr lang="en-US" dirty="0"/>
           </a:p>
@@ -5374,7 +4823,7 @@
     </p:spTree>
     <p:extLst>
       <p:ext uri="{BB962C8B-B14F-4D97-AF65-F5344CB8AC3E}">
-        <p14:creationId xmlns:p14="http://schemas.microsoft.com/office/powerpoint/2010/main" xmlns:p="http://schemas.openxmlformats.org/presentationml/2006/main" xmlns:r="http://schemas.openxmlformats.org/officeDocument/2006/relationships" xmlns:a="http://schemas.openxmlformats.org/drawingml/2006/main" xmlns="" val="2231872303"/>
+        <p14:creationId xmlns:p14="http://schemas.microsoft.com/office/powerpoint/2010/main" val="2231872303"/>
       </p:ext>
     </p:extLst>
   </p:cSld>
@@ -5385,7 +4834,7 @@
 </file>
 
 <file path=ppt/notesSlides/notesSlide4.xml><?xml version="1.0" encoding="utf-8"?>
-<p:notes xmlns:a="http://schemas.openxmlformats.org/drawingml/2006/main" xmlns:r="http://schemas.openxmlformats.org/officeDocument/2006/relationships" xmlns:mc="http://schemas.openxmlformats.org/markup-compatibility/2006" xmlns:mv="urn:schemas-microsoft-com:mac:vml" xmlns:p="http://schemas.openxmlformats.org/presentationml/2006/main" mc:Ignorable="mv" mc:PreserveAttributes="mv:*">
+<p:notes xmlns:a="http://schemas.openxmlformats.org/drawingml/2006/main" xmlns:r="http://schemas.openxmlformats.org/officeDocument/2006/relationships" xmlns:p="http://schemas.openxmlformats.org/presentationml/2006/main">
   <p:cSld>
     <p:spTree>
       <p:nvGrpSpPr>
@@ -5430,52 +4879,16 @@
           <a:p>
             <a:r>
               <a:rPr lang="en-US" baseline="0" dirty="0" smtClean="0"/>
-              <a:t>I want to note a </a:t>
-            </a:r>
+              <a:t>I want to note a caveat: Correctness is obviously important, but it isn’t compelling and there was a study to prove it. Incentives are all wrong as few papers are subjected to reproduction attempts.</a:t>
+            </a:r>
+          </a:p>
+          <a:p>
+            <a:endParaRPr lang="en-US" baseline="0" dirty="0" smtClean="0"/>
+          </a:p>
+          <a:p>
             <a:r>
               <a:rPr lang="en-US" baseline="0" dirty="0" smtClean="0"/>
-              <a:t>caveat: </a:t>
-            </a:r>
-            <a:r>
-              <a:rPr lang="en-US" baseline="0" dirty="0" smtClean="0"/>
-              <a:t>Correctness is obviously important, but it </a:t>
-            </a:r>
-            <a:r>
-              <a:rPr lang="en-US" baseline="0" dirty="0" smtClean="0"/>
-              <a:t>isn’t </a:t>
-            </a:r>
-            <a:r>
-              <a:rPr lang="en-US" baseline="0" dirty="0" smtClean="0"/>
-              <a:t>compelling </a:t>
-            </a:r>
-            <a:r>
-              <a:rPr lang="en-US" baseline="0" dirty="0" smtClean="0"/>
-              <a:t>and there was a study to prove it. Incentives are all </a:t>
-            </a:r>
-            <a:r>
-              <a:rPr lang="en-US" baseline="0" dirty="0" smtClean="0"/>
-              <a:t>wrong as few </a:t>
-            </a:r>
-            <a:r>
-              <a:rPr lang="en-US" baseline="0" dirty="0" smtClean="0"/>
-              <a:t>papers are subjected to reproduction attempts.</a:t>
-            </a:r>
-          </a:p>
-          <a:p>
-            <a:endParaRPr lang="en-US" baseline="0" dirty="0" smtClean="0"/>
-          </a:p>
-          <a:p>
-            <a:r>
-              <a:rPr lang="en-US" baseline="0" dirty="0" smtClean="0"/>
-              <a:t>However, making your analyses reproducible and self-documenting will save you time puzzling over what you did and make it easy to redo analysis on an </a:t>
-            </a:r>
-            <a:r>
-              <a:rPr lang="en-US" baseline="0" dirty="0" smtClean="0"/>
-              <a:t>updated or new </a:t>
-            </a:r>
-            <a:r>
-              <a:rPr lang="en-US" baseline="0" dirty="0" smtClean="0"/>
-              <a:t>data set.</a:t>
+              <a:t>However, making your analyses reproducible and self-documenting will save you time puzzling over what you did and make it easy to redo analysis on an updated or new data set.</a:t>
             </a:r>
           </a:p>
           <a:p>
@@ -5516,7 +4929,7 @@
     </p:spTree>
     <p:extLst>
       <p:ext uri="{BB962C8B-B14F-4D97-AF65-F5344CB8AC3E}">
-        <p14:creationId xmlns:p14="http://schemas.microsoft.com/office/powerpoint/2010/main" xmlns:p="http://schemas.openxmlformats.org/presentationml/2006/main" xmlns:r="http://schemas.openxmlformats.org/officeDocument/2006/relationships" xmlns:a="http://schemas.openxmlformats.org/drawingml/2006/main" xmlns="" val="528165026"/>
+        <p14:creationId xmlns:p14="http://schemas.microsoft.com/office/powerpoint/2010/main" val="528165026"/>
       </p:ext>
     </p:extLst>
   </p:cSld>
@@ -5527,7 +4940,7 @@
 </file>
 
 <file path=ppt/notesSlides/notesSlide40.xml><?xml version="1.0" encoding="utf-8"?>
-<p:notes xmlns:a="http://schemas.openxmlformats.org/drawingml/2006/main" xmlns:r="http://schemas.openxmlformats.org/officeDocument/2006/relationships" xmlns:mc="http://schemas.openxmlformats.org/markup-compatibility/2006" xmlns:mv="urn:schemas-microsoft-com:mac:vml" xmlns:p="http://schemas.openxmlformats.org/presentationml/2006/main" mc:Ignorable="mv" mc:PreserveAttributes="mv:*">
+<p:notes xmlns:a="http://schemas.openxmlformats.org/drawingml/2006/main" xmlns:r="http://schemas.openxmlformats.org/officeDocument/2006/relationships" xmlns:p="http://schemas.openxmlformats.org/presentationml/2006/main">
   <p:cSld>
     <p:spTree>
       <p:nvGrpSpPr>
@@ -5668,7 +5081,7 @@
     </p:spTree>
     <p:extLst>
       <p:ext uri="{BB962C8B-B14F-4D97-AF65-F5344CB8AC3E}">
-        <p14:creationId xmlns:p14="http://schemas.microsoft.com/office/powerpoint/2010/main" xmlns:p="http://schemas.openxmlformats.org/presentationml/2006/main" xmlns:r="http://schemas.openxmlformats.org/officeDocument/2006/relationships" xmlns:a="http://schemas.openxmlformats.org/drawingml/2006/main" xmlns="" val="3322079123"/>
+        <p14:creationId xmlns:p14="http://schemas.microsoft.com/office/powerpoint/2010/main" val="3322079123"/>
       </p:ext>
     </p:extLst>
   </p:cSld>
@@ -5679,7 +5092,7 @@
 </file>
 
 <file path=ppt/notesSlides/notesSlide5.xml><?xml version="1.0" encoding="utf-8"?>
-<p:notes xmlns:a="http://schemas.openxmlformats.org/drawingml/2006/main" xmlns:r="http://schemas.openxmlformats.org/officeDocument/2006/relationships" xmlns:mc="http://schemas.openxmlformats.org/markup-compatibility/2006" xmlns:mv="urn:schemas-microsoft-com:mac:vml" xmlns:p="http://schemas.openxmlformats.org/presentationml/2006/main" mc:Ignorable="mv" mc:PreserveAttributes="mv:*">
+<p:notes xmlns:a="http://schemas.openxmlformats.org/drawingml/2006/main" xmlns:r="http://schemas.openxmlformats.org/officeDocument/2006/relationships" xmlns:p="http://schemas.openxmlformats.org/presentationml/2006/main">
   <p:cSld>
     <p:spTree>
       <p:nvGrpSpPr>
@@ -5771,19 +5184,11 @@
             </a:r>
             <a:r>
               <a:rPr lang="en-US" dirty="0" smtClean="0"/>
-              <a:t>cales </a:t>
-            </a:r>
-            <a:r>
-              <a:rPr lang="en-US" dirty="0" smtClean="0"/>
-              <a:t>to</a:t>
+              <a:t>cales to</a:t>
             </a:r>
             <a:r>
               <a:rPr lang="en-US" baseline="0" dirty="0" smtClean="0"/>
-              <a:t> the size of your </a:t>
-            </a:r>
-            <a:r>
-              <a:rPr lang="en-US" baseline="0" dirty="0" smtClean="0"/>
-              <a:t>project and is suited even for the simplest of tasks.</a:t>
+              <a:t> the size of your project and is suited even for the simplest of tasks.</a:t>
             </a:r>
           </a:p>
           <a:p>
@@ -5808,11 +5213,7 @@
             </a:r>
             <a:r>
               <a:rPr lang="en-US" baseline="0" dirty="0" smtClean="0"/>
-              <a:t> and make, but it’s a time-tested tool and no software doesn’t have sharp corners somewhere</a:t>
-            </a:r>
-            <a:r>
-              <a:rPr lang="en-US" baseline="0" dirty="0" smtClean="0"/>
-              <a:t>.  I’ll talk about some of the </a:t>
+              <a:t> and make, but it’s a time-tested tool and no software doesn’t have sharp corners somewhere.  I’ll talk about some of the </a:t>
             </a:r>
             <a:r>
               <a:rPr lang="en-US" baseline="0" dirty="0" err="1" smtClean="0"/>
@@ -5853,7 +5254,7 @@
     </p:spTree>
     <p:extLst>
       <p:ext uri="{BB962C8B-B14F-4D97-AF65-F5344CB8AC3E}">
-        <p14:creationId xmlns:p14="http://schemas.microsoft.com/office/powerpoint/2010/main" xmlns:p="http://schemas.openxmlformats.org/presentationml/2006/main" xmlns:r="http://schemas.openxmlformats.org/officeDocument/2006/relationships" xmlns:a="http://schemas.openxmlformats.org/drawingml/2006/main" xmlns="" val="3948747495"/>
+        <p14:creationId xmlns:p14="http://schemas.microsoft.com/office/powerpoint/2010/main" val="3948747495"/>
       </p:ext>
     </p:extLst>
   </p:cSld>
@@ -5864,7 +5265,7 @@
 </file>
 
 <file path=ppt/notesSlides/notesSlide6.xml><?xml version="1.0" encoding="utf-8"?>
-<p:notes xmlns:a="http://schemas.openxmlformats.org/drawingml/2006/main" xmlns:r="http://schemas.openxmlformats.org/officeDocument/2006/relationships" xmlns:mc="http://schemas.openxmlformats.org/markup-compatibility/2006" xmlns:mv="urn:schemas-microsoft-com:mac:vml" xmlns:p="http://schemas.openxmlformats.org/presentationml/2006/main" mc:Ignorable="mv" mc:PreserveAttributes="mv:*">
+<p:notes xmlns:a="http://schemas.openxmlformats.org/drawingml/2006/main" xmlns:r="http://schemas.openxmlformats.org/officeDocument/2006/relationships" xmlns:p="http://schemas.openxmlformats.org/presentationml/2006/main">
   <p:cSld>
     <p:spTree>
       <p:nvGrpSpPr>
@@ -5930,11 +5331,7 @@
           <a:p>
             <a:r>
               <a:rPr lang="en-US" dirty="0" smtClean="0"/>
-              <a:t>I </a:t>
-            </a:r>
-            <a:r>
-              <a:rPr lang="en-US" dirty="0" smtClean="0"/>
-              <a:t>often prototype</a:t>
+              <a:t>I often prototype</a:t>
             </a:r>
             <a:r>
               <a:rPr lang="en-US" baseline="0" dirty="0" smtClean="0"/>
@@ -5954,47 +5351,17 @@
             </a:r>
             <a:r>
               <a:rPr lang="en-US" baseline="0" dirty="0" smtClean="0"/>
-              <a:t> and further </a:t>
-            </a:r>
+              <a:t> and further test and tweak from there.</a:t>
+            </a:r>
+          </a:p>
+          <a:p>
+            <a:endParaRPr lang="en-US" baseline="0" dirty="0" smtClean="0"/>
+          </a:p>
+          <a:p>
             <a:r>
               <a:rPr lang="en-US" baseline="0" dirty="0" smtClean="0"/>
-              <a:t>test </a:t>
-            </a:r>
-            <a:r>
-              <a:rPr lang="en-US" baseline="0" dirty="0" smtClean="0"/>
-              <a:t>and </a:t>
-            </a:r>
-            <a:r>
-              <a:rPr lang="en-US" baseline="0" dirty="0" smtClean="0"/>
-              <a:t>tweak </a:t>
-            </a:r>
-            <a:r>
-              <a:rPr lang="en-US" baseline="0" dirty="0" smtClean="0"/>
-              <a:t>from there.</a:t>
-            </a:r>
-            <a:endParaRPr lang="en-US" baseline="0" dirty="0" smtClean="0"/>
-          </a:p>
-          <a:p>
-            <a:endParaRPr lang="en-US" baseline="0" dirty="0" smtClean="0"/>
-          </a:p>
-          <a:p>
-            <a:r>
-              <a:rPr lang="en-US" baseline="0" dirty="0" smtClean="0"/>
-              <a:t>The prerequisites are important because make uses those to determine what order to run the recipes.  It also uses them to skip over recipes if the files they produce already exist and the input files haven’t changed since then.  This can save a lot of time when writing complex workflows with steps that take a while.  Once you verify that the long running steps are correct, you can run them once and then move on to using them down the road without re-running it </a:t>
-            </a:r>
-            <a:r>
-              <a:rPr lang="en-US" baseline="0" dirty="0" smtClean="0"/>
-              <a:t>every time</a:t>
-            </a:r>
-            <a:r>
-              <a:rPr lang="en-US" baseline="0" dirty="0" smtClean="0"/>
-              <a:t>.  Best yet, make will figure this out for you and you don’t need to remember what’s </a:t>
-            </a:r>
-            <a:r>
-              <a:rPr lang="en-US" baseline="0" dirty="0" smtClean="0"/>
-              <a:t>changed since you last ran it two weeks ago. </a:t>
-            </a:r>
-            <a:endParaRPr lang="en-US" baseline="0" dirty="0" smtClean="0"/>
+              <a:t>The prerequisites are important because make uses those to determine what order to run the recipes.  It also uses them to skip over recipes if the files they produce already exist and the input files haven’t changed since then.  This can save a lot of time when writing complex workflows with steps that take a while.  Once you verify that the long running steps are correct, you can run them once and then move on to using them down the road without re-running it every time.  Best yet, make will figure this out for you and you don’t need to remember what’s changed since you last ran it two weeks ago. </a:t>
+            </a:r>
           </a:p>
         </p:txBody>
       </p:sp>
@@ -6025,7 +5392,7 @@
     </p:spTree>
     <p:extLst>
       <p:ext uri="{BB962C8B-B14F-4D97-AF65-F5344CB8AC3E}">
-        <p14:creationId xmlns:p14="http://schemas.microsoft.com/office/powerpoint/2010/main" xmlns:p="http://schemas.openxmlformats.org/presentationml/2006/main" xmlns:r="http://schemas.openxmlformats.org/officeDocument/2006/relationships" xmlns:a="http://schemas.openxmlformats.org/drawingml/2006/main" xmlns="" val="2586950902"/>
+        <p14:creationId xmlns:p14="http://schemas.microsoft.com/office/powerpoint/2010/main" val="2586950902"/>
       </p:ext>
     </p:extLst>
   </p:cSld>
@@ -6036,7 +5403,7 @@
 </file>
 
 <file path=ppt/notesSlides/notesSlide7.xml><?xml version="1.0" encoding="utf-8"?>
-<p:notes xmlns:a="http://schemas.openxmlformats.org/drawingml/2006/main" xmlns:r="http://schemas.openxmlformats.org/officeDocument/2006/relationships" xmlns:mc="http://schemas.openxmlformats.org/markup-compatibility/2006" xmlns:mv="urn:schemas-microsoft-com:mac:vml" xmlns:p="http://schemas.openxmlformats.org/presentationml/2006/main" mc:Ignorable="mv" mc:PreserveAttributes="mv:*">
+<p:notes xmlns:a="http://schemas.openxmlformats.org/drawingml/2006/main" xmlns:r="http://schemas.openxmlformats.org/officeDocument/2006/relationships" xmlns:p="http://schemas.openxmlformats.org/presentationml/2006/main">
   <p:cSld>
     <p:spTree>
       <p:nvGrpSpPr>
@@ -6122,15 +5489,7 @@
           <a:p>
             <a:r>
               <a:rPr lang="en-US" baseline="0" dirty="0" smtClean="0"/>
-              <a:t>Note the line </a:t>
-            </a:r>
-            <a:r>
-              <a:rPr lang="en-US" baseline="0" dirty="0" smtClean="0"/>
-              <a:t>continuations in the actions.  </a:t>
-            </a:r>
-            <a:r>
-              <a:rPr lang="en-US" baseline="0" dirty="0" smtClean="0"/>
-              <a:t>This says that these three lines will be run as a single command.  Without those, each line would be a separate command (and wouldn’t work because -</a:t>
+              <a:t>Note the line continuations in the actions.  This says that these three lines will be run as a single command.  Without those, each line would be a separate command (and wouldn’t work because -</a:t>
             </a:r>
             <a:r>
               <a:rPr lang="en-US" baseline="0" dirty="0" err="1" smtClean="0"/>
@@ -6147,15 +5506,7 @@
           <a:p>
             <a:r>
               <a:rPr lang="en-US" baseline="0" dirty="0" smtClean="0"/>
-              <a:t>To run </a:t>
-            </a:r>
-            <a:r>
-              <a:rPr lang="en-US" baseline="0" dirty="0" smtClean="0"/>
-              <a:t>this, </a:t>
-            </a:r>
-            <a:r>
-              <a:rPr lang="en-US" baseline="0" dirty="0" smtClean="0"/>
-              <a:t>we’d simply type: make </a:t>
+              <a:t>To run this, we’d simply type: make </a:t>
             </a:r>
             <a:r>
               <a:rPr lang="en-US" baseline="0" dirty="0" err="1" smtClean="0"/>
@@ -6203,7 +5554,7 @@
     </p:spTree>
     <p:extLst>
       <p:ext uri="{BB962C8B-B14F-4D97-AF65-F5344CB8AC3E}">
-        <p14:creationId xmlns:p14="http://schemas.microsoft.com/office/powerpoint/2010/main" xmlns:p="http://schemas.openxmlformats.org/presentationml/2006/main" xmlns:r="http://schemas.openxmlformats.org/officeDocument/2006/relationships" xmlns:a="http://schemas.openxmlformats.org/drawingml/2006/main" xmlns="" val="2586950902"/>
+        <p14:creationId xmlns:p14="http://schemas.microsoft.com/office/powerpoint/2010/main" val="2586950902"/>
       </p:ext>
     </p:extLst>
   </p:cSld>
@@ -6214,7 +5565,7 @@
 </file>
 
 <file path=ppt/notesSlides/notesSlide8.xml><?xml version="1.0" encoding="utf-8"?>
-<p:notes xmlns:a="http://schemas.openxmlformats.org/drawingml/2006/main" xmlns:r="http://schemas.openxmlformats.org/officeDocument/2006/relationships" xmlns:mc="http://schemas.openxmlformats.org/markup-compatibility/2006" xmlns:mv="urn:schemas-microsoft-com:mac:vml" xmlns:p="http://schemas.openxmlformats.org/presentationml/2006/main" mc:Ignorable="mv" mc:PreserveAttributes="mv:*">
+<p:notes xmlns:a="http://schemas.openxmlformats.org/drawingml/2006/main" xmlns:r="http://schemas.openxmlformats.org/officeDocument/2006/relationships" xmlns:p="http://schemas.openxmlformats.org/presentationml/2006/main">
   <p:cSld>
     <p:spTree>
       <p:nvGrpSpPr>
@@ -6259,11 +5610,7 @@
           <a:p>
             <a:r>
               <a:rPr lang="en-US" baseline="0" dirty="0" smtClean="0"/>
-              <a:t>This is an equivalent recipe which save some typing.  It also provides you flexibility if you rename your targets or inputs later.  It’s especially useful for recipes which describe how to make multiple files, so I’ll use these variables from now on.  It’s a good practice.  Note that recipes can specify multiple targets or prerequisites and $&lt; and $@ are only the first of the files being made/input.  There are other variables to get all of them, which you’ll see later</a:t>
-            </a:r>
-            <a:r>
-              <a:rPr lang="en-US" baseline="0" dirty="0" smtClean="0"/>
-              <a:t>.</a:t>
+              <a:t>This is an equivalent recipe which save some typing.  It also provides you flexibility if you rename your targets or inputs later.  It’s especially useful for recipes which describe how to make multiple files, so I’ll use these variables from now on.  It’s a good practice.  Note that recipes can specify multiple targets or prerequisites and $&lt; and $@ are only the first of the files being made/input.  There are other variables to get all of them, which you’ll see later.</a:t>
             </a:r>
           </a:p>
           <a:p>
@@ -6274,7 +5621,6 @@
               <a:rPr lang="en-US" baseline="0" dirty="0" smtClean="0"/>
               <a:t>I color code targets and prerequisites so it’s easier to keep track. </a:t>
             </a:r>
-            <a:endParaRPr lang="en-US" baseline="0" dirty="0" smtClean="0"/>
           </a:p>
         </p:txBody>
       </p:sp>
@@ -6305,7 +5651,7 @@
     </p:spTree>
     <p:extLst>
       <p:ext uri="{BB962C8B-B14F-4D97-AF65-F5344CB8AC3E}">
-        <p14:creationId xmlns:p14="http://schemas.microsoft.com/office/powerpoint/2010/main" xmlns:p="http://schemas.openxmlformats.org/presentationml/2006/main" xmlns:r="http://schemas.openxmlformats.org/officeDocument/2006/relationships" xmlns:a="http://schemas.openxmlformats.org/drawingml/2006/main" xmlns="" val="2586950902"/>
+        <p14:creationId xmlns:p14="http://schemas.microsoft.com/office/powerpoint/2010/main" val="2586950902"/>
       </p:ext>
     </p:extLst>
   </p:cSld>
@@ -6316,7 +5662,7 @@
 </file>
 
 <file path=ppt/notesSlides/notesSlide9.xml><?xml version="1.0" encoding="utf-8"?>
-<p:notes xmlns:a="http://schemas.openxmlformats.org/drawingml/2006/main" xmlns:r="http://schemas.openxmlformats.org/officeDocument/2006/relationships" xmlns:mc="http://schemas.openxmlformats.org/markup-compatibility/2006" xmlns:mv="urn:schemas-microsoft-com:mac:vml" xmlns:p="http://schemas.openxmlformats.org/presentationml/2006/main" mc:Ignorable="mv" mc:PreserveAttributes="mv:*">
+<p:notes xmlns:a="http://schemas.openxmlformats.org/drawingml/2006/main" xmlns:r="http://schemas.openxmlformats.org/officeDocument/2006/relationships" xmlns:p="http://schemas.openxmlformats.org/presentationml/2006/main">
   <p:cSld>
     <p:spTree>
       <p:nvGrpSpPr>
@@ -6361,11 +5707,7 @@
           <a:p>
             <a:r>
               <a:rPr lang="en-US" baseline="0" dirty="0" smtClean="0"/>
-              <a:t>Here’s a </a:t>
-            </a:r>
-            <a:r>
-              <a:rPr lang="en-US" baseline="0" dirty="0" smtClean="0"/>
-              <a:t>longer example showing multiple targets that depend on each other.  This takes a </a:t>
+              <a:t>Here’s a longer example showing multiple targets that depend on each other.  This takes a </a:t>
             </a:r>
             <a:r>
               <a:rPr lang="en-US" baseline="0" dirty="0" err="1" smtClean="0"/>
@@ -6397,11 +5739,7 @@
             </a:r>
             <a:r>
               <a:rPr lang="en-US" baseline="0" dirty="0" smtClean="0"/>
-              <a:t> to nexus.  Note how each subsequent recipe depends on another.  These are ordered sequentially, but they don’t have to be and multiple recipes can depend on the same recipe</a:t>
-            </a:r>
-            <a:r>
-              <a:rPr lang="en-US" baseline="0" dirty="0" smtClean="0"/>
-              <a:t>.</a:t>
+              <a:t> to nexus.  Note how each subsequent recipe depends on another.  These are ordered sequentially, but they don’t have to be and multiple recipes can depend on the same recipe.</a:t>
             </a:r>
           </a:p>
           <a:p>
@@ -6452,15 +5790,7 @@
           <a:p>
             <a:r>
               <a:rPr lang="en-US" baseline="0" dirty="0" smtClean="0"/>
-              <a:t>It’s also worth noting the command line’s (shell’s) input and output redirection </a:t>
-            </a:r>
-            <a:r>
-              <a:rPr lang="en-US" baseline="0" dirty="0" smtClean="0"/>
-              <a:t>operators, in orange.  </a:t>
-            </a:r>
-            <a:r>
-              <a:rPr lang="en-US" baseline="0" dirty="0" smtClean="0"/>
-              <a:t>fasta2nexus, for example, takes an input stream and prints an output stream rather than taking an input filename and output filename itself.  </a:t>
+              <a:t>It’s also worth noting the command line’s (shell’s) input and output redirection operators, in orange.  fasta2nexus, for example, takes an input stream and prints an output stream rather than taking an input filename and output filename itself.  </a:t>
             </a:r>
             <a:r>
               <a:rPr lang="en-US" baseline="0" dirty="0" err="1" smtClean="0"/>
@@ -6470,7 +5800,6 @@
               <a:rPr lang="en-US" baseline="0" dirty="0" smtClean="0"/>
               <a:t> on the other hand takes two filenames along with some cutoff values (gaps and frequency).  Do you see why $&lt; uses &lt;?</a:t>
             </a:r>
-            <a:endParaRPr lang="en-US" baseline="0" dirty="0" smtClean="0"/>
           </a:p>
           <a:p>
             <a:endParaRPr lang="en-US" baseline="0" dirty="0" smtClean="0"/>
@@ -6495,17 +5824,8 @@
             </a:pPr>
             <a:r>
               <a:rPr lang="en-US" baseline="0" dirty="0" smtClean="0"/>
-              <a:t>Do you notice </a:t>
-            </a:r>
-            <a:r>
-              <a:rPr lang="en-US" baseline="0" dirty="0" smtClean="0"/>
-              <a:t>the temporary nexus file the last recipe creates and then deletes?  We can do it that way, but it’s a good practice to keep your recipes as short as possible to enable reuse and save time later.  With make, this is easy!  Let’s see how you could modify the recipes</a:t>
-            </a:r>
-            <a:r>
-              <a:rPr lang="en-US" baseline="0" dirty="0" smtClean="0"/>
-              <a:t>.</a:t>
-            </a:r>
-            <a:endParaRPr lang="en-US" baseline="0" dirty="0" smtClean="0"/>
+              <a:t>Do you notice the temporary nexus file the last recipe creates and then deletes?  We can do it that way, but it’s a good practice to keep your recipes as short as possible to enable reuse and save time later.  With make, this is easy!  Let’s see how you could modify the recipes.</a:t>
+            </a:r>
           </a:p>
         </p:txBody>
       </p:sp>
@@ -6536,7 +5856,7 @@
     </p:spTree>
     <p:extLst>
       <p:ext uri="{BB962C8B-B14F-4D97-AF65-F5344CB8AC3E}">
-        <p14:creationId xmlns:p14="http://schemas.microsoft.com/office/powerpoint/2010/main" xmlns:p="http://schemas.openxmlformats.org/presentationml/2006/main" xmlns:r="http://schemas.openxmlformats.org/officeDocument/2006/relationships" xmlns:a="http://schemas.openxmlformats.org/drawingml/2006/main" xmlns="" val="2586950902"/>
+        <p14:creationId xmlns:p14="http://schemas.microsoft.com/office/powerpoint/2010/main" val="2586950902"/>
       </p:ext>
     </p:extLst>
   </p:cSld>
@@ -6547,7 +5867,7 @@
 </file>
 
 <file path=ppt/slideLayouts/slideLayout1.xml><?xml version="1.0" encoding="utf-8"?>
-<p:sldLayout xmlns:a="http://schemas.openxmlformats.org/drawingml/2006/main" xmlns:r="http://schemas.openxmlformats.org/officeDocument/2006/relationships" xmlns:mc="http://schemas.openxmlformats.org/markup-compatibility/2006" xmlns:mv="urn:schemas-microsoft-com:mac:vml" xmlns:p="http://schemas.openxmlformats.org/presentationml/2006/main" mc:Ignorable="mv" mc:PreserveAttributes="mv:*" type="title" preserve="1">
+<p:sldLayout xmlns:a="http://schemas.openxmlformats.org/drawingml/2006/main" xmlns:r="http://schemas.openxmlformats.org/officeDocument/2006/relationships" xmlns:p="http://schemas.openxmlformats.org/presentationml/2006/main" type="title" preserve="1">
   <p:cSld name="Title Slide">
     <p:spTree>
       <p:nvGrpSpPr>
@@ -6728,7 +6048,7 @@
             <a:fld id="{A925BE74-8160-3B49-8D0F-E557085791B4}" type="datetimeFigureOut">
               <a:rPr lang="en-US" smtClean="0"/>
               <a:pPr/>
-              <a:t>5/20/14</a:t>
+              <a:t>5/21/14</a:t>
             </a:fld>
             <a:endParaRPr lang="en-US"/>
           </a:p>
@@ -6780,7 +6100,7 @@
     </p:spTree>
     <p:extLst>
       <p:ext uri="{BB962C8B-B14F-4D97-AF65-F5344CB8AC3E}">
-        <p14:creationId xmlns:p14="http://schemas.microsoft.com/office/powerpoint/2010/main" xmlns:p="http://schemas.openxmlformats.org/presentationml/2006/main" xmlns:r="http://schemas.openxmlformats.org/officeDocument/2006/relationships" xmlns:a="http://schemas.openxmlformats.org/drawingml/2006/main" xmlns="" val="1649401837"/>
+        <p14:creationId xmlns:p14="http://schemas.microsoft.com/office/powerpoint/2010/main" val="1649401837"/>
       </p:ext>
     </p:extLst>
   </p:cSld>
@@ -6791,7 +6111,7 @@
 </file>
 
 <file path=ppt/slideLayouts/slideLayout10.xml><?xml version="1.0" encoding="utf-8"?>
-<p:sldLayout xmlns:a="http://schemas.openxmlformats.org/drawingml/2006/main" xmlns:r="http://schemas.openxmlformats.org/officeDocument/2006/relationships" xmlns:mc="http://schemas.openxmlformats.org/markup-compatibility/2006" xmlns:mv="urn:schemas-microsoft-com:mac:vml" xmlns:p="http://schemas.openxmlformats.org/presentationml/2006/main" mc:Ignorable="mv" mc:PreserveAttributes="mv:*" type="vertTx" preserve="1">
+<p:sldLayout xmlns:a="http://schemas.openxmlformats.org/drawingml/2006/main" xmlns:r="http://schemas.openxmlformats.org/officeDocument/2006/relationships" xmlns:p="http://schemas.openxmlformats.org/presentationml/2006/main" type="vertTx" preserve="1">
   <p:cSld name="Title and Vertical Text">
     <p:spTree>
       <p:nvGrpSpPr>
@@ -6900,7 +6220,7 @@
             <a:fld id="{A925BE74-8160-3B49-8D0F-E557085791B4}" type="datetimeFigureOut">
               <a:rPr lang="en-US" smtClean="0"/>
               <a:pPr/>
-              <a:t>5/20/14</a:t>
+              <a:t>5/21/14</a:t>
             </a:fld>
             <a:endParaRPr lang="en-US"/>
           </a:p>
@@ -6952,7 +6272,7 @@
     </p:spTree>
     <p:extLst>
       <p:ext uri="{BB962C8B-B14F-4D97-AF65-F5344CB8AC3E}">
-        <p14:creationId xmlns:p14="http://schemas.microsoft.com/office/powerpoint/2010/main" xmlns:p="http://schemas.openxmlformats.org/presentationml/2006/main" xmlns:r="http://schemas.openxmlformats.org/officeDocument/2006/relationships" xmlns:a="http://schemas.openxmlformats.org/drawingml/2006/main" xmlns="" val="4204419472"/>
+        <p14:creationId xmlns:p14="http://schemas.microsoft.com/office/powerpoint/2010/main" val="4204419472"/>
       </p:ext>
     </p:extLst>
   </p:cSld>
@@ -6963,7 +6283,7 @@
 </file>
 
 <file path=ppt/slideLayouts/slideLayout11.xml><?xml version="1.0" encoding="utf-8"?>
-<p:sldLayout xmlns:a="http://schemas.openxmlformats.org/drawingml/2006/main" xmlns:r="http://schemas.openxmlformats.org/officeDocument/2006/relationships" xmlns:mc="http://schemas.openxmlformats.org/markup-compatibility/2006" xmlns:mv="urn:schemas-microsoft-com:mac:vml" xmlns:p="http://schemas.openxmlformats.org/presentationml/2006/main" mc:Ignorable="mv" mc:PreserveAttributes="mv:*" type="vertTitleAndTx" preserve="1">
+<p:sldLayout xmlns:a="http://schemas.openxmlformats.org/drawingml/2006/main" xmlns:r="http://schemas.openxmlformats.org/officeDocument/2006/relationships" xmlns:p="http://schemas.openxmlformats.org/presentationml/2006/main" type="vertTitleAndTx" preserve="1">
   <p:cSld name="Vertical Title and Text">
     <p:spTree>
       <p:nvGrpSpPr>
@@ -7082,7 +6402,7 @@
             <a:fld id="{A925BE74-8160-3B49-8D0F-E557085791B4}" type="datetimeFigureOut">
               <a:rPr lang="en-US" smtClean="0"/>
               <a:pPr/>
-              <a:t>5/20/14</a:t>
+              <a:t>5/21/14</a:t>
             </a:fld>
             <a:endParaRPr lang="en-US"/>
           </a:p>
@@ -7134,7 +6454,7 @@
     </p:spTree>
     <p:extLst>
       <p:ext uri="{BB962C8B-B14F-4D97-AF65-F5344CB8AC3E}">
-        <p14:creationId xmlns:p14="http://schemas.microsoft.com/office/powerpoint/2010/main" xmlns:p="http://schemas.openxmlformats.org/presentationml/2006/main" xmlns:r="http://schemas.openxmlformats.org/officeDocument/2006/relationships" xmlns:a="http://schemas.openxmlformats.org/drawingml/2006/main" xmlns="" val="3029766501"/>
+        <p14:creationId xmlns:p14="http://schemas.microsoft.com/office/powerpoint/2010/main" val="3029766501"/>
       </p:ext>
     </p:extLst>
   </p:cSld>
@@ -7145,7 +6465,7 @@
 </file>
 
 <file path=ppt/slideLayouts/slideLayout2.xml><?xml version="1.0" encoding="utf-8"?>
-<p:sldLayout xmlns:a="http://schemas.openxmlformats.org/drawingml/2006/main" xmlns:r="http://schemas.openxmlformats.org/officeDocument/2006/relationships" xmlns:mc="http://schemas.openxmlformats.org/markup-compatibility/2006" xmlns:mv="urn:schemas-microsoft-com:mac:vml" xmlns:p="http://schemas.openxmlformats.org/presentationml/2006/main" mc:Ignorable="mv" mc:PreserveAttributes="mv:*" type="obj" preserve="1">
+<p:sldLayout xmlns:a="http://schemas.openxmlformats.org/drawingml/2006/main" xmlns:r="http://schemas.openxmlformats.org/officeDocument/2006/relationships" xmlns:p="http://schemas.openxmlformats.org/presentationml/2006/main" type="obj" preserve="1">
   <p:cSld name="Title and Content">
     <p:spTree>
       <p:nvGrpSpPr>
@@ -7254,7 +6574,7 @@
             <a:fld id="{A925BE74-8160-3B49-8D0F-E557085791B4}" type="datetimeFigureOut">
               <a:rPr lang="en-US" smtClean="0"/>
               <a:pPr/>
-              <a:t>5/20/14</a:t>
+              <a:t>5/21/14</a:t>
             </a:fld>
             <a:endParaRPr lang="en-US"/>
           </a:p>
@@ -7306,7 +6626,7 @@
     </p:spTree>
     <p:extLst>
       <p:ext uri="{BB962C8B-B14F-4D97-AF65-F5344CB8AC3E}">
-        <p14:creationId xmlns:p14="http://schemas.microsoft.com/office/powerpoint/2010/main" xmlns:p="http://schemas.openxmlformats.org/presentationml/2006/main" xmlns:r="http://schemas.openxmlformats.org/officeDocument/2006/relationships" xmlns:a="http://schemas.openxmlformats.org/drawingml/2006/main" xmlns="" val="2822572959"/>
+        <p14:creationId xmlns:p14="http://schemas.microsoft.com/office/powerpoint/2010/main" val="2822572959"/>
       </p:ext>
     </p:extLst>
   </p:cSld>
@@ -7317,7 +6637,7 @@
 </file>
 
 <file path=ppt/slideLayouts/slideLayout3.xml><?xml version="1.0" encoding="utf-8"?>
-<p:sldLayout xmlns:a="http://schemas.openxmlformats.org/drawingml/2006/main" xmlns:r="http://schemas.openxmlformats.org/officeDocument/2006/relationships" xmlns:mc="http://schemas.openxmlformats.org/markup-compatibility/2006" xmlns:mv="urn:schemas-microsoft-com:mac:vml" xmlns:p="http://schemas.openxmlformats.org/presentationml/2006/main" mc:Ignorable="mv" mc:PreserveAttributes="mv:*" type="secHead" preserve="1">
+<p:sldLayout xmlns:a="http://schemas.openxmlformats.org/drawingml/2006/main" xmlns:r="http://schemas.openxmlformats.org/officeDocument/2006/relationships" xmlns:p="http://schemas.openxmlformats.org/presentationml/2006/main" type="secHead" preserve="1">
   <p:cSld name="Section Header">
     <p:spTree>
       <p:nvGrpSpPr>
@@ -7502,7 +6822,7 @@
             <a:fld id="{A925BE74-8160-3B49-8D0F-E557085791B4}" type="datetimeFigureOut">
               <a:rPr lang="en-US" smtClean="0"/>
               <a:pPr/>
-              <a:t>5/20/14</a:t>
+              <a:t>5/21/14</a:t>
             </a:fld>
             <a:endParaRPr lang="en-US"/>
           </a:p>
@@ -7554,7 +6874,7 @@
     </p:spTree>
     <p:extLst>
       <p:ext uri="{BB962C8B-B14F-4D97-AF65-F5344CB8AC3E}">
-        <p14:creationId xmlns:p14="http://schemas.microsoft.com/office/powerpoint/2010/main" xmlns:p="http://schemas.openxmlformats.org/presentationml/2006/main" xmlns:r="http://schemas.openxmlformats.org/officeDocument/2006/relationships" xmlns:a="http://schemas.openxmlformats.org/drawingml/2006/main" xmlns="" val="3413358831"/>
+        <p14:creationId xmlns:p14="http://schemas.microsoft.com/office/powerpoint/2010/main" val="3413358831"/>
       </p:ext>
     </p:extLst>
   </p:cSld>
@@ -7565,7 +6885,7 @@
 </file>
 
 <file path=ppt/slideLayouts/slideLayout4.xml><?xml version="1.0" encoding="utf-8"?>
-<p:sldLayout xmlns:a="http://schemas.openxmlformats.org/drawingml/2006/main" xmlns:r="http://schemas.openxmlformats.org/officeDocument/2006/relationships" xmlns:mc="http://schemas.openxmlformats.org/markup-compatibility/2006" xmlns:mv="urn:schemas-microsoft-com:mac:vml" xmlns:p="http://schemas.openxmlformats.org/presentationml/2006/main" mc:Ignorable="mv" mc:PreserveAttributes="mv:*" type="twoObj" preserve="1">
+<p:sldLayout xmlns:a="http://schemas.openxmlformats.org/drawingml/2006/main" xmlns:r="http://schemas.openxmlformats.org/officeDocument/2006/relationships" xmlns:p="http://schemas.openxmlformats.org/presentationml/2006/main" type="twoObj" preserve="1">
   <p:cSld name="Two Content">
     <p:spTree>
       <p:nvGrpSpPr>
@@ -7792,7 +7112,7 @@
             <a:fld id="{A925BE74-8160-3B49-8D0F-E557085791B4}" type="datetimeFigureOut">
               <a:rPr lang="en-US" smtClean="0"/>
               <a:pPr/>
-              <a:t>5/20/14</a:t>
+              <a:t>5/21/14</a:t>
             </a:fld>
             <a:endParaRPr lang="en-US"/>
           </a:p>
@@ -7844,7 +7164,7 @@
     </p:spTree>
     <p:extLst>
       <p:ext uri="{BB962C8B-B14F-4D97-AF65-F5344CB8AC3E}">
-        <p14:creationId xmlns:p14="http://schemas.microsoft.com/office/powerpoint/2010/main" xmlns:p="http://schemas.openxmlformats.org/presentationml/2006/main" xmlns:r="http://schemas.openxmlformats.org/officeDocument/2006/relationships" xmlns:a="http://schemas.openxmlformats.org/drawingml/2006/main" xmlns="" val="3527887012"/>
+        <p14:creationId xmlns:p14="http://schemas.microsoft.com/office/powerpoint/2010/main" val="3527887012"/>
       </p:ext>
     </p:extLst>
   </p:cSld>
@@ -7855,7 +7175,7 @@
 </file>
 
 <file path=ppt/slideLayouts/slideLayout5.xml><?xml version="1.0" encoding="utf-8"?>
-<p:sldLayout xmlns:a="http://schemas.openxmlformats.org/drawingml/2006/main" xmlns:r="http://schemas.openxmlformats.org/officeDocument/2006/relationships" xmlns:mc="http://schemas.openxmlformats.org/markup-compatibility/2006" xmlns:mv="urn:schemas-microsoft-com:mac:vml" xmlns:p="http://schemas.openxmlformats.org/presentationml/2006/main" mc:Ignorable="mv" mc:PreserveAttributes="mv:*" type="twoTxTwoObj" preserve="1">
+<p:sldLayout xmlns:a="http://schemas.openxmlformats.org/drawingml/2006/main" xmlns:r="http://schemas.openxmlformats.org/officeDocument/2006/relationships" xmlns:p="http://schemas.openxmlformats.org/presentationml/2006/main" type="twoTxTwoObj" preserve="1">
   <p:cSld name="Comparison">
     <p:spTree>
       <p:nvGrpSpPr>
@@ -8216,7 +7536,7 @@
             <a:fld id="{A925BE74-8160-3B49-8D0F-E557085791B4}" type="datetimeFigureOut">
               <a:rPr lang="en-US" smtClean="0"/>
               <a:pPr/>
-              <a:t>5/20/14</a:t>
+              <a:t>5/21/14</a:t>
             </a:fld>
             <a:endParaRPr lang="en-US"/>
           </a:p>
@@ -8268,7 +7588,7 @@
     </p:spTree>
     <p:extLst>
       <p:ext uri="{BB962C8B-B14F-4D97-AF65-F5344CB8AC3E}">
-        <p14:creationId xmlns:p14="http://schemas.microsoft.com/office/powerpoint/2010/main" xmlns:p="http://schemas.openxmlformats.org/presentationml/2006/main" xmlns:r="http://schemas.openxmlformats.org/officeDocument/2006/relationships" xmlns:a="http://schemas.openxmlformats.org/drawingml/2006/main" xmlns="" val="147924781"/>
+        <p14:creationId xmlns:p14="http://schemas.microsoft.com/office/powerpoint/2010/main" val="147924781"/>
       </p:ext>
     </p:extLst>
   </p:cSld>
@@ -8279,7 +7599,7 @@
 </file>
 
 <file path=ppt/slideLayouts/slideLayout6.xml><?xml version="1.0" encoding="utf-8"?>
-<p:sldLayout xmlns:a="http://schemas.openxmlformats.org/drawingml/2006/main" xmlns:r="http://schemas.openxmlformats.org/officeDocument/2006/relationships" xmlns:mc="http://schemas.openxmlformats.org/markup-compatibility/2006" xmlns:mv="urn:schemas-microsoft-com:mac:vml" xmlns:p="http://schemas.openxmlformats.org/presentationml/2006/main" mc:Ignorable="mv" mc:PreserveAttributes="mv:*" type="titleOnly" preserve="1">
+<p:sldLayout xmlns:a="http://schemas.openxmlformats.org/drawingml/2006/main" xmlns:r="http://schemas.openxmlformats.org/officeDocument/2006/relationships" xmlns:p="http://schemas.openxmlformats.org/presentationml/2006/main" type="titleOnly" preserve="1">
   <p:cSld name="Title Only">
     <p:spTree>
       <p:nvGrpSpPr>
@@ -8336,7 +7656,7 @@
             <a:fld id="{A925BE74-8160-3B49-8D0F-E557085791B4}" type="datetimeFigureOut">
               <a:rPr lang="en-US" smtClean="0"/>
               <a:pPr/>
-              <a:t>5/20/14</a:t>
+              <a:t>5/21/14</a:t>
             </a:fld>
             <a:endParaRPr lang="en-US"/>
           </a:p>
@@ -8388,7 +7708,7 @@
     </p:spTree>
     <p:extLst>
       <p:ext uri="{BB962C8B-B14F-4D97-AF65-F5344CB8AC3E}">
-        <p14:creationId xmlns:p14="http://schemas.microsoft.com/office/powerpoint/2010/main" xmlns:p="http://schemas.openxmlformats.org/presentationml/2006/main" xmlns:r="http://schemas.openxmlformats.org/officeDocument/2006/relationships" xmlns:a="http://schemas.openxmlformats.org/drawingml/2006/main" xmlns="" val="2914893348"/>
+        <p14:creationId xmlns:p14="http://schemas.microsoft.com/office/powerpoint/2010/main" val="2914893348"/>
       </p:ext>
     </p:extLst>
   </p:cSld>
@@ -8399,7 +7719,7 @@
 </file>
 
 <file path=ppt/slideLayouts/slideLayout7.xml><?xml version="1.0" encoding="utf-8"?>
-<p:sldLayout xmlns:a="http://schemas.openxmlformats.org/drawingml/2006/main" xmlns:r="http://schemas.openxmlformats.org/officeDocument/2006/relationships" xmlns:mc="http://schemas.openxmlformats.org/markup-compatibility/2006" xmlns:mv="urn:schemas-microsoft-com:mac:vml" xmlns:p="http://schemas.openxmlformats.org/presentationml/2006/main" mc:Ignorable="mv" mc:PreserveAttributes="mv:*" type="blank" preserve="1">
+<p:sldLayout xmlns:a="http://schemas.openxmlformats.org/drawingml/2006/main" xmlns:r="http://schemas.openxmlformats.org/officeDocument/2006/relationships" xmlns:p="http://schemas.openxmlformats.org/presentationml/2006/main" type="blank" preserve="1">
   <p:cSld name="Blank">
     <p:spTree>
       <p:nvGrpSpPr>
@@ -8433,7 +7753,7 @@
             <a:fld id="{A925BE74-8160-3B49-8D0F-E557085791B4}" type="datetimeFigureOut">
               <a:rPr lang="en-US" smtClean="0"/>
               <a:pPr/>
-              <a:t>5/20/14</a:t>
+              <a:t>5/21/14</a:t>
             </a:fld>
             <a:endParaRPr lang="en-US"/>
           </a:p>
@@ -8485,7 +7805,7 @@
     </p:spTree>
     <p:extLst>
       <p:ext uri="{BB962C8B-B14F-4D97-AF65-F5344CB8AC3E}">
-        <p14:creationId xmlns:p14="http://schemas.microsoft.com/office/powerpoint/2010/main" xmlns:p="http://schemas.openxmlformats.org/presentationml/2006/main" xmlns:r="http://schemas.openxmlformats.org/officeDocument/2006/relationships" xmlns:a="http://schemas.openxmlformats.org/drawingml/2006/main" xmlns="" val="1638083261"/>
+        <p14:creationId xmlns:p14="http://schemas.microsoft.com/office/powerpoint/2010/main" val="1638083261"/>
       </p:ext>
     </p:extLst>
   </p:cSld>
@@ -8496,7 +7816,7 @@
 </file>
 
 <file path=ppt/slideLayouts/slideLayout8.xml><?xml version="1.0" encoding="utf-8"?>
-<p:sldLayout xmlns:a="http://schemas.openxmlformats.org/drawingml/2006/main" xmlns:r="http://schemas.openxmlformats.org/officeDocument/2006/relationships" xmlns:mc="http://schemas.openxmlformats.org/markup-compatibility/2006" xmlns:mv="urn:schemas-microsoft-com:mac:vml" xmlns:p="http://schemas.openxmlformats.org/presentationml/2006/main" mc:Ignorable="mv" mc:PreserveAttributes="mv:*" type="objTx" preserve="1">
+<p:sldLayout xmlns:a="http://schemas.openxmlformats.org/drawingml/2006/main" xmlns:r="http://schemas.openxmlformats.org/officeDocument/2006/relationships" xmlns:p="http://schemas.openxmlformats.org/presentationml/2006/main" type="objTx" preserve="1">
   <p:cSld name="Content with Caption">
     <p:spTree>
       <p:nvGrpSpPr>
@@ -8712,7 +8032,7 @@
             <a:fld id="{A925BE74-8160-3B49-8D0F-E557085791B4}" type="datetimeFigureOut">
               <a:rPr lang="en-US" smtClean="0"/>
               <a:pPr/>
-              <a:t>5/20/14</a:t>
+              <a:t>5/21/14</a:t>
             </a:fld>
             <a:endParaRPr lang="en-US"/>
           </a:p>
@@ -8764,7 +8084,7 @@
     </p:spTree>
     <p:extLst>
       <p:ext uri="{BB962C8B-B14F-4D97-AF65-F5344CB8AC3E}">
-        <p14:creationId xmlns:p14="http://schemas.microsoft.com/office/powerpoint/2010/main" xmlns:p="http://schemas.openxmlformats.org/presentationml/2006/main" xmlns:r="http://schemas.openxmlformats.org/officeDocument/2006/relationships" xmlns:a="http://schemas.openxmlformats.org/drawingml/2006/main" xmlns="" val="1054110220"/>
+        <p14:creationId xmlns:p14="http://schemas.microsoft.com/office/powerpoint/2010/main" val="1054110220"/>
       </p:ext>
     </p:extLst>
   </p:cSld>
@@ -8775,7 +8095,7 @@
 </file>
 
 <file path=ppt/slideLayouts/slideLayout9.xml><?xml version="1.0" encoding="utf-8"?>
-<p:sldLayout xmlns:a="http://schemas.openxmlformats.org/drawingml/2006/main" xmlns:r="http://schemas.openxmlformats.org/officeDocument/2006/relationships" xmlns:mc="http://schemas.openxmlformats.org/markup-compatibility/2006" xmlns:mv="urn:schemas-microsoft-com:mac:vml" xmlns:p="http://schemas.openxmlformats.org/presentationml/2006/main" mc:Ignorable="mv" mc:PreserveAttributes="mv:*" type="picTx" preserve="1">
+<p:sldLayout xmlns:a="http://schemas.openxmlformats.org/drawingml/2006/main" xmlns:r="http://schemas.openxmlformats.org/officeDocument/2006/relationships" xmlns:p="http://schemas.openxmlformats.org/presentationml/2006/main" type="picTx" preserve="1">
   <p:cSld name="Picture with Caption">
     <p:spTree>
       <p:nvGrpSpPr>
@@ -8967,7 +8287,7 @@
             <a:fld id="{A925BE74-8160-3B49-8D0F-E557085791B4}" type="datetimeFigureOut">
               <a:rPr lang="en-US" smtClean="0"/>
               <a:pPr/>
-              <a:t>5/20/14</a:t>
+              <a:t>5/21/14</a:t>
             </a:fld>
             <a:endParaRPr lang="en-US"/>
           </a:p>
@@ -9019,7 +8339,7 @@
     </p:spTree>
     <p:extLst>
       <p:ext uri="{BB962C8B-B14F-4D97-AF65-F5344CB8AC3E}">
-        <p14:creationId xmlns:p14="http://schemas.microsoft.com/office/powerpoint/2010/main" xmlns:p="http://schemas.openxmlformats.org/presentationml/2006/main" xmlns:r="http://schemas.openxmlformats.org/officeDocument/2006/relationships" xmlns:a="http://schemas.openxmlformats.org/drawingml/2006/main" xmlns="" val="1447250729"/>
+        <p14:creationId xmlns:p14="http://schemas.microsoft.com/office/powerpoint/2010/main" val="1447250729"/>
       </p:ext>
     </p:extLst>
   </p:cSld>
@@ -9030,7 +8350,7 @@
 </file>
 
 <file path=ppt/slideMasters/slideMaster1.xml><?xml version="1.0" encoding="utf-8"?>
-<p:sldMaster xmlns:a="http://schemas.openxmlformats.org/drawingml/2006/main" xmlns:r="http://schemas.openxmlformats.org/officeDocument/2006/relationships" xmlns:mc="http://schemas.openxmlformats.org/markup-compatibility/2006" xmlns:mv="urn:schemas-microsoft-com:mac:vml" xmlns:p="http://schemas.openxmlformats.org/presentationml/2006/main" mc:Ignorable="mv" mc:PreserveAttributes="mv:*">
+<p:sldMaster xmlns:a="http://schemas.openxmlformats.org/drawingml/2006/main" xmlns:r="http://schemas.openxmlformats.org/officeDocument/2006/relationships" xmlns:p="http://schemas.openxmlformats.org/presentationml/2006/main">
   <p:cSld>
     <p:bg>
       <p:bgRef idx="1001">
@@ -9182,7 +8502,7 @@
             <a:fld id="{A925BE74-8160-3B49-8D0F-E557085791B4}" type="datetimeFigureOut">
               <a:rPr lang="en-US" smtClean="0"/>
               <a:pPr/>
-              <a:t>5/20/14</a:t>
+              <a:t>5/21/14</a:t>
             </a:fld>
             <a:endParaRPr lang="en-US"/>
           </a:p>
@@ -9270,7 +8590,7 @@
     </p:spTree>
     <p:extLst>
       <p:ext uri="{BB962C8B-B14F-4D97-AF65-F5344CB8AC3E}">
-        <p14:creationId xmlns:p14="http://schemas.microsoft.com/office/powerpoint/2010/main" xmlns:p="http://schemas.openxmlformats.org/presentationml/2006/main" xmlns:r="http://schemas.openxmlformats.org/officeDocument/2006/relationships" xmlns:a="http://schemas.openxmlformats.org/drawingml/2006/main" xmlns="" val="3991627659"/>
+        <p14:creationId xmlns:p14="http://schemas.microsoft.com/office/powerpoint/2010/main" val="3991627659"/>
       </p:ext>
     </p:extLst>
   </p:cSld>
@@ -9542,7 +8862,7 @@
 </file>
 
 <file path=ppt/slides/slide1.xml><?xml version="1.0" encoding="utf-8"?>
-<p:sld xmlns:a="http://schemas.openxmlformats.org/drawingml/2006/main" xmlns:r="http://schemas.openxmlformats.org/officeDocument/2006/relationships" xmlns:mc="http://schemas.openxmlformats.org/markup-compatibility/2006" xmlns:mv="urn:schemas-microsoft-com:mac:vml" xmlns:p="http://schemas.openxmlformats.org/presentationml/2006/main" mc:Ignorable="mv" mc:PreserveAttributes="mv:*">
+<p:sld xmlns:a="http://schemas.openxmlformats.org/drawingml/2006/main" xmlns:r="http://schemas.openxmlformats.org/officeDocument/2006/relationships" xmlns:p="http://schemas.openxmlformats.org/presentationml/2006/main">
   <p:cSld>
     <p:spTree>
       <p:nvGrpSpPr>
@@ -9622,7 +8942,7 @@
     </p:spTree>
     <p:extLst>
       <p:ext uri="{BB962C8B-B14F-4D97-AF65-F5344CB8AC3E}">
-        <p14:creationId xmlns:p14="http://schemas.microsoft.com/office/powerpoint/2010/main" xmlns:p="http://schemas.openxmlformats.org/presentationml/2006/main" xmlns:r="http://schemas.openxmlformats.org/officeDocument/2006/relationships" xmlns:a="http://schemas.openxmlformats.org/drawingml/2006/main" xmlns="" val="2045397996"/>
+        <p14:creationId xmlns:p14="http://schemas.microsoft.com/office/powerpoint/2010/main" val="2045397996"/>
       </p:ext>
     </p:extLst>
   </p:cSld>
@@ -9632,7 +8952,7 @@
   <p:timing>
     <p:tnLst>
       <p:par>
-        <p:cTn id="1" dur="indefinite" restart="never" nodeType="tmRoot"/>
+        <p:cTn xmlns:p14="http://schemas.microsoft.com/office/powerpoint/2010/main" id="1" dur="indefinite" restart="never" nodeType="tmRoot"/>
       </p:par>
     </p:tnLst>
   </p:timing>
@@ -9640,7 +8960,7 @@
 </file>
 
 <file path=ppt/slides/slide10.xml><?xml version="1.0" encoding="utf-8"?>
-<p:sld xmlns:a="http://schemas.openxmlformats.org/drawingml/2006/main" xmlns:r="http://schemas.openxmlformats.org/officeDocument/2006/relationships" xmlns:mc="http://schemas.openxmlformats.org/markup-compatibility/2006" xmlns:mv="urn:schemas-microsoft-com:mac:vml" xmlns:p="http://schemas.openxmlformats.org/presentationml/2006/main" mc:Ignorable="mv" mc:PreserveAttributes="mv:*">
+<p:sld xmlns:a="http://schemas.openxmlformats.org/drawingml/2006/main" xmlns:r="http://schemas.openxmlformats.org/officeDocument/2006/relationships" xmlns:p="http://schemas.openxmlformats.org/presentationml/2006/main">
   <p:cSld>
     <p:spTree>
       <p:nvGrpSpPr>
@@ -10238,7 +9558,7 @@
     </p:spTree>
     <p:extLst>
       <p:ext uri="{BB962C8B-B14F-4D97-AF65-F5344CB8AC3E}">
-        <p14:creationId xmlns:p14="http://schemas.microsoft.com/office/powerpoint/2010/main" xmlns:p="http://schemas.openxmlformats.org/presentationml/2006/main" xmlns:r="http://schemas.openxmlformats.org/officeDocument/2006/relationships" xmlns:a="http://schemas.openxmlformats.org/drawingml/2006/main" xmlns="" val="361469358"/>
+        <p14:creationId xmlns:p14="http://schemas.microsoft.com/office/powerpoint/2010/main" val="361469358"/>
       </p:ext>
     </p:extLst>
   </p:cSld>
@@ -10248,7 +9568,7 @@
   <p:timing>
     <p:tnLst>
       <p:par>
-        <p:cTn id="1" dur="indefinite" restart="never" nodeType="tmRoot"/>
+        <p:cTn xmlns:p14="http://schemas.microsoft.com/office/powerpoint/2010/main" id="1" dur="indefinite" restart="never" nodeType="tmRoot"/>
       </p:par>
     </p:tnLst>
   </p:timing>
@@ -10256,7 +9576,7 @@
 </file>
 
 <file path=ppt/slides/slide11.xml><?xml version="1.0" encoding="utf-8"?>
-<p:sld xmlns:a="http://schemas.openxmlformats.org/drawingml/2006/main" xmlns:r="http://schemas.openxmlformats.org/officeDocument/2006/relationships" xmlns:mc="http://schemas.openxmlformats.org/markup-compatibility/2006" xmlns:mv="urn:schemas-microsoft-com:mac:vml" xmlns:p="http://schemas.openxmlformats.org/presentationml/2006/main" mc:Ignorable="mv" mc:PreserveAttributes="mv:*">
+<p:sld xmlns:a="http://schemas.openxmlformats.org/drawingml/2006/main" xmlns:r="http://schemas.openxmlformats.org/officeDocument/2006/relationships" xmlns:p="http://schemas.openxmlformats.org/presentationml/2006/main">
   <p:cSld>
     <p:spTree>
       <p:nvGrpSpPr>
@@ -10779,7 +10099,7 @@
     </p:spTree>
     <p:extLst>
       <p:ext uri="{BB962C8B-B14F-4D97-AF65-F5344CB8AC3E}">
-        <p14:creationId xmlns:p14="http://schemas.microsoft.com/office/powerpoint/2010/main" xmlns:p="http://schemas.openxmlformats.org/presentationml/2006/main" xmlns:r="http://schemas.openxmlformats.org/officeDocument/2006/relationships" xmlns:a="http://schemas.openxmlformats.org/drawingml/2006/main" xmlns="" val="1200934987"/>
+        <p14:creationId xmlns:p14="http://schemas.microsoft.com/office/powerpoint/2010/main" val="1200934987"/>
       </p:ext>
     </p:extLst>
   </p:cSld>
@@ -10789,7 +10109,7 @@
   <p:timing>
     <p:tnLst>
       <p:par>
-        <p:cTn id="1" dur="indefinite" restart="never" nodeType="tmRoot"/>
+        <p:cTn xmlns:p14="http://schemas.microsoft.com/office/powerpoint/2010/main" id="1" dur="indefinite" restart="never" nodeType="tmRoot"/>
       </p:par>
     </p:tnLst>
   </p:timing>
@@ -10797,7 +10117,7 @@
 </file>
 
 <file path=ppt/slides/slide12.xml><?xml version="1.0" encoding="utf-8"?>
-<p:sld xmlns:a="http://schemas.openxmlformats.org/drawingml/2006/main" xmlns:r="http://schemas.openxmlformats.org/officeDocument/2006/relationships" xmlns:mc="http://schemas.openxmlformats.org/markup-compatibility/2006" xmlns:mv="urn:schemas-microsoft-com:mac:vml" xmlns:p="http://schemas.openxmlformats.org/presentationml/2006/main" mc:Ignorable="mv" mc:PreserveAttributes="mv:*">
+<p:sld xmlns:a="http://schemas.openxmlformats.org/drawingml/2006/main" xmlns:r="http://schemas.openxmlformats.org/officeDocument/2006/relationships" xmlns:p="http://schemas.openxmlformats.org/presentationml/2006/main">
   <p:cSld>
     <p:spTree>
       <p:nvGrpSpPr>
@@ -11335,7 +10655,7 @@
     </p:spTree>
     <p:extLst>
       <p:ext uri="{BB962C8B-B14F-4D97-AF65-F5344CB8AC3E}">
-        <p14:creationId xmlns:p14="http://schemas.microsoft.com/office/powerpoint/2010/main" xmlns:p="http://schemas.openxmlformats.org/presentationml/2006/main" xmlns:r="http://schemas.openxmlformats.org/officeDocument/2006/relationships" xmlns:a="http://schemas.openxmlformats.org/drawingml/2006/main" xmlns="" val="1657967765"/>
+        <p14:creationId xmlns:p14="http://schemas.microsoft.com/office/powerpoint/2010/main" val="1657967765"/>
       </p:ext>
     </p:extLst>
   </p:cSld>
@@ -11345,7 +10665,7 @@
   <p:timing>
     <p:tnLst>
       <p:par>
-        <p:cTn id="1" dur="indefinite" restart="never" nodeType="tmRoot"/>
+        <p:cTn xmlns:p14="http://schemas.microsoft.com/office/powerpoint/2010/main" id="1" dur="indefinite" restart="never" nodeType="tmRoot"/>
       </p:par>
     </p:tnLst>
   </p:timing>
@@ -11353,7 +10673,7 @@
 </file>
 
 <file path=ppt/slides/slide13.xml><?xml version="1.0" encoding="utf-8"?>
-<p:sld xmlns:a="http://schemas.openxmlformats.org/drawingml/2006/main" xmlns:r="http://schemas.openxmlformats.org/officeDocument/2006/relationships" xmlns:mc="http://schemas.openxmlformats.org/markup-compatibility/2006" xmlns:mv="urn:schemas-microsoft-com:mac:vml" xmlns:p="http://schemas.openxmlformats.org/presentationml/2006/main" mc:Ignorable="mv" mc:PreserveAttributes="mv:*">
+<p:sld xmlns:a="http://schemas.openxmlformats.org/drawingml/2006/main" xmlns:r="http://schemas.openxmlformats.org/officeDocument/2006/relationships" xmlns:p="http://schemas.openxmlformats.org/presentationml/2006/main">
   <p:cSld>
     <p:spTree>
       <p:nvGrpSpPr>
@@ -11916,7 +11236,7 @@
     </p:spTree>
     <p:extLst>
       <p:ext uri="{BB962C8B-B14F-4D97-AF65-F5344CB8AC3E}">
-        <p14:creationId xmlns:p14="http://schemas.microsoft.com/office/powerpoint/2010/main" xmlns:p="http://schemas.openxmlformats.org/presentationml/2006/main" xmlns:r="http://schemas.openxmlformats.org/officeDocument/2006/relationships" xmlns:a="http://schemas.openxmlformats.org/drawingml/2006/main" xmlns="" val="1251895611"/>
+        <p14:creationId xmlns:p14="http://schemas.microsoft.com/office/powerpoint/2010/main" val="1251895611"/>
       </p:ext>
     </p:extLst>
   </p:cSld>
@@ -11926,7 +11246,7 @@
   <p:timing>
     <p:tnLst>
       <p:par>
-        <p:cTn id="1" dur="indefinite" restart="never" nodeType="tmRoot"/>
+        <p:cTn xmlns:p14="http://schemas.microsoft.com/office/powerpoint/2010/main" id="1" dur="indefinite" restart="never" nodeType="tmRoot"/>
       </p:par>
     </p:tnLst>
   </p:timing>
@@ -11934,7 +11254,7 @@
 </file>
 
 <file path=ppt/slides/slide14.xml><?xml version="1.0" encoding="utf-8"?>
-<p:sld xmlns:a="http://schemas.openxmlformats.org/drawingml/2006/main" xmlns:r="http://schemas.openxmlformats.org/officeDocument/2006/relationships" xmlns:mc="http://schemas.openxmlformats.org/markup-compatibility/2006" xmlns:mv="urn:schemas-microsoft-com:mac:vml" xmlns:p="http://schemas.openxmlformats.org/presentationml/2006/main" mc:Ignorable="mv" mc:PreserveAttributes="mv:*">
+<p:sld xmlns:a="http://schemas.openxmlformats.org/drawingml/2006/main" xmlns:r="http://schemas.openxmlformats.org/officeDocument/2006/relationships" xmlns:p="http://schemas.openxmlformats.org/presentationml/2006/main">
   <p:cSld>
     <p:spTree>
       <p:nvGrpSpPr>
@@ -12344,185 +11664,8 @@
             <a:pPr marL="0" indent="0">
               <a:buNone/>
             </a:pPr>
-            <a:endParaRPr lang="en-US" sz="2400" dirty="0" smtClean="0">
-              <a:latin typeface="Consolas"/>
-              <a:cs typeface="Consolas"/>
-            </a:endParaRPr>
-          </a:p>
-          <a:p>
-            <a:pPr marL="0" indent="0">
-              <a:buNone/>
-            </a:pPr>
-            <a:endParaRPr lang="en-US" sz="2400" dirty="0">
-              <a:latin typeface="Consolas"/>
-              <a:cs typeface="Consolas"/>
-            </a:endParaRPr>
-          </a:p>
-          <a:p>
-            <a:pPr marL="0" indent="0">
-              <a:buNone/>
-            </a:pPr>
-            <a:r>
-              <a:rPr lang="en-US" sz="2400" dirty="0" smtClean="0">
-                <a:solidFill>
-                  <a:srgbClr val="558ED5"/>
-                </a:solidFill>
-                <a:latin typeface="Consolas"/>
-                <a:cs typeface="Consolas"/>
-              </a:rPr>
-              <a:t>%_</a:t>
-            </a:r>
-            <a:r>
-              <a:rPr lang="en-US" sz="2400" dirty="0" err="1" smtClean="0">
-                <a:solidFill>
-                  <a:srgbClr val="558ED5"/>
-                </a:solidFill>
-                <a:latin typeface="Consolas"/>
-                <a:cs typeface="Consolas"/>
-              </a:rPr>
-              <a:t>aa_freq.tsv</a:t>
-            </a:r>
-            <a:r>
-              <a:rPr lang="en-US" sz="2400" dirty="0" smtClean="0">
-                <a:latin typeface="Consolas"/>
-                <a:cs typeface="Consolas"/>
-              </a:rPr>
-              <a:t>: </a:t>
-            </a:r>
-            <a:r>
-              <a:rPr lang="en-US" sz="2400" dirty="0" smtClean="0">
-                <a:solidFill>
-                  <a:srgbClr val="77933C"/>
-                </a:solidFill>
-                <a:latin typeface="Consolas"/>
-                <a:cs typeface="Consolas"/>
-              </a:rPr>
-              <a:t>%_</a:t>
-            </a:r>
-            <a:r>
-              <a:rPr lang="en-US" sz="2400" dirty="0" err="1" smtClean="0">
-                <a:solidFill>
-                  <a:srgbClr val="77933C"/>
-                </a:solidFill>
-                <a:latin typeface="Consolas"/>
-                <a:cs typeface="Consolas"/>
-              </a:rPr>
-              <a:t>aa.nxs</a:t>
-            </a:r>
-            <a:endParaRPr lang="en-US" sz="2400" dirty="0" smtClean="0">
-              <a:solidFill>
-                <a:srgbClr val="77933C"/>
-              </a:solidFill>
-              <a:latin typeface="Consolas"/>
-              <a:cs typeface="Consolas"/>
-            </a:endParaRPr>
-          </a:p>
-          <a:p>
-            <a:pPr marL="0" indent="0">
-              <a:buNone/>
-            </a:pPr>
-            <a:r>
-              <a:rPr lang="en-US" sz="2400" dirty="0" smtClean="0">
-                <a:latin typeface="Consolas"/>
-                <a:cs typeface="Consolas"/>
-              </a:rPr>
-              <a:t>	</a:t>
-            </a:r>
-            <a:r>
-              <a:rPr lang="en-US" sz="2400" dirty="0" err="1" smtClean="0">
-                <a:latin typeface="Consolas"/>
-                <a:cs typeface="Consolas"/>
-              </a:rPr>
-              <a:t>perl</a:t>
-            </a:r>
-            <a:r>
-              <a:rPr lang="en-US" sz="2400" dirty="0" smtClean="0">
-                <a:latin typeface="Consolas"/>
-                <a:cs typeface="Consolas"/>
-              </a:rPr>
-              <a:t> </a:t>
-            </a:r>
-            <a:r>
-              <a:rPr lang="en-US" sz="2400" dirty="0" err="1" smtClean="0">
-                <a:latin typeface="Consolas"/>
-                <a:cs typeface="Consolas"/>
-              </a:rPr>
-              <a:t>CountAAFreq.pl</a:t>
-            </a:r>
-            <a:r>
-              <a:rPr lang="en-US" sz="2400" dirty="0" smtClean="0">
-                <a:latin typeface="Consolas"/>
-                <a:cs typeface="Consolas"/>
-              </a:rPr>
-              <a:t> </a:t>
-            </a:r>
             <a:r>
               <a:rPr lang="en-US" sz="2400" dirty="0">
-                <a:solidFill>
-                  <a:srgbClr val="77933C"/>
-                </a:solidFill>
-                <a:latin typeface="Consolas"/>
-                <a:cs typeface="Consolas"/>
-              </a:rPr>
-              <a:t>$&lt;</a:t>
-            </a:r>
-            <a:r>
-              <a:rPr lang="en-US" sz="2400" dirty="0">
-                <a:latin typeface="Consolas"/>
-                <a:cs typeface="Consolas"/>
-              </a:rPr>
-              <a:t> </a:t>
-            </a:r>
-            <a:r>
-              <a:rPr lang="en-US" sz="2400" dirty="0">
-                <a:solidFill>
-                  <a:srgbClr val="558ED5"/>
-                </a:solidFill>
-                <a:latin typeface="Consolas"/>
-                <a:cs typeface="Consolas"/>
-              </a:rPr>
-              <a:t>$</a:t>
-            </a:r>
-            <a:r>
-              <a:rPr lang="en-US" sz="2400" dirty="0" smtClean="0">
-                <a:solidFill>
-                  <a:srgbClr val="558ED5"/>
-                </a:solidFill>
-                <a:latin typeface="Consolas"/>
-                <a:cs typeface="Consolas"/>
-              </a:rPr>
-              <a:t>@</a:t>
-            </a:r>
-            <a:r>
-              <a:rPr lang="en-US" sz="2400" dirty="0" smtClean="0">
-                <a:latin typeface="Consolas"/>
-                <a:cs typeface="Consolas"/>
-              </a:rPr>
-              <a:t> 0.25 </a:t>
-            </a:r>
-            <a:r>
-              <a:rPr lang="en-US" sz="2400" dirty="0" smtClean="0">
-                <a:latin typeface="Consolas"/>
-                <a:cs typeface="Consolas"/>
-              </a:rPr>
-              <a:t>0.5</a:t>
-            </a:r>
-          </a:p>
-          <a:p>
-            <a:pPr marL="0" indent="0">
-              <a:buNone/>
-            </a:pPr>
-            <a:endParaRPr lang="en-US" sz="2400" dirty="0" smtClean="0">
-              <a:latin typeface="Consolas"/>
-              <a:cs typeface="Consolas"/>
-            </a:endParaRPr>
-          </a:p>
-          <a:p>
-            <a:pPr marL="0" indent="0">
-              <a:buNone/>
-            </a:pPr>
-            <a:r>
-              <a:rPr lang="en-US" sz="2400" dirty="0" smtClean="0">
                 <a:solidFill>
                   <a:schemeClr val="tx1">
                     <a:lumMod val="65000"/>
@@ -12535,7 +11678,7 @@
               <a:t># make </a:t>
             </a:r>
             <a:r>
-              <a:rPr lang="en-US" sz="2400" dirty="0" err="1" smtClean="0">
+              <a:rPr lang="en-US" sz="2400" dirty="0" err="1">
                 <a:solidFill>
                   <a:schemeClr val="tx1">
                     <a:lumMod val="65000"/>
@@ -12547,7 +11690,7 @@
               </a:rPr>
               <a:t>pic_aa_freq.tsv</a:t>
             </a:r>
-            <a:endParaRPr lang="en-US" sz="2400" dirty="0" smtClean="0">
+            <a:endParaRPr lang="en-US" sz="2400" dirty="0">
               <a:solidFill>
                 <a:schemeClr val="tx1">
                   <a:lumMod val="65000"/>
@@ -12558,12 +11701,173 @@
               <a:cs typeface="Consolas"/>
             </a:endParaRPr>
           </a:p>
+          <a:p>
+            <a:pPr marL="0" indent="0">
+              <a:buNone/>
+            </a:pPr>
+            <a:endParaRPr lang="en-US" sz="2400" dirty="0">
+              <a:latin typeface="Consolas"/>
+              <a:cs typeface="Consolas"/>
+            </a:endParaRPr>
+          </a:p>
+          <a:p>
+            <a:pPr marL="0" indent="0">
+              <a:buNone/>
+            </a:pPr>
+            <a:r>
+              <a:rPr lang="en-US" sz="2400" dirty="0" smtClean="0">
+                <a:solidFill>
+                  <a:srgbClr val="558ED5"/>
+                </a:solidFill>
+                <a:latin typeface="Consolas"/>
+                <a:cs typeface="Consolas"/>
+              </a:rPr>
+              <a:t>%_</a:t>
+            </a:r>
+            <a:r>
+              <a:rPr lang="en-US" sz="2400" dirty="0" err="1" smtClean="0">
+                <a:solidFill>
+                  <a:srgbClr val="558ED5"/>
+                </a:solidFill>
+                <a:latin typeface="Consolas"/>
+                <a:cs typeface="Consolas"/>
+              </a:rPr>
+              <a:t>aa_freq.tsv</a:t>
+            </a:r>
+            <a:r>
+              <a:rPr lang="en-US" sz="2400" dirty="0" smtClean="0">
+                <a:latin typeface="Consolas"/>
+                <a:cs typeface="Consolas"/>
+              </a:rPr>
+              <a:t>: </a:t>
+            </a:r>
+            <a:r>
+              <a:rPr lang="en-US" sz="2400" dirty="0" smtClean="0">
+                <a:solidFill>
+                  <a:srgbClr val="77933C"/>
+                </a:solidFill>
+                <a:latin typeface="Consolas"/>
+                <a:cs typeface="Consolas"/>
+              </a:rPr>
+              <a:t>%_</a:t>
+            </a:r>
+            <a:r>
+              <a:rPr lang="en-US" sz="2400" dirty="0" err="1" smtClean="0">
+                <a:solidFill>
+                  <a:srgbClr val="77933C"/>
+                </a:solidFill>
+                <a:latin typeface="Consolas"/>
+                <a:cs typeface="Consolas"/>
+              </a:rPr>
+              <a:t>aa.nxs</a:t>
+            </a:r>
+            <a:endParaRPr lang="en-US" sz="2400" dirty="0" smtClean="0">
+              <a:solidFill>
+                <a:srgbClr val="77933C"/>
+              </a:solidFill>
+              <a:latin typeface="Consolas"/>
+              <a:cs typeface="Consolas"/>
+            </a:endParaRPr>
+          </a:p>
+          <a:p>
+            <a:pPr marL="0" indent="0">
+              <a:buNone/>
+            </a:pPr>
+            <a:r>
+              <a:rPr lang="en-US" sz="2400" dirty="0" smtClean="0">
+                <a:latin typeface="Consolas"/>
+                <a:cs typeface="Consolas"/>
+              </a:rPr>
+              <a:t>	</a:t>
+            </a:r>
+            <a:r>
+              <a:rPr lang="en-US" sz="2400" dirty="0" err="1" smtClean="0">
+                <a:latin typeface="Consolas"/>
+                <a:cs typeface="Consolas"/>
+              </a:rPr>
+              <a:t>perl</a:t>
+            </a:r>
+            <a:r>
+              <a:rPr lang="en-US" sz="2400" dirty="0" smtClean="0">
+                <a:latin typeface="Consolas"/>
+                <a:cs typeface="Consolas"/>
+              </a:rPr>
+              <a:t> </a:t>
+            </a:r>
+            <a:r>
+              <a:rPr lang="en-US" sz="2400" dirty="0" err="1" smtClean="0">
+                <a:latin typeface="Consolas"/>
+                <a:cs typeface="Consolas"/>
+              </a:rPr>
+              <a:t>CountAAFreq.pl</a:t>
+            </a:r>
+            <a:r>
+              <a:rPr lang="en-US" sz="2400" dirty="0" smtClean="0">
+                <a:latin typeface="Consolas"/>
+                <a:cs typeface="Consolas"/>
+              </a:rPr>
+              <a:t> </a:t>
+            </a:r>
+            <a:r>
+              <a:rPr lang="en-US" sz="2400" dirty="0">
+                <a:solidFill>
+                  <a:srgbClr val="77933C"/>
+                </a:solidFill>
+                <a:latin typeface="Consolas"/>
+                <a:cs typeface="Consolas"/>
+              </a:rPr>
+              <a:t>$&lt;</a:t>
+            </a:r>
+            <a:r>
+              <a:rPr lang="en-US" sz="2400" dirty="0">
+                <a:latin typeface="Consolas"/>
+                <a:cs typeface="Consolas"/>
+              </a:rPr>
+              <a:t> </a:t>
+            </a:r>
+            <a:r>
+              <a:rPr lang="en-US" sz="2400" dirty="0">
+                <a:solidFill>
+                  <a:srgbClr val="558ED5"/>
+                </a:solidFill>
+                <a:latin typeface="Consolas"/>
+                <a:cs typeface="Consolas"/>
+              </a:rPr>
+              <a:t>$</a:t>
+            </a:r>
+            <a:r>
+              <a:rPr lang="en-US" sz="2400" dirty="0" smtClean="0">
+                <a:solidFill>
+                  <a:srgbClr val="558ED5"/>
+                </a:solidFill>
+                <a:latin typeface="Consolas"/>
+                <a:cs typeface="Consolas"/>
+              </a:rPr>
+              <a:t>@</a:t>
+            </a:r>
+            <a:r>
+              <a:rPr lang="en-US" sz="2400" dirty="0" smtClean="0">
+                <a:latin typeface="Consolas"/>
+                <a:cs typeface="Consolas"/>
+              </a:rPr>
+              <a:t> 0.25 0.5</a:t>
+            </a:r>
+          </a:p>
+          <a:p>
+            <a:pPr marL="0" indent="0">
+              <a:buNone/>
+            </a:pPr>
+            <a:endParaRPr lang="en-US" sz="2400" dirty="0" smtClean="0">
+              <a:latin typeface="Consolas"/>
+              <a:cs typeface="Consolas"/>
+            </a:endParaRPr>
+          </a:p>
         </p:txBody>
       </p:sp>
     </p:spTree>
     <p:extLst>
       <p:ext uri="{BB962C8B-B14F-4D97-AF65-F5344CB8AC3E}">
-        <p14:creationId xmlns:p14="http://schemas.microsoft.com/office/powerpoint/2010/main" xmlns:p="http://schemas.openxmlformats.org/presentationml/2006/main" xmlns:r="http://schemas.openxmlformats.org/officeDocument/2006/relationships" xmlns:a="http://schemas.openxmlformats.org/drawingml/2006/main" xmlns="" val="96192206"/>
+        <p14:creationId xmlns:p14="http://schemas.microsoft.com/office/powerpoint/2010/main" val="96192206"/>
       </p:ext>
     </p:extLst>
   </p:cSld>
@@ -12573,7 +11877,7 @@
   <p:timing>
     <p:tnLst>
       <p:par>
-        <p:cTn id="1" dur="indefinite" restart="never" nodeType="tmRoot"/>
+        <p:cTn xmlns:p14="http://schemas.microsoft.com/office/powerpoint/2010/main" id="1" dur="indefinite" restart="never" nodeType="tmRoot"/>
       </p:par>
     </p:tnLst>
   </p:timing>
@@ -12581,7 +11885,7 @@
 </file>
 
 <file path=ppt/slides/slide15.xml><?xml version="1.0" encoding="utf-8"?>
-<p:sld xmlns:a="http://schemas.openxmlformats.org/drawingml/2006/main" xmlns:r="http://schemas.openxmlformats.org/officeDocument/2006/relationships" xmlns:mc="http://schemas.openxmlformats.org/markup-compatibility/2006" xmlns:mv="urn:schemas-microsoft-com:mac:vml" xmlns:p="http://schemas.openxmlformats.org/presentationml/2006/main" mc:Ignorable="mv" mc:PreserveAttributes="mv:*">
+<p:sld xmlns:a="http://schemas.openxmlformats.org/drawingml/2006/main" xmlns:r="http://schemas.openxmlformats.org/officeDocument/2006/relationships" xmlns:p="http://schemas.openxmlformats.org/presentationml/2006/main">
   <p:cSld>
     <p:spTree>
       <p:nvGrpSpPr>
@@ -12609,7 +11913,7 @@
           <a:blip r:embed="rId2">
             <a:extLst>
               <a:ext uri="{28A0092B-C50C-407E-A947-70E740481C1C}">
-                <a14:useLocalDpi xmlns:a14="http://schemas.microsoft.com/office/drawing/2010/main" xmlns:p="http://schemas.openxmlformats.org/presentationml/2006/main" xmlns:r="http://schemas.openxmlformats.org/officeDocument/2006/relationships" xmlns:a="http://schemas.openxmlformats.org/drawingml/2006/main" xmlns="" val="0"/>
+                <a14:useLocalDpi xmlns:a14="http://schemas.microsoft.com/office/drawing/2010/main" val="0"/>
               </a:ext>
             </a:extLst>
           </a:blip>
@@ -12630,7 +11934,7 @@
     </p:spTree>
     <p:extLst>
       <p:ext uri="{BB962C8B-B14F-4D97-AF65-F5344CB8AC3E}">
-        <p14:creationId xmlns:p14="http://schemas.microsoft.com/office/powerpoint/2010/main" xmlns:p="http://schemas.openxmlformats.org/presentationml/2006/main" xmlns:r="http://schemas.openxmlformats.org/officeDocument/2006/relationships" xmlns:a="http://schemas.openxmlformats.org/drawingml/2006/main" xmlns="" val="9103332"/>
+        <p14:creationId xmlns:p14="http://schemas.microsoft.com/office/powerpoint/2010/main" val="9103332"/>
       </p:ext>
     </p:extLst>
   </p:cSld>
@@ -12640,7 +11944,7 @@
   <p:timing>
     <p:tnLst>
       <p:par>
-        <p:cTn id="1" dur="indefinite" restart="never" nodeType="tmRoot"/>
+        <p:cTn xmlns:p14="http://schemas.microsoft.com/office/powerpoint/2010/main" id="1" dur="indefinite" restart="never" nodeType="tmRoot"/>
       </p:par>
     </p:tnLst>
   </p:timing>
@@ -12648,7 +11952,7 @@
 </file>
 
 <file path=ppt/slides/slide16.xml><?xml version="1.0" encoding="utf-8"?>
-<p:sld xmlns:a="http://schemas.openxmlformats.org/drawingml/2006/main" xmlns:r="http://schemas.openxmlformats.org/officeDocument/2006/relationships" xmlns:mc="http://schemas.openxmlformats.org/markup-compatibility/2006" xmlns:mv="urn:schemas-microsoft-com:mac:vml" xmlns:p="http://schemas.openxmlformats.org/presentationml/2006/main" mc:Ignorable="mv" mc:PreserveAttributes="mv:*">
+<p:sld xmlns:a="http://schemas.openxmlformats.org/drawingml/2006/main" xmlns:r="http://schemas.openxmlformats.org/officeDocument/2006/relationships" xmlns:p="http://schemas.openxmlformats.org/presentationml/2006/main">
   <p:cSld>
     <p:spTree>
       <p:nvGrpSpPr>
@@ -13287,7 +12591,7 @@
     </p:spTree>
     <p:extLst>
       <p:ext uri="{BB962C8B-B14F-4D97-AF65-F5344CB8AC3E}">
-        <p14:creationId xmlns:p14="http://schemas.microsoft.com/office/powerpoint/2010/main" xmlns:p="http://schemas.openxmlformats.org/presentationml/2006/main" xmlns:r="http://schemas.openxmlformats.org/officeDocument/2006/relationships" xmlns:a="http://schemas.openxmlformats.org/drawingml/2006/main" xmlns="" val="765095982"/>
+        <p14:creationId xmlns:p14="http://schemas.microsoft.com/office/powerpoint/2010/main" val="765095982"/>
       </p:ext>
     </p:extLst>
   </p:cSld>
@@ -13297,7 +12601,7 @@
   <p:timing>
     <p:tnLst>
       <p:par>
-        <p:cTn id="1" dur="indefinite" restart="never" nodeType="tmRoot"/>
+        <p:cTn xmlns:p14="http://schemas.microsoft.com/office/powerpoint/2010/main" id="1" dur="indefinite" restart="never" nodeType="tmRoot"/>
       </p:par>
     </p:tnLst>
   </p:timing>
@@ -13305,7 +12609,7 @@
 </file>
 
 <file path=ppt/slides/slide17.xml><?xml version="1.0" encoding="utf-8"?>
-<p:sld xmlns:a="http://schemas.openxmlformats.org/drawingml/2006/main" xmlns:r="http://schemas.openxmlformats.org/officeDocument/2006/relationships" xmlns:mc="http://schemas.openxmlformats.org/markup-compatibility/2006" xmlns:mv="urn:schemas-microsoft-com:mac:vml" xmlns:p="http://schemas.openxmlformats.org/presentationml/2006/main" mc:Ignorable="mv" mc:PreserveAttributes="mv:*">
+<p:sld xmlns:a="http://schemas.openxmlformats.org/drawingml/2006/main" xmlns:r="http://schemas.openxmlformats.org/officeDocument/2006/relationships" xmlns:p="http://schemas.openxmlformats.org/presentationml/2006/main">
   <p:cSld>
     <p:spTree>
       <p:nvGrpSpPr>
@@ -13390,21 +12694,7 @@
                 <a:latin typeface="Consolas"/>
                 <a:cs typeface="Consolas"/>
               </a:rPr>
-              <a:t>:</a:t>
-            </a:r>
-            <a:r>
-              <a:rPr lang="en-US" dirty="0">
-                <a:latin typeface="Consolas"/>
-                <a:cs typeface="Consolas"/>
-              </a:rPr>
-              <a:t>= </a:t>
-            </a:r>
-            <a:r>
-              <a:rPr lang="en-US" dirty="0" smtClean="0">
-                <a:latin typeface="Consolas"/>
-                <a:cs typeface="Consolas"/>
-              </a:rPr>
-              <a:t>Thomas</a:t>
+              <a:t>:= Thomas</a:t>
             </a:r>
             <a:endParaRPr lang="en-US" dirty="0">
               <a:latin typeface="Consolas"/>
@@ -13581,7 +12871,7 @@
     </p:spTree>
     <p:extLst>
       <p:ext uri="{BB962C8B-B14F-4D97-AF65-F5344CB8AC3E}">
-        <p14:creationId xmlns:p14="http://schemas.microsoft.com/office/powerpoint/2010/main" xmlns:p="http://schemas.openxmlformats.org/presentationml/2006/main" xmlns:r="http://schemas.openxmlformats.org/officeDocument/2006/relationships" xmlns:a="http://schemas.openxmlformats.org/drawingml/2006/main" xmlns="" val="1373840466"/>
+        <p14:creationId xmlns:p14="http://schemas.microsoft.com/office/powerpoint/2010/main" val="1373840466"/>
       </p:ext>
     </p:extLst>
   </p:cSld>
@@ -13591,7 +12881,7 @@
   <p:timing>
     <p:tnLst>
       <p:par>
-        <p:cTn id="1" dur="indefinite" restart="never" nodeType="tmRoot"/>
+        <p:cTn xmlns:p14="http://schemas.microsoft.com/office/powerpoint/2010/main" id="1" dur="indefinite" restart="never" nodeType="tmRoot"/>
       </p:par>
     </p:tnLst>
   </p:timing>
@@ -13599,7 +12889,7 @@
 </file>
 
 <file path=ppt/slides/slide18.xml><?xml version="1.0" encoding="utf-8"?>
-<p:sld xmlns:a="http://schemas.openxmlformats.org/drawingml/2006/main" xmlns:r="http://schemas.openxmlformats.org/officeDocument/2006/relationships" xmlns:mc="http://schemas.openxmlformats.org/markup-compatibility/2006" xmlns:mv="urn:schemas-microsoft-com:mac:vml" xmlns:p="http://schemas.openxmlformats.org/presentationml/2006/main" mc:Ignorable="mv" mc:PreserveAttributes="mv:*">
+<p:sld xmlns:a="http://schemas.openxmlformats.org/drawingml/2006/main" xmlns:r="http://schemas.openxmlformats.org/officeDocument/2006/relationships" xmlns:p="http://schemas.openxmlformats.org/presentationml/2006/main">
   <p:cSld>
     <p:spTree>
       <p:nvGrpSpPr>
@@ -13941,7 +13231,7 @@
     </p:spTree>
     <p:extLst>
       <p:ext uri="{BB962C8B-B14F-4D97-AF65-F5344CB8AC3E}">
-        <p14:creationId xmlns:p14="http://schemas.microsoft.com/office/powerpoint/2010/main" xmlns:p="http://schemas.openxmlformats.org/presentationml/2006/main" xmlns:r="http://schemas.openxmlformats.org/officeDocument/2006/relationships" xmlns:a="http://schemas.openxmlformats.org/drawingml/2006/main" xmlns="" val="969752237"/>
+        <p14:creationId xmlns:p14="http://schemas.microsoft.com/office/powerpoint/2010/main" val="969752237"/>
       </p:ext>
     </p:extLst>
   </p:cSld>
@@ -13951,7 +13241,7 @@
   <p:timing>
     <p:tnLst>
       <p:par>
-        <p:cTn id="1" dur="indefinite" restart="never" nodeType="tmRoot"/>
+        <p:cTn xmlns:p14="http://schemas.microsoft.com/office/powerpoint/2010/main" id="1" dur="indefinite" restart="never" nodeType="tmRoot"/>
       </p:par>
     </p:tnLst>
   </p:timing>
@@ -13959,7 +13249,7 @@
 </file>
 
 <file path=ppt/slides/slide19.xml><?xml version="1.0" encoding="utf-8"?>
-<p:sld xmlns:a="http://schemas.openxmlformats.org/drawingml/2006/main" xmlns:r="http://schemas.openxmlformats.org/officeDocument/2006/relationships" xmlns:mc="http://schemas.openxmlformats.org/markup-compatibility/2006" xmlns:mv="urn:schemas-microsoft-com:mac:vml" xmlns:p="http://schemas.openxmlformats.org/presentationml/2006/main" mc:Ignorable="mv" mc:PreserveAttributes="mv:*">
+<p:sld xmlns:a="http://schemas.openxmlformats.org/drawingml/2006/main" xmlns:r="http://schemas.openxmlformats.org/officeDocument/2006/relationships" xmlns:p="http://schemas.openxmlformats.org/presentationml/2006/main">
   <p:cSld>
     <p:spTree>
       <p:nvGrpSpPr>
@@ -14434,7 +13724,7 @@
     </p:spTree>
     <p:extLst>
       <p:ext uri="{BB962C8B-B14F-4D97-AF65-F5344CB8AC3E}">
-        <p14:creationId xmlns:p14="http://schemas.microsoft.com/office/powerpoint/2010/main" xmlns:p="http://schemas.openxmlformats.org/presentationml/2006/main" xmlns:r="http://schemas.openxmlformats.org/officeDocument/2006/relationships" xmlns:a="http://schemas.openxmlformats.org/drawingml/2006/main" xmlns="" val="2873225319"/>
+        <p14:creationId xmlns:p14="http://schemas.microsoft.com/office/powerpoint/2010/main" val="2873225319"/>
       </p:ext>
     </p:extLst>
   </p:cSld>
@@ -14444,7 +13734,7 @@
   <p:timing>
     <p:tnLst>
       <p:par>
-        <p:cTn id="1" dur="indefinite" restart="never" nodeType="tmRoot"/>
+        <p:cTn xmlns:p14="http://schemas.microsoft.com/office/powerpoint/2010/main" id="1" dur="indefinite" restart="never" nodeType="tmRoot"/>
       </p:par>
     </p:tnLst>
   </p:timing>
@@ -14452,7 +13742,7 @@
 </file>
 
 <file path=ppt/slides/slide2.xml><?xml version="1.0" encoding="utf-8"?>
-<p:sld xmlns:a="http://schemas.openxmlformats.org/drawingml/2006/main" xmlns:r="http://schemas.openxmlformats.org/officeDocument/2006/relationships" xmlns:mc="http://schemas.openxmlformats.org/markup-compatibility/2006" xmlns:mv="urn:schemas-microsoft-com:mac:vml" xmlns:p="http://schemas.openxmlformats.org/presentationml/2006/main" mc:Ignorable="mv" mc:PreserveAttributes="mv:*">
+<p:sld xmlns:a="http://schemas.openxmlformats.org/drawingml/2006/main" xmlns:r="http://schemas.openxmlformats.org/officeDocument/2006/relationships" xmlns:p="http://schemas.openxmlformats.org/presentationml/2006/main">
   <p:cSld>
     <p:spTree>
       <p:nvGrpSpPr>
@@ -14551,7 +13841,7 @@
     </p:spTree>
     <p:extLst>
       <p:ext uri="{BB962C8B-B14F-4D97-AF65-F5344CB8AC3E}">
-        <p14:creationId xmlns:p14="http://schemas.microsoft.com/office/powerpoint/2010/main" xmlns:p="http://schemas.openxmlformats.org/presentationml/2006/main" xmlns:r="http://schemas.openxmlformats.org/officeDocument/2006/relationships" xmlns:a="http://schemas.openxmlformats.org/drawingml/2006/main" xmlns="" val="1440627094"/>
+        <p14:creationId xmlns:p14="http://schemas.microsoft.com/office/powerpoint/2010/main" val="1440627094"/>
       </p:ext>
     </p:extLst>
   </p:cSld>
@@ -14561,7 +13851,7 @@
   <p:timing>
     <p:tnLst>
       <p:par>
-        <p:cTn id="1" dur="indefinite" restart="never" nodeType="tmRoot"/>
+        <p:cTn xmlns:p14="http://schemas.microsoft.com/office/powerpoint/2010/main" id="1" dur="indefinite" restart="never" nodeType="tmRoot"/>
       </p:par>
     </p:tnLst>
   </p:timing>
@@ -14569,7 +13859,7 @@
 </file>
 
 <file path=ppt/slides/slide20.xml><?xml version="1.0" encoding="utf-8"?>
-<p:sld xmlns:a="http://schemas.openxmlformats.org/drawingml/2006/main" xmlns:r="http://schemas.openxmlformats.org/officeDocument/2006/relationships" xmlns:mc="http://schemas.openxmlformats.org/markup-compatibility/2006" xmlns:mv="urn:schemas-microsoft-com:mac:vml" xmlns:p="http://schemas.openxmlformats.org/presentationml/2006/main" mc:Ignorable="mv" mc:PreserveAttributes="mv:*">
+<p:sld xmlns:a="http://schemas.openxmlformats.org/drawingml/2006/main" xmlns:r="http://schemas.openxmlformats.org/officeDocument/2006/relationships" xmlns:p="http://schemas.openxmlformats.org/presentationml/2006/main">
   <p:cSld>
     <p:spTree>
       <p:nvGrpSpPr>
@@ -14767,7 +14057,7 @@
     </p:spTree>
     <p:extLst>
       <p:ext uri="{BB962C8B-B14F-4D97-AF65-F5344CB8AC3E}">
-        <p14:creationId xmlns:p14="http://schemas.microsoft.com/office/powerpoint/2010/main" xmlns:p="http://schemas.openxmlformats.org/presentationml/2006/main" xmlns:r="http://schemas.openxmlformats.org/officeDocument/2006/relationships" xmlns:a="http://schemas.openxmlformats.org/drawingml/2006/main" xmlns="" val="3735696"/>
+        <p14:creationId xmlns:p14="http://schemas.microsoft.com/office/powerpoint/2010/main" val="3735696"/>
       </p:ext>
     </p:extLst>
   </p:cSld>
@@ -14777,7 +14067,7 @@
   <p:timing>
     <p:tnLst>
       <p:par>
-        <p:cTn id="1" dur="indefinite" restart="never" nodeType="tmRoot"/>
+        <p:cTn xmlns:p14="http://schemas.microsoft.com/office/powerpoint/2010/main" id="1" dur="indefinite" restart="never" nodeType="tmRoot"/>
       </p:par>
     </p:tnLst>
   </p:timing>
@@ -14785,7 +14075,7 @@
 </file>
 
 <file path=ppt/slides/slide21.xml><?xml version="1.0" encoding="utf-8"?>
-<p:sld xmlns:a="http://schemas.openxmlformats.org/drawingml/2006/main" xmlns:r="http://schemas.openxmlformats.org/officeDocument/2006/relationships" xmlns:mc="http://schemas.openxmlformats.org/markup-compatibility/2006" xmlns:mv="urn:schemas-microsoft-com:mac:vml" xmlns:p="http://schemas.openxmlformats.org/presentationml/2006/main" mc:Ignorable="mv" mc:PreserveAttributes="mv:*">
+<p:sld xmlns:a="http://schemas.openxmlformats.org/drawingml/2006/main" xmlns:r="http://schemas.openxmlformats.org/officeDocument/2006/relationships" xmlns:p="http://schemas.openxmlformats.org/presentationml/2006/main">
   <p:cSld>
     <p:spTree>
       <p:nvGrpSpPr>
@@ -14859,7 +14149,7 @@
     </p:spTree>
     <p:extLst>
       <p:ext uri="{BB962C8B-B14F-4D97-AF65-F5344CB8AC3E}">
-        <p14:creationId xmlns:p14="http://schemas.microsoft.com/office/powerpoint/2010/main" xmlns:p="http://schemas.openxmlformats.org/presentationml/2006/main" xmlns:r="http://schemas.openxmlformats.org/officeDocument/2006/relationships" xmlns:a="http://schemas.openxmlformats.org/drawingml/2006/main" xmlns="" val="2663991375"/>
+        <p14:creationId xmlns:p14="http://schemas.microsoft.com/office/powerpoint/2010/main" val="2663991375"/>
       </p:ext>
     </p:extLst>
   </p:cSld>
@@ -14869,7 +14159,7 @@
   <p:timing>
     <p:tnLst>
       <p:par>
-        <p:cTn id="1" dur="indefinite" restart="never" nodeType="tmRoot"/>
+        <p:cTn xmlns:p14="http://schemas.microsoft.com/office/powerpoint/2010/main" id="1" dur="indefinite" restart="never" nodeType="tmRoot"/>
       </p:par>
     </p:tnLst>
   </p:timing>
@@ -14877,7 +14167,7 @@
 </file>
 
 <file path=ppt/slides/slide22.xml><?xml version="1.0" encoding="utf-8"?>
-<p:sld xmlns:a="http://schemas.openxmlformats.org/drawingml/2006/main" xmlns:r="http://schemas.openxmlformats.org/officeDocument/2006/relationships" xmlns:mc="http://schemas.openxmlformats.org/markup-compatibility/2006" xmlns:mv="urn:schemas-microsoft-com:mac:vml" xmlns:p="http://schemas.openxmlformats.org/presentationml/2006/main" mc:Ignorable="mv" mc:PreserveAttributes="mv:*">
+<p:sld xmlns:a="http://schemas.openxmlformats.org/drawingml/2006/main" xmlns:r="http://schemas.openxmlformats.org/officeDocument/2006/relationships" xmlns:p="http://schemas.openxmlformats.org/presentationml/2006/main">
   <p:cSld>
     <p:spTree>
       <p:nvGrpSpPr>
@@ -14975,7 +14265,7 @@
     </p:spTree>
     <p:extLst>
       <p:ext uri="{BB962C8B-B14F-4D97-AF65-F5344CB8AC3E}">
-        <p14:creationId xmlns:p14="http://schemas.microsoft.com/office/powerpoint/2010/main" xmlns:p="http://schemas.openxmlformats.org/presentationml/2006/main" xmlns:r="http://schemas.openxmlformats.org/officeDocument/2006/relationships" xmlns:a="http://schemas.openxmlformats.org/drawingml/2006/main" xmlns="" val="1785806931"/>
+        <p14:creationId xmlns:p14="http://schemas.microsoft.com/office/powerpoint/2010/main" val="1785806931"/>
       </p:ext>
     </p:extLst>
   </p:cSld>
@@ -14985,7 +14275,7 @@
   <p:timing>
     <p:tnLst>
       <p:par>
-        <p:cTn id="1" dur="indefinite" restart="never" nodeType="tmRoot"/>
+        <p:cTn xmlns:p14="http://schemas.microsoft.com/office/powerpoint/2010/main" id="1" dur="indefinite" restart="never" nodeType="tmRoot"/>
       </p:par>
     </p:tnLst>
   </p:timing>
@@ -14993,7 +14283,7 @@
 </file>
 
 <file path=ppt/slides/slide23.xml><?xml version="1.0" encoding="utf-8"?>
-<p:sld xmlns:a="http://schemas.openxmlformats.org/drawingml/2006/main" xmlns:r="http://schemas.openxmlformats.org/officeDocument/2006/relationships" xmlns:mc="http://schemas.openxmlformats.org/markup-compatibility/2006" xmlns:mv="urn:schemas-microsoft-com:mac:vml" xmlns:p="http://schemas.openxmlformats.org/presentationml/2006/main" mc:Ignorable="mv" mc:PreserveAttributes="mv:*">
+<p:sld xmlns:a="http://schemas.openxmlformats.org/drawingml/2006/main" xmlns:r="http://schemas.openxmlformats.org/officeDocument/2006/relationships" xmlns:p="http://schemas.openxmlformats.org/presentationml/2006/main">
   <p:cSld>
     <p:spTree>
       <p:nvGrpSpPr>
@@ -15632,7 +14922,7 @@
     </p:spTree>
     <p:extLst>
       <p:ext uri="{BB962C8B-B14F-4D97-AF65-F5344CB8AC3E}">
-        <p14:creationId xmlns:p14="http://schemas.microsoft.com/office/powerpoint/2010/main" xmlns:p="http://schemas.openxmlformats.org/presentationml/2006/main" xmlns:r="http://schemas.openxmlformats.org/officeDocument/2006/relationships" xmlns:a="http://schemas.openxmlformats.org/drawingml/2006/main" xmlns="" val="910421796"/>
+        <p14:creationId xmlns:p14="http://schemas.microsoft.com/office/powerpoint/2010/main" val="910421796"/>
       </p:ext>
     </p:extLst>
   </p:cSld>
@@ -15642,7 +14932,7 @@
   <p:timing>
     <p:tnLst>
       <p:par>
-        <p:cTn id="1" dur="indefinite" restart="never" nodeType="tmRoot"/>
+        <p:cTn xmlns:p14="http://schemas.microsoft.com/office/powerpoint/2010/main" id="1" dur="indefinite" restart="never" nodeType="tmRoot"/>
       </p:par>
     </p:tnLst>
   </p:timing>
@@ -15650,7 +14940,7 @@
 </file>
 
 <file path=ppt/slides/slide24.xml><?xml version="1.0" encoding="utf-8"?>
-<p:sld xmlns:a="http://schemas.openxmlformats.org/drawingml/2006/main" xmlns:r="http://schemas.openxmlformats.org/officeDocument/2006/relationships" xmlns:mc="http://schemas.openxmlformats.org/markup-compatibility/2006" xmlns:mv="urn:schemas-microsoft-com:mac:vml" xmlns:p="http://schemas.openxmlformats.org/presentationml/2006/main" mc:Ignorable="mv" mc:PreserveAttributes="mv:*">
+<p:sld xmlns:a="http://schemas.openxmlformats.org/drawingml/2006/main" xmlns:r="http://schemas.openxmlformats.org/officeDocument/2006/relationships" xmlns:p="http://schemas.openxmlformats.org/presentationml/2006/main">
   <p:cSld>
     <p:spTree>
       <p:nvGrpSpPr>
@@ -15818,7 +15108,7 @@
     </p:spTree>
     <p:extLst>
       <p:ext uri="{BB962C8B-B14F-4D97-AF65-F5344CB8AC3E}">
-        <p14:creationId xmlns:p14="http://schemas.microsoft.com/office/powerpoint/2010/main" xmlns:p="http://schemas.openxmlformats.org/presentationml/2006/main" xmlns:r="http://schemas.openxmlformats.org/officeDocument/2006/relationships" xmlns:a="http://schemas.openxmlformats.org/drawingml/2006/main" xmlns="" val="1665895200"/>
+        <p14:creationId xmlns:p14="http://schemas.microsoft.com/office/powerpoint/2010/main" val="1665895200"/>
       </p:ext>
     </p:extLst>
   </p:cSld>
@@ -15828,7 +15118,7 @@
   <p:timing>
     <p:tnLst>
       <p:par>
-        <p:cTn id="1" dur="indefinite" restart="never" nodeType="tmRoot"/>
+        <p:cTn xmlns:p14="http://schemas.microsoft.com/office/powerpoint/2010/main" id="1" dur="indefinite" restart="never" nodeType="tmRoot"/>
       </p:par>
     </p:tnLst>
   </p:timing>
@@ -15836,7 +15126,7 @@
 </file>
 
 <file path=ppt/slides/slide25.xml><?xml version="1.0" encoding="utf-8"?>
-<p:sld xmlns:a="http://schemas.openxmlformats.org/drawingml/2006/main" xmlns:r="http://schemas.openxmlformats.org/officeDocument/2006/relationships" xmlns:mc="http://schemas.openxmlformats.org/markup-compatibility/2006" xmlns:mv="urn:schemas-microsoft-com:mac:vml" xmlns:p="http://schemas.openxmlformats.org/presentationml/2006/main" mc:Ignorable="mv" mc:PreserveAttributes="mv:*">
+<p:sld xmlns:a="http://schemas.openxmlformats.org/drawingml/2006/main" xmlns:r="http://schemas.openxmlformats.org/officeDocument/2006/relationships" xmlns:p="http://schemas.openxmlformats.org/presentationml/2006/main">
   <p:cSld>
     <p:spTree>
       <p:nvGrpSpPr>
@@ -15909,11 +15199,7 @@
           <a:p>
             <a:r>
               <a:rPr lang="en-US" dirty="0" smtClean="0"/>
-              <a:t>What if you had those files for 20 patients</a:t>
-            </a:r>
-            <a:r>
-              <a:rPr lang="en-US" dirty="0" smtClean="0"/>
-              <a:t>?</a:t>
+              <a:t>What if you had those files for 20 patients?</a:t>
             </a:r>
           </a:p>
           <a:p>
@@ -15954,7 +15240,7 @@
     </p:spTree>
     <p:extLst>
       <p:ext uri="{BB962C8B-B14F-4D97-AF65-F5344CB8AC3E}">
-        <p14:creationId xmlns:p14="http://schemas.microsoft.com/office/powerpoint/2010/main" xmlns:p="http://schemas.openxmlformats.org/presentationml/2006/main" xmlns:r="http://schemas.openxmlformats.org/officeDocument/2006/relationships" xmlns:a="http://schemas.openxmlformats.org/drawingml/2006/main" xmlns="" val="3125123045"/>
+        <p14:creationId xmlns:p14="http://schemas.microsoft.com/office/powerpoint/2010/main" val="3125123045"/>
       </p:ext>
     </p:extLst>
   </p:cSld>
@@ -15964,7 +15250,7 @@
   <p:timing>
     <p:tnLst>
       <p:par>
-        <p:cTn id="1" dur="indefinite" restart="never" nodeType="tmRoot"/>
+        <p:cTn xmlns:p14="http://schemas.microsoft.com/office/powerpoint/2010/main" id="1" dur="indefinite" restart="never" nodeType="tmRoot"/>
       </p:par>
     </p:tnLst>
   </p:timing>
@@ -15972,7 +15258,7 @@
 </file>
 
 <file path=ppt/slides/slide26.xml><?xml version="1.0" encoding="utf-8"?>
-<p:sld xmlns:a="http://schemas.openxmlformats.org/drawingml/2006/main" xmlns:r="http://schemas.openxmlformats.org/officeDocument/2006/relationships" xmlns:mc="http://schemas.openxmlformats.org/markup-compatibility/2006" xmlns:mv="urn:schemas-microsoft-com:mac:vml" xmlns:p="http://schemas.openxmlformats.org/presentationml/2006/main" mc:Ignorable="mv" mc:PreserveAttributes="mv:*">
+<p:sld xmlns:a="http://schemas.openxmlformats.org/drawingml/2006/main" xmlns:r="http://schemas.openxmlformats.org/officeDocument/2006/relationships" xmlns:p="http://schemas.openxmlformats.org/presentationml/2006/main">
   <p:cSld>
     <p:spTree>
       <p:nvGrpSpPr>
@@ -16140,7 +15426,7 @@
     </p:spTree>
     <p:extLst>
       <p:ext uri="{BB962C8B-B14F-4D97-AF65-F5344CB8AC3E}">
-        <p14:creationId xmlns:p14="http://schemas.microsoft.com/office/powerpoint/2010/main" xmlns:p="http://schemas.openxmlformats.org/presentationml/2006/main" xmlns:r="http://schemas.openxmlformats.org/officeDocument/2006/relationships" xmlns:a="http://schemas.openxmlformats.org/drawingml/2006/main" xmlns="" val="3125123045"/>
+        <p14:creationId xmlns:p14="http://schemas.microsoft.com/office/powerpoint/2010/main" val="3125123045"/>
       </p:ext>
     </p:extLst>
   </p:cSld>
@@ -16150,7 +15436,7 @@
   <p:timing>
     <p:tnLst>
       <p:par>
-        <p:cTn id="1" dur="indefinite" restart="never" nodeType="tmRoot"/>
+        <p:cTn xmlns:p14="http://schemas.microsoft.com/office/powerpoint/2010/main" id="1" dur="indefinite" restart="never" nodeType="tmRoot"/>
       </p:par>
     </p:tnLst>
   </p:timing>
@@ -16158,7 +15444,7 @@
 </file>
 
 <file path=ppt/slides/slide27.xml><?xml version="1.0" encoding="utf-8"?>
-<p:sld xmlns:a="http://schemas.openxmlformats.org/drawingml/2006/main" xmlns:r="http://schemas.openxmlformats.org/officeDocument/2006/relationships" xmlns:mc="http://schemas.openxmlformats.org/markup-compatibility/2006" xmlns:mv="urn:schemas-microsoft-com:mac:vml" xmlns:p="http://schemas.openxmlformats.org/presentationml/2006/main" mc:Ignorable="mv" mc:PreserveAttributes="mv:*">
+<p:sld xmlns:a="http://schemas.openxmlformats.org/drawingml/2006/main" xmlns:r="http://schemas.openxmlformats.org/officeDocument/2006/relationships" xmlns:p="http://schemas.openxmlformats.org/presentationml/2006/main">
   <p:cSld>
     <p:spTree>
       <p:nvGrpSpPr>
@@ -16352,7 +15638,7 @@
     </p:spTree>
     <p:extLst>
       <p:ext uri="{BB962C8B-B14F-4D97-AF65-F5344CB8AC3E}">
-        <p14:creationId xmlns:p14="http://schemas.microsoft.com/office/powerpoint/2010/main" xmlns:p="http://schemas.openxmlformats.org/presentationml/2006/main" xmlns:r="http://schemas.openxmlformats.org/officeDocument/2006/relationships" xmlns:a="http://schemas.openxmlformats.org/drawingml/2006/main" xmlns="" val="2504380160"/>
+        <p14:creationId xmlns:p14="http://schemas.microsoft.com/office/powerpoint/2010/main" val="2504380160"/>
       </p:ext>
     </p:extLst>
   </p:cSld>
@@ -16362,7 +15648,7 @@
   <p:timing>
     <p:tnLst>
       <p:par>
-        <p:cTn id="1" dur="indefinite" restart="never" nodeType="tmRoot"/>
+        <p:cTn xmlns:p14="http://schemas.microsoft.com/office/powerpoint/2010/main" id="1" dur="indefinite" restart="never" nodeType="tmRoot"/>
       </p:par>
     </p:tnLst>
   </p:timing>
@@ -16370,7 +15656,7 @@
 </file>
 
 <file path=ppt/slides/slide28.xml><?xml version="1.0" encoding="utf-8"?>
-<p:sld xmlns:a="http://schemas.openxmlformats.org/drawingml/2006/main" xmlns:r="http://schemas.openxmlformats.org/officeDocument/2006/relationships" xmlns:mc="http://schemas.openxmlformats.org/markup-compatibility/2006" xmlns:mv="urn:schemas-microsoft-com:mac:vml" xmlns:p="http://schemas.openxmlformats.org/presentationml/2006/main" mc:Ignorable="mv" mc:PreserveAttributes="mv:*">
+<p:sld xmlns:a="http://schemas.openxmlformats.org/drawingml/2006/main" xmlns:r="http://schemas.openxmlformats.org/officeDocument/2006/relationships" xmlns:p="http://schemas.openxmlformats.org/presentationml/2006/main">
   <p:cSld>
     <p:spTree>
       <p:nvGrpSpPr>
@@ -16586,7 +15872,7 @@
           <a:blip r:embed="rId3">
             <a:extLst>
               <a:ext uri="{28A0092B-C50C-407E-A947-70E740481C1C}">
-                <a14:useLocalDpi xmlns:a14="http://schemas.microsoft.com/office/drawing/2010/main" xmlns:p="http://schemas.openxmlformats.org/presentationml/2006/main" xmlns:r="http://schemas.openxmlformats.org/officeDocument/2006/relationships" xmlns:a="http://schemas.openxmlformats.org/drawingml/2006/main" xmlns="" val="0"/>
+                <a14:useLocalDpi xmlns:a14="http://schemas.microsoft.com/office/drawing/2010/main" val="0"/>
               </a:ext>
             </a:extLst>
           </a:blip>
@@ -16607,7 +15893,7 @@
     </p:spTree>
     <p:extLst>
       <p:ext uri="{BB962C8B-B14F-4D97-AF65-F5344CB8AC3E}">
-        <p14:creationId xmlns:p14="http://schemas.microsoft.com/office/powerpoint/2010/main" xmlns:p="http://schemas.openxmlformats.org/presentationml/2006/main" xmlns:r="http://schemas.openxmlformats.org/officeDocument/2006/relationships" xmlns:a="http://schemas.openxmlformats.org/drawingml/2006/main" xmlns="" val="3423089497"/>
+        <p14:creationId xmlns:p14="http://schemas.microsoft.com/office/powerpoint/2010/main" val="3423089497"/>
       </p:ext>
     </p:extLst>
   </p:cSld>
@@ -16617,7 +15903,7 @@
   <p:timing>
     <p:tnLst>
       <p:par>
-        <p:cTn id="1" dur="indefinite" restart="never" nodeType="tmRoot"/>
+        <p:cTn xmlns:p14="http://schemas.microsoft.com/office/powerpoint/2010/main" id="1" dur="indefinite" restart="never" nodeType="tmRoot"/>
       </p:par>
     </p:tnLst>
   </p:timing>
@@ -16625,7 +15911,7 @@
 </file>
 
 <file path=ppt/slides/slide29.xml><?xml version="1.0" encoding="utf-8"?>
-<p:sld xmlns:a="http://schemas.openxmlformats.org/drawingml/2006/main" xmlns:r="http://schemas.openxmlformats.org/officeDocument/2006/relationships" xmlns:mc="http://schemas.openxmlformats.org/markup-compatibility/2006" xmlns:mv="urn:schemas-microsoft-com:mac:vml" xmlns:p="http://schemas.openxmlformats.org/presentationml/2006/main" mc:Ignorable="mv" mc:PreserveAttributes="mv:*">
+<p:sld xmlns:a="http://schemas.openxmlformats.org/drawingml/2006/main" xmlns:r="http://schemas.openxmlformats.org/officeDocument/2006/relationships" xmlns:p="http://schemas.openxmlformats.org/presentationml/2006/main">
   <p:cSld>
     <p:spTree>
       <p:nvGrpSpPr>
@@ -16714,7 +16000,7 @@
     </p:spTree>
     <p:extLst>
       <p:ext uri="{BB962C8B-B14F-4D97-AF65-F5344CB8AC3E}">
-        <p14:creationId xmlns:p14="http://schemas.microsoft.com/office/powerpoint/2010/main" xmlns:p="http://schemas.openxmlformats.org/presentationml/2006/main" xmlns:r="http://schemas.openxmlformats.org/officeDocument/2006/relationships" xmlns:a="http://schemas.openxmlformats.org/drawingml/2006/main" xmlns="" val="3134576660"/>
+        <p14:creationId xmlns:p14="http://schemas.microsoft.com/office/powerpoint/2010/main" val="3134576660"/>
       </p:ext>
     </p:extLst>
   </p:cSld>
@@ -16724,7 +16010,7 @@
   <p:timing>
     <p:tnLst>
       <p:par>
-        <p:cTn id="1" dur="indefinite" restart="never" nodeType="tmRoot"/>
+        <p:cTn xmlns:p14="http://schemas.microsoft.com/office/powerpoint/2010/main" id="1" dur="indefinite" restart="never" nodeType="tmRoot"/>
       </p:par>
     </p:tnLst>
   </p:timing>
@@ -16732,7 +16018,7 @@
 </file>
 
 <file path=ppt/slides/slide3.xml><?xml version="1.0" encoding="utf-8"?>
-<p:sld xmlns:a="http://schemas.openxmlformats.org/drawingml/2006/main" xmlns:r="http://schemas.openxmlformats.org/officeDocument/2006/relationships" xmlns:mc="http://schemas.openxmlformats.org/markup-compatibility/2006" xmlns:mv="urn:schemas-microsoft-com:mac:vml" xmlns:p="http://schemas.openxmlformats.org/presentationml/2006/main" mc:Ignorable="mv" mc:PreserveAttributes="mv:*">
+<p:sld xmlns:a="http://schemas.openxmlformats.org/drawingml/2006/main" xmlns:r="http://schemas.openxmlformats.org/officeDocument/2006/relationships" xmlns:p="http://schemas.openxmlformats.org/presentationml/2006/main">
   <p:cSld>
     <p:spTree>
       <p:nvGrpSpPr>
@@ -16998,7 +16284,7 @@
     </p:spTree>
     <p:extLst>
       <p:ext uri="{BB962C8B-B14F-4D97-AF65-F5344CB8AC3E}">
-        <p14:creationId xmlns:p14="http://schemas.microsoft.com/office/powerpoint/2010/main" xmlns:p="http://schemas.openxmlformats.org/presentationml/2006/main" xmlns:r="http://schemas.openxmlformats.org/officeDocument/2006/relationships" xmlns:a="http://schemas.openxmlformats.org/drawingml/2006/main" xmlns="" val="2851459897"/>
+        <p14:creationId xmlns:p14="http://schemas.microsoft.com/office/powerpoint/2010/main" val="2851459897"/>
       </p:ext>
     </p:extLst>
   </p:cSld>
@@ -17008,7 +16294,7 @@
   <p:timing>
     <p:tnLst>
       <p:par>
-        <p:cTn id="1" dur="indefinite" restart="never" nodeType="tmRoot"/>
+        <p:cTn xmlns:p14="http://schemas.microsoft.com/office/powerpoint/2010/main" id="1" dur="indefinite" restart="never" nodeType="tmRoot"/>
       </p:par>
     </p:tnLst>
   </p:timing>
@@ -17016,7 +16302,7 @@
 </file>
 
 <file path=ppt/slides/slide30.xml><?xml version="1.0" encoding="utf-8"?>
-<p:sld xmlns:a="http://schemas.openxmlformats.org/drawingml/2006/main" xmlns:r="http://schemas.openxmlformats.org/officeDocument/2006/relationships" xmlns:mc="http://schemas.openxmlformats.org/markup-compatibility/2006" xmlns:mv="urn:schemas-microsoft-com:mac:vml" xmlns:p="http://schemas.openxmlformats.org/presentationml/2006/main" mc:Ignorable="mv" mc:PreserveAttributes="mv:*">
+<p:sld xmlns:a="http://schemas.openxmlformats.org/drawingml/2006/main" xmlns:r="http://schemas.openxmlformats.org/officeDocument/2006/relationships" xmlns:p="http://schemas.openxmlformats.org/presentationml/2006/main">
   <p:cSld>
     <p:spTree>
       <p:nvGrpSpPr>
@@ -17167,7 +16453,7 @@
     </p:spTree>
     <p:extLst>
       <p:ext uri="{BB962C8B-B14F-4D97-AF65-F5344CB8AC3E}">
-        <p14:creationId xmlns:p14="http://schemas.microsoft.com/office/powerpoint/2010/main" xmlns:p="http://schemas.openxmlformats.org/presentationml/2006/main" xmlns:r="http://schemas.openxmlformats.org/officeDocument/2006/relationships" xmlns:a="http://schemas.openxmlformats.org/drawingml/2006/main" xmlns="" val="2869515420"/>
+        <p14:creationId xmlns:p14="http://schemas.microsoft.com/office/powerpoint/2010/main" val="2869515420"/>
       </p:ext>
     </p:extLst>
   </p:cSld>
@@ -17177,7 +16463,7 @@
   <p:timing>
     <p:tnLst>
       <p:par>
-        <p:cTn id="1" dur="indefinite" restart="never" nodeType="tmRoot"/>
+        <p:cTn xmlns:p14="http://schemas.microsoft.com/office/powerpoint/2010/main" id="1" dur="indefinite" restart="never" nodeType="tmRoot"/>
       </p:par>
     </p:tnLst>
   </p:timing>
@@ -17185,7 +16471,7 @@
 </file>
 
 <file path=ppt/slides/slide31.xml><?xml version="1.0" encoding="utf-8"?>
-<p:sld xmlns:a="http://schemas.openxmlformats.org/drawingml/2006/main" xmlns:r="http://schemas.openxmlformats.org/officeDocument/2006/relationships" xmlns:mc="http://schemas.openxmlformats.org/markup-compatibility/2006" xmlns:mv="urn:schemas-microsoft-com:mac:vml" xmlns:p="http://schemas.openxmlformats.org/presentationml/2006/main" mc:Ignorable="mv" mc:PreserveAttributes="mv:*">
+<p:sld xmlns:a="http://schemas.openxmlformats.org/drawingml/2006/main" xmlns:r="http://schemas.openxmlformats.org/officeDocument/2006/relationships" xmlns:p="http://schemas.openxmlformats.org/presentationml/2006/main">
   <p:cSld>
     <p:spTree>
       <p:nvGrpSpPr>
@@ -17401,7 +16687,7 @@
     </p:spTree>
     <p:extLst>
       <p:ext uri="{BB962C8B-B14F-4D97-AF65-F5344CB8AC3E}">
-        <p14:creationId xmlns:p14="http://schemas.microsoft.com/office/powerpoint/2010/main" xmlns:p="http://schemas.openxmlformats.org/presentationml/2006/main" xmlns:r="http://schemas.openxmlformats.org/officeDocument/2006/relationships" xmlns:a="http://schemas.openxmlformats.org/drawingml/2006/main" xmlns="" val="1491958966"/>
+        <p14:creationId xmlns:p14="http://schemas.microsoft.com/office/powerpoint/2010/main" val="1491958966"/>
       </p:ext>
     </p:extLst>
   </p:cSld>
@@ -17411,7 +16697,7 @@
   <p:timing>
     <p:tnLst>
       <p:par>
-        <p:cTn id="1" dur="indefinite" restart="never" nodeType="tmRoot"/>
+        <p:cTn xmlns:p14="http://schemas.microsoft.com/office/powerpoint/2010/main" id="1" dur="indefinite" restart="never" nodeType="tmRoot"/>
       </p:par>
     </p:tnLst>
   </p:timing>
@@ -17419,7 +16705,7 @@
 </file>
 
 <file path=ppt/slides/slide32.xml><?xml version="1.0" encoding="utf-8"?>
-<p:sld xmlns:a="http://schemas.openxmlformats.org/drawingml/2006/main" xmlns:r="http://schemas.openxmlformats.org/officeDocument/2006/relationships" xmlns:mc="http://schemas.openxmlformats.org/markup-compatibility/2006" xmlns:mv="urn:schemas-microsoft-com:mac:vml" xmlns:p="http://schemas.openxmlformats.org/presentationml/2006/main" mc:Ignorable="mv" mc:PreserveAttributes="mv:*">
+<p:sld xmlns:a="http://schemas.openxmlformats.org/drawingml/2006/main" xmlns:r="http://schemas.openxmlformats.org/officeDocument/2006/relationships" xmlns:p="http://schemas.openxmlformats.org/presentationml/2006/main">
   <p:cSld>
     <p:spTree>
       <p:nvGrpSpPr>
@@ -17667,7 +16953,7 @@
     </p:spTree>
     <p:extLst>
       <p:ext uri="{BB962C8B-B14F-4D97-AF65-F5344CB8AC3E}">
-        <p14:creationId xmlns:p14="http://schemas.microsoft.com/office/powerpoint/2010/main" xmlns:p="http://schemas.openxmlformats.org/presentationml/2006/main" xmlns:r="http://schemas.openxmlformats.org/officeDocument/2006/relationships" xmlns:a="http://schemas.openxmlformats.org/drawingml/2006/main" xmlns="" val="3132673117"/>
+        <p14:creationId xmlns:p14="http://schemas.microsoft.com/office/powerpoint/2010/main" val="3132673117"/>
       </p:ext>
     </p:extLst>
   </p:cSld>
@@ -17677,7 +16963,7 @@
   <p:timing>
     <p:tnLst>
       <p:par>
-        <p:cTn id="1" dur="indefinite" restart="never" nodeType="tmRoot"/>
+        <p:cTn xmlns:p14="http://schemas.microsoft.com/office/powerpoint/2010/main" id="1" dur="indefinite" restart="never" nodeType="tmRoot"/>
       </p:par>
     </p:tnLst>
   </p:timing>
@@ -17685,7 +16971,7 @@
 </file>
 
 <file path=ppt/slides/slide33.xml><?xml version="1.0" encoding="utf-8"?>
-<p:sld xmlns:a="http://schemas.openxmlformats.org/drawingml/2006/main" xmlns:r="http://schemas.openxmlformats.org/officeDocument/2006/relationships" xmlns:mc="http://schemas.openxmlformats.org/markup-compatibility/2006" xmlns:mv="urn:schemas-microsoft-com:mac:vml" xmlns:p="http://schemas.openxmlformats.org/presentationml/2006/main" mc:Ignorable="mv" mc:PreserveAttributes="mv:*">
+<p:sld xmlns:a="http://schemas.openxmlformats.org/drawingml/2006/main" xmlns:r="http://schemas.openxmlformats.org/officeDocument/2006/relationships" xmlns:p="http://schemas.openxmlformats.org/presentationml/2006/main">
   <p:cSld>
     <p:spTree>
       <p:nvGrpSpPr>
@@ -17965,7 +17251,7 @@
     </p:spTree>
     <p:extLst>
       <p:ext uri="{BB962C8B-B14F-4D97-AF65-F5344CB8AC3E}">
-        <p14:creationId xmlns:p14="http://schemas.microsoft.com/office/powerpoint/2010/main" xmlns:p="http://schemas.openxmlformats.org/presentationml/2006/main" xmlns:r="http://schemas.openxmlformats.org/officeDocument/2006/relationships" xmlns:a="http://schemas.openxmlformats.org/drawingml/2006/main" xmlns="" val="2152091325"/>
+        <p14:creationId xmlns:p14="http://schemas.microsoft.com/office/powerpoint/2010/main" val="2152091325"/>
       </p:ext>
     </p:extLst>
   </p:cSld>
@@ -17975,7 +17261,7 @@
   <p:timing>
     <p:tnLst>
       <p:par>
-        <p:cTn id="1" dur="indefinite" restart="never" nodeType="tmRoot"/>
+        <p:cTn xmlns:p14="http://schemas.microsoft.com/office/powerpoint/2010/main" id="1" dur="indefinite" restart="never" nodeType="tmRoot"/>
       </p:par>
     </p:tnLst>
   </p:timing>
@@ -17983,7 +17269,7 @@
 </file>
 
 <file path=ppt/slides/slide34.xml><?xml version="1.0" encoding="utf-8"?>
-<p:sld xmlns:a="http://schemas.openxmlformats.org/drawingml/2006/main" xmlns:r="http://schemas.openxmlformats.org/officeDocument/2006/relationships" xmlns:mc="http://schemas.openxmlformats.org/markup-compatibility/2006" xmlns:mv="urn:schemas-microsoft-com:mac:vml" xmlns:p="http://schemas.openxmlformats.org/presentationml/2006/main" mc:Ignorable="mv" mc:PreserveAttributes="mv:*">
+<p:sld xmlns:a="http://schemas.openxmlformats.org/drawingml/2006/main" xmlns:r="http://schemas.openxmlformats.org/officeDocument/2006/relationships" xmlns:p="http://schemas.openxmlformats.org/presentationml/2006/main">
   <p:cSld>
     <p:spTree>
       <p:nvGrpSpPr>
@@ -18241,7 +17527,7 @@
     </p:spTree>
     <p:extLst>
       <p:ext uri="{BB962C8B-B14F-4D97-AF65-F5344CB8AC3E}">
-        <p14:creationId xmlns:p14="http://schemas.microsoft.com/office/powerpoint/2010/main" xmlns:p="http://schemas.openxmlformats.org/presentationml/2006/main" xmlns:r="http://schemas.openxmlformats.org/officeDocument/2006/relationships" xmlns:a="http://schemas.openxmlformats.org/drawingml/2006/main" xmlns="" val="393756573"/>
+        <p14:creationId xmlns:p14="http://schemas.microsoft.com/office/powerpoint/2010/main" val="393756573"/>
       </p:ext>
     </p:extLst>
   </p:cSld>
@@ -18251,7 +17537,7 @@
   <p:timing>
     <p:tnLst>
       <p:par>
-        <p:cTn id="1" dur="indefinite" restart="never" nodeType="tmRoot"/>
+        <p:cTn xmlns:p14="http://schemas.microsoft.com/office/powerpoint/2010/main" id="1" dur="indefinite" restart="never" nodeType="tmRoot"/>
       </p:par>
     </p:tnLst>
   </p:timing>
@@ -18259,7 +17545,7 @@
 </file>
 
 <file path=ppt/slides/slide35.xml><?xml version="1.0" encoding="utf-8"?>
-<p:sld xmlns:a="http://schemas.openxmlformats.org/drawingml/2006/main" xmlns:r="http://schemas.openxmlformats.org/officeDocument/2006/relationships" xmlns:mc="http://schemas.openxmlformats.org/markup-compatibility/2006" xmlns:mv="urn:schemas-microsoft-com:mac:vml" xmlns:p="http://schemas.openxmlformats.org/presentationml/2006/main" mc:Ignorable="mv" mc:PreserveAttributes="mv:*">
+<p:sld xmlns:a="http://schemas.openxmlformats.org/drawingml/2006/main" xmlns:r="http://schemas.openxmlformats.org/officeDocument/2006/relationships" xmlns:p="http://schemas.openxmlformats.org/presentationml/2006/main">
   <p:cSld>
     <p:spTree>
       <p:nvGrpSpPr>
@@ -18546,7 +17832,7 @@
     </p:spTree>
     <p:extLst>
       <p:ext uri="{BB962C8B-B14F-4D97-AF65-F5344CB8AC3E}">
-        <p14:creationId xmlns:p14="http://schemas.microsoft.com/office/powerpoint/2010/main" xmlns:p="http://schemas.openxmlformats.org/presentationml/2006/main" xmlns:r="http://schemas.openxmlformats.org/officeDocument/2006/relationships" xmlns:a="http://schemas.openxmlformats.org/drawingml/2006/main" xmlns="" val="4085917824"/>
+        <p14:creationId xmlns:p14="http://schemas.microsoft.com/office/powerpoint/2010/main" val="4085917824"/>
       </p:ext>
     </p:extLst>
   </p:cSld>
@@ -18556,7 +17842,7 @@
   <p:timing>
     <p:tnLst>
       <p:par>
-        <p:cTn id="1" dur="indefinite" restart="never" nodeType="tmRoot"/>
+        <p:cTn xmlns:p14="http://schemas.microsoft.com/office/powerpoint/2010/main" id="1" dur="indefinite" restart="never" nodeType="tmRoot"/>
       </p:par>
     </p:tnLst>
   </p:timing>
@@ -18564,7 +17850,7 @@
 </file>
 
 <file path=ppt/slides/slide36.xml><?xml version="1.0" encoding="utf-8"?>
-<p:sld xmlns:a="http://schemas.openxmlformats.org/drawingml/2006/main" xmlns:r="http://schemas.openxmlformats.org/officeDocument/2006/relationships" xmlns:mc="http://schemas.openxmlformats.org/markup-compatibility/2006" xmlns:mv="urn:schemas-microsoft-com:mac:vml" xmlns:p="http://schemas.openxmlformats.org/presentationml/2006/main" mc:Ignorable="mv" mc:PreserveAttributes="mv:*">
+<p:sld xmlns:a="http://schemas.openxmlformats.org/drawingml/2006/main" xmlns:r="http://schemas.openxmlformats.org/officeDocument/2006/relationships" xmlns:p="http://schemas.openxmlformats.org/presentationml/2006/main">
   <p:cSld>
     <p:spTree>
       <p:nvGrpSpPr>
@@ -18837,7 +18123,7 @@
     </p:spTree>
     <p:extLst>
       <p:ext uri="{BB962C8B-B14F-4D97-AF65-F5344CB8AC3E}">
-        <p14:creationId xmlns:p14="http://schemas.microsoft.com/office/powerpoint/2010/main" xmlns:p="http://schemas.openxmlformats.org/presentationml/2006/main" xmlns:r="http://schemas.openxmlformats.org/officeDocument/2006/relationships" xmlns:a="http://schemas.openxmlformats.org/drawingml/2006/main" xmlns="" val="978010516"/>
+        <p14:creationId xmlns:p14="http://schemas.microsoft.com/office/powerpoint/2010/main" val="978010516"/>
       </p:ext>
     </p:extLst>
   </p:cSld>
@@ -18847,7 +18133,7 @@
   <p:timing>
     <p:tnLst>
       <p:par>
-        <p:cTn id="1" dur="indefinite" restart="never" nodeType="tmRoot"/>
+        <p:cTn xmlns:p14="http://schemas.microsoft.com/office/powerpoint/2010/main" id="1" dur="indefinite" restart="never" nodeType="tmRoot"/>
       </p:par>
     </p:tnLst>
   </p:timing>
@@ -18855,7 +18141,7 @@
 </file>
 
 <file path=ppt/slides/slide37.xml><?xml version="1.0" encoding="utf-8"?>
-<p:sld xmlns:a="http://schemas.openxmlformats.org/drawingml/2006/main" xmlns:r="http://schemas.openxmlformats.org/officeDocument/2006/relationships" xmlns:mc="http://schemas.openxmlformats.org/markup-compatibility/2006" xmlns:mv="urn:schemas-microsoft-com:mac:vml" xmlns:p="http://schemas.openxmlformats.org/presentationml/2006/main" mc:Ignorable="mv" mc:PreserveAttributes="mv:*">
+<p:sld xmlns:a="http://schemas.openxmlformats.org/drawingml/2006/main" xmlns:r="http://schemas.openxmlformats.org/officeDocument/2006/relationships" xmlns:p="http://schemas.openxmlformats.org/presentationml/2006/main">
   <p:cSld>
     <p:spTree>
       <p:nvGrpSpPr>
@@ -19061,7 +18347,47 @@
                 <a:latin typeface="Consolas"/>
                 <a:cs typeface="Consolas"/>
               </a:rPr>
-              <a:t>0 -out results-{#}.blastn </a:t>
+              <a:t>0 -out </a:t>
+            </a:r>
+            <a:r>
+              <a:rPr lang="sk-SK" sz="2800" dirty="0" smtClean="0">
+                <a:solidFill>
+                  <a:srgbClr val="E46C0A"/>
+                </a:solidFill>
+                <a:latin typeface="Consolas"/>
+                <a:cs typeface="Consolas"/>
+              </a:rPr>
+              <a:t>'</a:t>
+            </a:r>
+            <a:r>
+              <a:rPr lang="sk-SK" sz="2800" dirty="0" smtClean="0">
+                <a:solidFill>
+                  <a:srgbClr val="E46C0A"/>
+                </a:solidFill>
+                <a:latin typeface="Consolas"/>
+                <a:cs typeface="Consolas"/>
+              </a:rPr>
+              <a:t>results</a:t>
+            </a:r>
+            <a:r>
+              <a:rPr lang="sk-SK" sz="2800" dirty="0" smtClean="0">
+                <a:solidFill>
+                  <a:srgbClr val="E46C0A"/>
+                </a:solidFill>
+                <a:latin typeface="Consolas"/>
+                <a:cs typeface="Consolas"/>
+              </a:rPr>
+              <a:t>-{#}.</a:t>
+            </a:r>
+            <a:r>
+              <a:rPr lang="sk-SK" sz="2800" dirty="0" smtClean="0">
+                <a:solidFill>
+                  <a:srgbClr val="E46C0A"/>
+                </a:solidFill>
+                <a:latin typeface="Consolas"/>
+                <a:cs typeface="Consolas"/>
+              </a:rPr>
+              <a:t>blastn' </a:t>
             </a:r>
             <a:r>
               <a:rPr lang="sk-SK" sz="2800" dirty="0" smtClean="0">
@@ -19136,7 +18462,7 @@
     </p:spTree>
     <p:extLst>
       <p:ext uri="{BB962C8B-B14F-4D97-AF65-F5344CB8AC3E}">
-        <p14:creationId xmlns:p14="http://schemas.microsoft.com/office/powerpoint/2010/main" xmlns:p="http://schemas.openxmlformats.org/presentationml/2006/main" xmlns:r="http://schemas.openxmlformats.org/officeDocument/2006/relationships" xmlns:a="http://schemas.openxmlformats.org/drawingml/2006/main" xmlns="" val="558199767"/>
+        <p14:creationId xmlns:p14="http://schemas.microsoft.com/office/powerpoint/2010/main" val="558199767"/>
       </p:ext>
     </p:extLst>
   </p:cSld>
@@ -19146,7 +18472,7 @@
   <p:timing>
     <p:tnLst>
       <p:par>
-        <p:cTn id="1" dur="indefinite" restart="never" nodeType="tmRoot"/>
+        <p:cTn xmlns:p14="http://schemas.microsoft.com/office/powerpoint/2010/main" id="1" dur="indefinite" restart="never" nodeType="tmRoot"/>
       </p:par>
     </p:tnLst>
   </p:timing>
@@ -19154,7 +18480,7 @@
 </file>
 
 <file path=ppt/slides/slide38.xml><?xml version="1.0" encoding="utf-8"?>
-<p:sld xmlns:a="http://schemas.openxmlformats.org/drawingml/2006/main" xmlns:r="http://schemas.openxmlformats.org/officeDocument/2006/relationships" xmlns:mc="http://schemas.openxmlformats.org/markup-compatibility/2006" xmlns:mv="urn:schemas-microsoft-com:mac:vml" xmlns:p="http://schemas.openxmlformats.org/presentationml/2006/main" mc:Ignorable="mv" mc:PreserveAttributes="mv:*">
+<p:sld xmlns:a="http://schemas.openxmlformats.org/drawingml/2006/main" xmlns:r="http://schemas.openxmlformats.org/officeDocument/2006/relationships" xmlns:p="http://schemas.openxmlformats.org/presentationml/2006/main">
   <p:cSld>
     <p:spTree>
       <p:nvGrpSpPr>
@@ -19336,7 +18662,35 @@
                 <a:latin typeface="Consolas"/>
                 <a:cs typeface="Consolas"/>
               </a:rPr>
-              <a:t>        -outfmt 0 -out results-{#}.blastn \</a:t>
+              <a:t>        -outfmt 0 -out </a:t>
+            </a:r>
+            <a:r>
+              <a:rPr lang="sk-SK" sz="2800" dirty="0" smtClean="0">
+                <a:latin typeface="Consolas"/>
+                <a:cs typeface="Consolas"/>
+              </a:rPr>
+              <a:t>'results</a:t>
+            </a:r>
+            <a:r>
+              <a:rPr lang="sk-SK" sz="2800" dirty="0" smtClean="0">
+                <a:latin typeface="Consolas"/>
+                <a:cs typeface="Consolas"/>
+              </a:rPr>
+              <a:t>-{#}</a:t>
+            </a:r>
+            <a:r>
+              <a:rPr lang="sk-SK" sz="2800" dirty="0" smtClean="0">
+                <a:latin typeface="Consolas"/>
+                <a:cs typeface="Consolas"/>
+              </a:rPr>
+              <a:t>.blastn' </a:t>
+            </a:r>
+            <a:r>
+              <a:rPr lang="sk-SK" sz="2800" dirty="0" smtClean="0">
+                <a:latin typeface="Consolas"/>
+                <a:cs typeface="Consolas"/>
+              </a:rPr>
+              <a:t>\</a:t>
             </a:r>
           </a:p>
           <a:p>
@@ -19389,7 +18743,7 @@
     </p:spTree>
     <p:extLst>
       <p:ext uri="{BB962C8B-B14F-4D97-AF65-F5344CB8AC3E}">
-        <p14:creationId xmlns:p14="http://schemas.microsoft.com/office/powerpoint/2010/main" xmlns:p="http://schemas.openxmlformats.org/presentationml/2006/main" xmlns:r="http://schemas.openxmlformats.org/officeDocument/2006/relationships" xmlns:a="http://schemas.openxmlformats.org/drawingml/2006/main" xmlns="" val="3132673117"/>
+        <p14:creationId xmlns:p14="http://schemas.microsoft.com/office/powerpoint/2010/main" val="3132673117"/>
       </p:ext>
     </p:extLst>
   </p:cSld>
@@ -19399,7 +18753,7 @@
   <p:timing>
     <p:tnLst>
       <p:par>
-        <p:cTn id="1" dur="indefinite" restart="never" nodeType="tmRoot"/>
+        <p:cTn xmlns:p14="http://schemas.microsoft.com/office/powerpoint/2010/main" id="1" dur="indefinite" restart="never" nodeType="tmRoot"/>
       </p:par>
     </p:tnLst>
   </p:timing>
@@ -19407,7 +18761,7 @@
 </file>
 
 <file path=ppt/slides/slide39.xml><?xml version="1.0" encoding="utf-8"?>
-<p:sld xmlns:a="http://schemas.openxmlformats.org/drawingml/2006/main" xmlns:r="http://schemas.openxmlformats.org/officeDocument/2006/relationships" xmlns:mc="http://schemas.openxmlformats.org/markup-compatibility/2006" xmlns:mv="urn:schemas-microsoft-com:mac:vml" xmlns:p="http://schemas.openxmlformats.org/presentationml/2006/main" mc:Ignorable="mv" mc:PreserveAttributes="mv:*">
+<p:sld xmlns:a="http://schemas.openxmlformats.org/drawingml/2006/main" xmlns:r="http://schemas.openxmlformats.org/officeDocument/2006/relationships" xmlns:p="http://schemas.openxmlformats.org/presentationml/2006/main">
   <p:cSld>
     <p:spTree>
       <p:nvGrpSpPr>
@@ -19516,7 +18870,7 @@
     </p:spTree>
     <p:extLst>
       <p:ext uri="{BB962C8B-B14F-4D97-AF65-F5344CB8AC3E}">
-        <p14:creationId xmlns:p14="http://schemas.microsoft.com/office/powerpoint/2010/main" xmlns:p="http://schemas.openxmlformats.org/presentationml/2006/main" xmlns:r="http://schemas.openxmlformats.org/officeDocument/2006/relationships" xmlns:a="http://schemas.openxmlformats.org/drawingml/2006/main" xmlns="" val="291973442"/>
+        <p14:creationId xmlns:p14="http://schemas.microsoft.com/office/powerpoint/2010/main" val="291973442"/>
       </p:ext>
     </p:extLst>
   </p:cSld>
@@ -19526,7 +18880,7 @@
   <p:timing>
     <p:tnLst>
       <p:par>
-        <p:cTn id="1" dur="indefinite" restart="never" nodeType="tmRoot"/>
+        <p:cTn xmlns:p14="http://schemas.microsoft.com/office/powerpoint/2010/main" id="1" dur="indefinite" restart="never" nodeType="tmRoot"/>
       </p:par>
     </p:tnLst>
   </p:timing>
@@ -19534,7 +18888,7 @@
 </file>
 
 <file path=ppt/slides/slide4.xml><?xml version="1.0" encoding="utf-8"?>
-<p:sld xmlns:a="http://schemas.openxmlformats.org/drawingml/2006/main" xmlns:r="http://schemas.openxmlformats.org/officeDocument/2006/relationships" xmlns:mc="http://schemas.openxmlformats.org/markup-compatibility/2006" xmlns:mv="urn:schemas-microsoft-com:mac:vml" xmlns:p="http://schemas.openxmlformats.org/presentationml/2006/main" mc:Ignorable="mv" mc:PreserveAttributes="mv:*">
+<p:sld xmlns:a="http://schemas.openxmlformats.org/drawingml/2006/main" xmlns:r="http://schemas.openxmlformats.org/officeDocument/2006/relationships" xmlns:p="http://schemas.openxmlformats.org/presentationml/2006/main">
   <p:cSld>
     <p:spTree>
       <p:nvGrpSpPr>
@@ -19974,7 +19328,7 @@
     </p:spTree>
     <p:extLst>
       <p:ext uri="{BB962C8B-B14F-4D97-AF65-F5344CB8AC3E}">
-        <p14:creationId xmlns:p14="http://schemas.microsoft.com/office/powerpoint/2010/main" xmlns:p="http://schemas.openxmlformats.org/presentationml/2006/main" xmlns:r="http://schemas.openxmlformats.org/officeDocument/2006/relationships" xmlns:a="http://schemas.openxmlformats.org/drawingml/2006/main" xmlns="" val="3271393043"/>
+        <p14:creationId xmlns:p14="http://schemas.microsoft.com/office/powerpoint/2010/main" val="3271393043"/>
       </p:ext>
     </p:extLst>
   </p:cSld>
@@ -19984,7 +19338,7 @@
   <p:timing>
     <p:tnLst>
       <p:par>
-        <p:cTn id="1" dur="indefinite" restart="never" nodeType="tmRoot"/>
+        <p:cTn xmlns:p14="http://schemas.microsoft.com/office/powerpoint/2010/main" id="1" dur="indefinite" restart="never" nodeType="tmRoot"/>
       </p:par>
     </p:tnLst>
   </p:timing>
@@ -19992,7 +19346,7 @@
 </file>
 
 <file path=ppt/slides/slide40.xml><?xml version="1.0" encoding="utf-8"?>
-<p:sld xmlns:a="http://schemas.openxmlformats.org/drawingml/2006/main" xmlns:r="http://schemas.openxmlformats.org/officeDocument/2006/relationships" xmlns:mc="http://schemas.openxmlformats.org/markup-compatibility/2006" xmlns:mv="urn:schemas-microsoft-com:mac:vml" xmlns:p="http://schemas.openxmlformats.org/presentationml/2006/main" mc:Ignorable="mv" mc:PreserveAttributes="mv:*">
+<p:sld xmlns:a="http://schemas.openxmlformats.org/drawingml/2006/main" xmlns:r="http://schemas.openxmlformats.org/officeDocument/2006/relationships" xmlns:p="http://schemas.openxmlformats.org/presentationml/2006/main">
   <p:cSld>
     <p:spTree>
       <p:nvGrpSpPr>
@@ -20109,26 +19463,16 @@
                 <a:latin typeface="Consolas"/>
                 <a:cs typeface="Consolas"/>
               </a:rPr>
-              <a:t>man </a:t>
-            </a:r>
+              <a:t>man parallel</a:t>
+            </a:r>
+          </a:p>
+          <a:p>
             <a:r>
               <a:rPr lang="en-US" dirty="0" smtClean="0">
-                <a:latin typeface="Consolas"/>
-                <a:cs typeface="Consolas"/>
-              </a:rPr>
-              <a:t>parallel</a:t>
-            </a:r>
-          </a:p>
-          <a:p>
-            <a:r>
-              <a:rPr lang="en-US" dirty="0" smtClean="0">
                 <a:cs typeface="Consolas"/>
               </a:rPr>
               <a:t>PDF of this talk, with notes, on the wiki</a:t>
             </a:r>
-            <a:endParaRPr lang="en-US" dirty="0" smtClean="0">
-              <a:cs typeface="Consolas"/>
-            </a:endParaRPr>
           </a:p>
           <a:p>
             <a:r>
@@ -20142,7 +19486,7 @@
     </p:spTree>
     <p:extLst>
       <p:ext uri="{BB962C8B-B14F-4D97-AF65-F5344CB8AC3E}">
-        <p14:creationId xmlns:p14="http://schemas.microsoft.com/office/powerpoint/2010/main" xmlns:p="http://schemas.openxmlformats.org/presentationml/2006/main" xmlns:r="http://schemas.openxmlformats.org/officeDocument/2006/relationships" xmlns:a="http://schemas.openxmlformats.org/drawingml/2006/main" xmlns="" val="2733509859"/>
+        <p14:creationId xmlns:p14="http://schemas.microsoft.com/office/powerpoint/2010/main" val="2733509859"/>
       </p:ext>
     </p:extLst>
   </p:cSld>
@@ -20152,7 +19496,7 @@
   <p:timing>
     <p:tnLst>
       <p:par>
-        <p:cTn id="1" dur="indefinite" restart="never" nodeType="tmRoot"/>
+        <p:cTn xmlns:p14="http://schemas.microsoft.com/office/powerpoint/2010/main" id="1" dur="indefinite" restart="never" nodeType="tmRoot"/>
       </p:par>
     </p:tnLst>
   </p:timing>
@@ -20160,7 +19504,7 @@
 </file>
 
 <file path=ppt/slides/slide41.xml><?xml version="1.0" encoding="utf-8"?>
-<p:sld xmlns:a="http://schemas.openxmlformats.org/drawingml/2006/main" xmlns:r="http://schemas.openxmlformats.org/officeDocument/2006/relationships" xmlns:mc="http://schemas.openxmlformats.org/markup-compatibility/2006" xmlns:mv="urn:schemas-microsoft-com:mac:vml" xmlns:p="http://schemas.openxmlformats.org/presentationml/2006/main" mc:Ignorable="mv" mc:PreserveAttributes="mv:*">
+<p:sld xmlns:a="http://schemas.openxmlformats.org/drawingml/2006/main" xmlns:r="http://schemas.openxmlformats.org/officeDocument/2006/relationships" xmlns:p="http://schemas.openxmlformats.org/presentationml/2006/main">
   <p:cSld>
     <p:spTree>
       <p:nvGrpSpPr>
@@ -20227,7 +19571,7 @@
 </file>
 
 <file path=ppt/slides/slide42.xml><?xml version="1.0" encoding="utf-8"?>
-<p:sld xmlns:a="http://schemas.openxmlformats.org/drawingml/2006/main" xmlns:r="http://schemas.openxmlformats.org/officeDocument/2006/relationships" xmlns:mc="http://schemas.openxmlformats.org/markup-compatibility/2006" xmlns:mv="urn:schemas-microsoft-com:mac:vml" xmlns:p="http://schemas.openxmlformats.org/presentationml/2006/main" mc:Ignorable="mv" mc:PreserveAttributes="mv:*">
+<p:sld xmlns:a="http://schemas.openxmlformats.org/drawingml/2006/main" xmlns:r="http://schemas.openxmlformats.org/officeDocument/2006/relationships" xmlns:p="http://schemas.openxmlformats.org/presentationml/2006/main">
   <p:cSld>
     <p:spTree>
       <p:nvGrpSpPr>
@@ -20289,7 +19633,7 @@
   <p:timing>
     <p:tnLst>
       <p:par>
-        <p:cTn id="1" dur="indefinite" restart="never" nodeType="tmRoot"/>
+        <p:cTn xmlns:p14="http://schemas.microsoft.com/office/powerpoint/2010/main" id="1" dur="indefinite" restart="never" nodeType="tmRoot"/>
       </p:par>
     </p:tnLst>
   </p:timing>
@@ -20297,7 +19641,7 @@
 </file>
 
 <file path=ppt/slides/slide43.xml><?xml version="1.0" encoding="utf-8"?>
-<p:sld xmlns:a="http://schemas.openxmlformats.org/drawingml/2006/main" xmlns:r="http://schemas.openxmlformats.org/officeDocument/2006/relationships" xmlns:mc="http://schemas.openxmlformats.org/markup-compatibility/2006" xmlns:mv="urn:schemas-microsoft-com:mac:vml" xmlns:p="http://schemas.openxmlformats.org/presentationml/2006/main" mc:Ignorable="mv" mc:PreserveAttributes="mv:*">
+<p:sld xmlns:a="http://schemas.openxmlformats.org/drawingml/2006/main" xmlns:r="http://schemas.openxmlformats.org/officeDocument/2006/relationships" xmlns:p="http://schemas.openxmlformats.org/presentationml/2006/main">
   <p:cSld>
     <p:spTree>
       <p:nvGrpSpPr>
@@ -20359,11 +19703,7 @@
           <a:p>
             <a:r>
               <a:rPr lang="en-US" dirty="0" smtClean="0"/>
-              <a:t>Charts to manually </a:t>
-            </a:r>
-            <a:r>
-              <a:rPr lang="en-US" dirty="0" smtClean="0"/>
-              <a:t>inspect afterwards</a:t>
+              <a:t>Charts to manually inspect afterwards</a:t>
             </a:r>
           </a:p>
           <a:p>
@@ -20371,14 +19711,13 @@
               <a:rPr lang="en-US" dirty="0" smtClean="0"/>
               <a:t>Assertions to automatically verify assumptions</a:t>
             </a:r>
-            <a:endParaRPr lang="en-US" dirty="0" smtClean="0"/>
           </a:p>
         </p:txBody>
       </p:sp>
     </p:spTree>
     <p:extLst>
       <p:ext uri="{BB962C8B-B14F-4D97-AF65-F5344CB8AC3E}">
-        <p14:creationId xmlns:p14="http://schemas.microsoft.com/office/powerpoint/2010/main" xmlns:p="http://schemas.openxmlformats.org/presentationml/2006/main" xmlns:r="http://schemas.openxmlformats.org/officeDocument/2006/relationships" xmlns:a="http://schemas.openxmlformats.org/drawingml/2006/main" xmlns="" val="1893170104"/>
+        <p14:creationId xmlns:p14="http://schemas.microsoft.com/office/powerpoint/2010/main" val="1893170104"/>
       </p:ext>
     </p:extLst>
   </p:cSld>
@@ -20388,7 +19727,7 @@
   <p:timing>
     <p:tnLst>
       <p:par>
-        <p:cTn id="1" dur="indefinite" restart="never" nodeType="tmRoot"/>
+        <p:cTn xmlns:p14="http://schemas.microsoft.com/office/powerpoint/2010/main" id="1" dur="indefinite" restart="never" nodeType="tmRoot"/>
       </p:par>
     </p:tnLst>
   </p:timing>
@@ -20396,7 +19735,7 @@
 </file>
 
 <file path=ppt/slides/slide44.xml><?xml version="1.0" encoding="utf-8"?>
-<p:sld xmlns:a="http://schemas.openxmlformats.org/drawingml/2006/main" xmlns:r="http://schemas.openxmlformats.org/officeDocument/2006/relationships" xmlns:mc="http://schemas.openxmlformats.org/markup-compatibility/2006" xmlns:mv="urn:schemas-microsoft-com:mac:vml" xmlns:p="http://schemas.openxmlformats.org/presentationml/2006/main" mc:Ignorable="mv" mc:PreserveAttributes="mv:*">
+<p:sld xmlns:a="http://schemas.openxmlformats.org/drawingml/2006/main" xmlns:r="http://schemas.openxmlformats.org/officeDocument/2006/relationships" xmlns:p="http://schemas.openxmlformats.org/presentationml/2006/main">
   <p:cSld>
     <p:spTree>
       <p:nvGrpSpPr>
@@ -20692,7 +20031,7 @@
     </p:spTree>
     <p:extLst>
       <p:ext uri="{BB962C8B-B14F-4D97-AF65-F5344CB8AC3E}">
-        <p14:creationId xmlns:p14="http://schemas.microsoft.com/office/powerpoint/2010/main" xmlns:p="http://schemas.openxmlformats.org/presentationml/2006/main" xmlns:r="http://schemas.openxmlformats.org/officeDocument/2006/relationships" xmlns:a="http://schemas.openxmlformats.org/drawingml/2006/main" xmlns="" val="2796108273"/>
+        <p14:creationId xmlns:p14="http://schemas.microsoft.com/office/powerpoint/2010/main" val="2796108273"/>
       </p:ext>
     </p:extLst>
   </p:cSld>
@@ -20702,7 +20041,7 @@
   <p:timing>
     <p:tnLst>
       <p:par>
-        <p:cTn id="1" dur="indefinite" restart="never" nodeType="tmRoot"/>
+        <p:cTn xmlns:p14="http://schemas.microsoft.com/office/powerpoint/2010/main" id="1" dur="indefinite" restart="never" nodeType="tmRoot"/>
       </p:par>
     </p:tnLst>
   </p:timing>
@@ -20710,7 +20049,7 @@
 </file>
 
 <file path=ppt/slides/slide45.xml><?xml version="1.0" encoding="utf-8"?>
-<p:sld xmlns:a="http://schemas.openxmlformats.org/drawingml/2006/main" xmlns:r="http://schemas.openxmlformats.org/officeDocument/2006/relationships" xmlns:mc="http://schemas.openxmlformats.org/markup-compatibility/2006" xmlns:mv="urn:schemas-microsoft-com:mac:vml" xmlns:p="http://schemas.openxmlformats.org/presentationml/2006/main" mc:Ignorable="mv" mc:PreserveAttributes="mv:*">
+<p:sld xmlns:a="http://schemas.openxmlformats.org/drawingml/2006/main" xmlns:r="http://schemas.openxmlformats.org/officeDocument/2006/relationships" xmlns:p="http://schemas.openxmlformats.org/presentationml/2006/main">
   <p:cSld>
     <p:spTree>
       <p:nvGrpSpPr>
@@ -21031,7 +20370,7 @@
     </p:spTree>
     <p:extLst>
       <p:ext uri="{BB962C8B-B14F-4D97-AF65-F5344CB8AC3E}">
-        <p14:creationId xmlns:p14="http://schemas.microsoft.com/office/powerpoint/2010/main" xmlns:p="http://schemas.openxmlformats.org/presentationml/2006/main" xmlns:r="http://schemas.openxmlformats.org/officeDocument/2006/relationships" xmlns:a="http://schemas.openxmlformats.org/drawingml/2006/main" xmlns="" val="1652581726"/>
+        <p14:creationId xmlns:p14="http://schemas.microsoft.com/office/powerpoint/2010/main" val="1652581726"/>
       </p:ext>
     </p:extLst>
   </p:cSld>
@@ -21042,7 +20381,7 @@
 </file>
 
 <file path=ppt/slides/slide5.xml><?xml version="1.0" encoding="utf-8"?>
-<p:sld xmlns:a="http://schemas.openxmlformats.org/drawingml/2006/main" xmlns:r="http://schemas.openxmlformats.org/officeDocument/2006/relationships" xmlns:mc="http://schemas.openxmlformats.org/markup-compatibility/2006" xmlns:mv="urn:schemas-microsoft-com:mac:vml" xmlns:p="http://schemas.openxmlformats.org/presentationml/2006/main" mc:Ignorable="mv" mc:PreserveAttributes="mv:*">
+<p:sld xmlns:a="http://schemas.openxmlformats.org/drawingml/2006/main" xmlns:r="http://schemas.openxmlformats.org/officeDocument/2006/relationships" xmlns:p="http://schemas.openxmlformats.org/presentationml/2006/main">
   <p:cSld>
     <p:spTree>
       <p:nvGrpSpPr>
@@ -21173,7 +20512,7 @@
     </p:spTree>
     <p:extLst>
       <p:ext uri="{BB962C8B-B14F-4D97-AF65-F5344CB8AC3E}">
-        <p14:creationId xmlns:p14="http://schemas.microsoft.com/office/powerpoint/2010/main" xmlns:p="http://schemas.openxmlformats.org/presentationml/2006/main" xmlns:r="http://schemas.openxmlformats.org/officeDocument/2006/relationships" xmlns:a="http://schemas.openxmlformats.org/drawingml/2006/main" xmlns="" val="3115872650"/>
+        <p14:creationId xmlns:p14="http://schemas.microsoft.com/office/powerpoint/2010/main" val="3115872650"/>
       </p:ext>
     </p:extLst>
   </p:cSld>
@@ -21183,7 +20522,7 @@
   <p:timing>
     <p:tnLst>
       <p:par>
-        <p:cTn id="1" dur="indefinite" restart="never" nodeType="tmRoot"/>
+        <p:cTn xmlns:p14="http://schemas.microsoft.com/office/powerpoint/2010/main" id="1" dur="indefinite" restart="never" nodeType="tmRoot"/>
       </p:par>
     </p:tnLst>
   </p:timing>
@@ -21191,7 +20530,7 @@
 </file>
 
 <file path=ppt/slides/slide6.xml><?xml version="1.0" encoding="utf-8"?>
-<p:sld xmlns:a="http://schemas.openxmlformats.org/drawingml/2006/main" xmlns:r="http://schemas.openxmlformats.org/officeDocument/2006/relationships" xmlns:mc="http://schemas.openxmlformats.org/markup-compatibility/2006" xmlns:mv="urn:schemas-microsoft-com:mac:vml" xmlns:p="http://schemas.openxmlformats.org/presentationml/2006/main" mc:Ignorable="mv" mc:PreserveAttributes="mv:*">
+<p:sld xmlns:a="http://schemas.openxmlformats.org/drawingml/2006/main" xmlns:r="http://schemas.openxmlformats.org/officeDocument/2006/relationships" xmlns:p="http://schemas.openxmlformats.org/presentationml/2006/main">
   <p:cSld>
     <p:spTree>
       <p:nvGrpSpPr>
@@ -21323,7 +20662,7 @@
     </p:spTree>
     <p:extLst>
       <p:ext uri="{BB962C8B-B14F-4D97-AF65-F5344CB8AC3E}">
-        <p14:creationId xmlns:p14="http://schemas.microsoft.com/office/powerpoint/2010/main" xmlns:p="http://schemas.openxmlformats.org/presentationml/2006/main" xmlns:r="http://schemas.openxmlformats.org/officeDocument/2006/relationships" xmlns:a="http://schemas.openxmlformats.org/drawingml/2006/main" xmlns="" val="2938609864"/>
+        <p14:creationId xmlns:p14="http://schemas.microsoft.com/office/powerpoint/2010/main" val="2938609864"/>
       </p:ext>
     </p:extLst>
   </p:cSld>
@@ -21333,7 +20672,7 @@
   <p:timing>
     <p:tnLst>
       <p:par>
-        <p:cTn id="1" dur="indefinite" restart="never" nodeType="tmRoot"/>
+        <p:cTn xmlns:p14="http://schemas.microsoft.com/office/powerpoint/2010/main" id="1" dur="indefinite" restart="never" nodeType="tmRoot"/>
       </p:par>
     </p:tnLst>
   </p:timing>
@@ -21341,7 +20680,7 @@
 </file>
 
 <file path=ppt/slides/slide7.xml><?xml version="1.0" encoding="utf-8"?>
-<p:sld xmlns:a="http://schemas.openxmlformats.org/drawingml/2006/main" xmlns:r="http://schemas.openxmlformats.org/officeDocument/2006/relationships" xmlns:mc="http://schemas.openxmlformats.org/markup-compatibility/2006" xmlns:mv="urn:schemas-microsoft-com:mac:vml" xmlns:p="http://schemas.openxmlformats.org/presentationml/2006/main" mc:Ignorable="mv" mc:PreserveAttributes="mv:*">
+<p:sld xmlns:a="http://schemas.openxmlformats.org/drawingml/2006/main" xmlns:r="http://schemas.openxmlformats.org/officeDocument/2006/relationships" xmlns:p="http://schemas.openxmlformats.org/presentationml/2006/main">
   <p:cSld>
     <p:spTree>
       <p:nvGrpSpPr>
@@ -21667,7 +21006,7 @@
     </p:spTree>
     <p:extLst>
       <p:ext uri="{BB962C8B-B14F-4D97-AF65-F5344CB8AC3E}">
-        <p14:creationId xmlns:p14="http://schemas.microsoft.com/office/powerpoint/2010/main" xmlns:p="http://schemas.openxmlformats.org/presentationml/2006/main" xmlns:r="http://schemas.openxmlformats.org/officeDocument/2006/relationships" xmlns:a="http://schemas.openxmlformats.org/drawingml/2006/main" xmlns="" val="947373056"/>
+        <p14:creationId xmlns:p14="http://schemas.microsoft.com/office/powerpoint/2010/main" val="947373056"/>
       </p:ext>
     </p:extLst>
   </p:cSld>
@@ -21677,7 +21016,7 @@
   <p:timing>
     <p:tnLst>
       <p:par>
-        <p:cTn id="1" dur="indefinite" restart="never" nodeType="tmRoot"/>
+        <p:cTn xmlns:p14="http://schemas.microsoft.com/office/powerpoint/2010/main" id="1" dur="indefinite" restart="never" nodeType="tmRoot"/>
       </p:par>
     </p:tnLst>
   </p:timing>
@@ -21685,7 +21024,7 @@
 </file>
 
 <file path=ppt/slides/slide8.xml><?xml version="1.0" encoding="utf-8"?>
-<p:sld xmlns:a="http://schemas.openxmlformats.org/drawingml/2006/main" xmlns:r="http://schemas.openxmlformats.org/officeDocument/2006/relationships" xmlns:mc="http://schemas.openxmlformats.org/markup-compatibility/2006" xmlns:mv="urn:schemas-microsoft-com:mac:vml" xmlns:p="http://schemas.openxmlformats.org/presentationml/2006/main" mc:Ignorable="mv" mc:PreserveAttributes="mv:*">
+<p:sld xmlns:a="http://schemas.openxmlformats.org/drawingml/2006/main" xmlns:r="http://schemas.openxmlformats.org/officeDocument/2006/relationships" xmlns:p="http://schemas.openxmlformats.org/presentationml/2006/main">
   <p:cSld>
     <p:spTree>
       <p:nvGrpSpPr>
@@ -22035,7 +21374,7 @@
     </p:spTree>
     <p:extLst>
       <p:ext uri="{BB962C8B-B14F-4D97-AF65-F5344CB8AC3E}">
-        <p14:creationId xmlns:p14="http://schemas.microsoft.com/office/powerpoint/2010/main" xmlns:p="http://schemas.openxmlformats.org/presentationml/2006/main" xmlns:r="http://schemas.openxmlformats.org/officeDocument/2006/relationships" xmlns:a="http://schemas.openxmlformats.org/drawingml/2006/main" xmlns="" val="1628768312"/>
+        <p14:creationId xmlns:p14="http://schemas.microsoft.com/office/powerpoint/2010/main" val="1628768312"/>
       </p:ext>
     </p:extLst>
   </p:cSld>
@@ -22045,7 +21384,7 @@
   <p:timing>
     <p:tnLst>
       <p:par>
-        <p:cTn id="1" dur="indefinite" restart="never" nodeType="tmRoot"/>
+        <p:cTn xmlns:p14="http://schemas.microsoft.com/office/powerpoint/2010/main" id="1" dur="indefinite" restart="never" nodeType="tmRoot"/>
       </p:par>
     </p:tnLst>
   </p:timing>
@@ -22053,7 +21392,7 @@
 </file>
 
 <file path=ppt/slides/slide9.xml><?xml version="1.0" encoding="utf-8"?>
-<p:sld xmlns:a="http://schemas.openxmlformats.org/drawingml/2006/main" xmlns:r="http://schemas.openxmlformats.org/officeDocument/2006/relationships" xmlns:mc="http://schemas.openxmlformats.org/markup-compatibility/2006" xmlns:mv="urn:schemas-microsoft-com:mac:vml" xmlns:p="http://schemas.openxmlformats.org/presentationml/2006/main" mc:Ignorable="mv" mc:PreserveAttributes="mv:*">
+<p:sld xmlns:a="http://schemas.openxmlformats.org/drawingml/2006/main" xmlns:r="http://schemas.openxmlformats.org/officeDocument/2006/relationships" xmlns:p="http://schemas.openxmlformats.org/presentationml/2006/main">
   <p:cSld>
     <p:spTree>
       <p:nvGrpSpPr>
@@ -22651,7 +21990,7 @@
                 <a:latin typeface="Consolas"/>
                 <a:cs typeface="Consolas"/>
               </a:rPr>
-              <a:t>seqs_aa.nexus</a:t>
+              <a:t>seqs_aa.nxs</a:t>
             </a:r>
             <a:endParaRPr lang="en-US" sz="2400" dirty="0" smtClean="0">
               <a:latin typeface="Consolas"/>
@@ -22663,7 +22002,7 @@
     </p:spTree>
     <p:extLst>
       <p:ext uri="{BB962C8B-B14F-4D97-AF65-F5344CB8AC3E}">
-        <p14:creationId xmlns:p14="http://schemas.microsoft.com/office/powerpoint/2010/main" xmlns:p="http://schemas.openxmlformats.org/presentationml/2006/main" xmlns:r="http://schemas.openxmlformats.org/officeDocument/2006/relationships" xmlns:a="http://schemas.openxmlformats.org/drawingml/2006/main" xmlns="" val="1527133606"/>
+        <p14:creationId xmlns:p14="http://schemas.microsoft.com/office/powerpoint/2010/main" val="1527133606"/>
       </p:ext>
     </p:extLst>
   </p:cSld>
@@ -22673,7 +22012,7 @@
   <p:timing>
     <p:tnLst>
       <p:par>
-        <p:cTn id="1" dur="indefinite" restart="never" nodeType="tmRoot"/>
+        <p:cTn xmlns:p14="http://schemas.microsoft.com/office/powerpoint/2010/main" id="1" dur="indefinite" restart="never" nodeType="tmRoot"/>
       </p:par>
     </p:tnLst>
   </p:timing>

</xml_diff>

<commit_message>
Standardize color of comments
</commit_message>
<xml_diff>
--- a/CBG-2014-05-21.pptx
+++ b/CBG-2014-05-21.pptx
@@ -11667,9 +11667,8 @@
             <a:r>
               <a:rPr lang="en-US" sz="2400" dirty="0">
                 <a:solidFill>
-                  <a:schemeClr val="tx1">
-                    <a:lumMod val="65000"/>
-                    <a:lumOff val="35000"/>
+                  <a:schemeClr val="bg1">
+                    <a:lumMod val="50000"/>
                   </a:schemeClr>
                 </a:solidFill>
                 <a:latin typeface="Consolas"/>
@@ -11680,9 +11679,8 @@
             <a:r>
               <a:rPr lang="en-US" sz="2400" dirty="0" err="1">
                 <a:solidFill>
-                  <a:schemeClr val="tx1">
-                    <a:lumMod val="65000"/>
-                    <a:lumOff val="35000"/>
+                  <a:schemeClr val="bg1">
+                    <a:lumMod val="50000"/>
                   </a:schemeClr>
                 </a:solidFill>
                 <a:latin typeface="Consolas"/>
@@ -11692,9 +11690,8 @@
             </a:r>
             <a:endParaRPr lang="en-US" sz="2400" dirty="0">
               <a:solidFill>
-                <a:schemeClr val="tx1">
-                  <a:lumMod val="65000"/>
-                  <a:lumOff val="35000"/>
+                <a:schemeClr val="bg1">
+                  <a:lumMod val="50000"/>
                 </a:schemeClr>
               </a:solidFill>
               <a:latin typeface="Consolas"/>
@@ -21788,6 +21785,9 @@
             </a:r>
             <a:r>
               <a:rPr lang="en-US" sz="2400" dirty="0" smtClean="0">
+                <a:solidFill>
+                  <a:srgbClr val="7F7F7F"/>
+                </a:solidFill>
                 <a:latin typeface="Consolas"/>
                 <a:cs typeface="Consolas"/>
               </a:rPr>
@@ -21795,6 +21795,9 @@
             </a:r>
             <a:r>
               <a:rPr lang="en-US" sz="2400" dirty="0" err="1" smtClean="0">
+                <a:solidFill>
+                  <a:srgbClr val="7F7F7F"/>
+                </a:solidFill>
                 <a:latin typeface="Consolas"/>
                 <a:cs typeface="Consolas"/>
               </a:rPr>
@@ -21802,6 +21805,9 @@
             </a:r>
             <a:r>
               <a:rPr lang="en-US" sz="2400" dirty="0" smtClean="0">
+                <a:solidFill>
+                  <a:srgbClr val="7F7F7F"/>
+                </a:solidFill>
                 <a:latin typeface="Consolas"/>
                 <a:cs typeface="Consolas"/>
               </a:rPr>

</xml_diff>

<commit_message>
Colorize for-loop example slides
</commit_message>
<xml_diff>
--- a/CBG-2014-05-21.pptx
+++ b/CBG-2014-05-21.pptx
@@ -18592,10 +18592,42 @@
                 <a:latin typeface="Consolas"/>
                 <a:cs typeface="Consolas"/>
               </a:rPr>
-              <a:t>for file in *.</a:t>
+              <a:t>for </a:t>
+            </a:r>
+            <a:r>
+              <a:rPr lang="en-US" sz="2900" dirty="0">
+                <a:solidFill>
+                  <a:schemeClr val="accent3">
+                    <a:lumMod val="75000"/>
+                  </a:schemeClr>
+                </a:solidFill>
+                <a:latin typeface="Consolas"/>
+                <a:cs typeface="Consolas"/>
+              </a:rPr>
+              <a:t>file </a:t>
+            </a:r>
+            <a:r>
+              <a:rPr lang="en-US" sz="2900" dirty="0">
+                <a:latin typeface="Consolas"/>
+                <a:cs typeface="Consolas"/>
+              </a:rPr>
+              <a:t>in </a:t>
+            </a:r>
+            <a:r>
+              <a:rPr lang="en-US" sz="2900" dirty="0">
+                <a:solidFill>
+                  <a:srgbClr val="77933C"/>
+                </a:solidFill>
+                <a:latin typeface="Consolas"/>
+                <a:cs typeface="Consolas"/>
+              </a:rPr>
+              <a:t>*.</a:t>
             </a:r>
             <a:r>
               <a:rPr lang="en-US" sz="2900" dirty="0" err="1">
+                <a:solidFill>
+                  <a:srgbClr val="77933C"/>
+                </a:solidFill>
                 <a:latin typeface="Consolas"/>
                 <a:cs typeface="Consolas"/>
               </a:rPr>
@@ -18632,16 +18664,58 @@
                 <a:latin typeface="Consolas"/>
                 <a:cs typeface="Consolas"/>
               </a:rPr>
-              <a:t> -in $file -out $</a:t>
+              <a:t> -in </a:t>
+            </a:r>
+            <a:r>
+              <a:rPr lang="en-US" sz="2900" dirty="0">
+                <a:solidFill>
+                  <a:srgbClr val="77933C"/>
+                </a:solidFill>
+                <a:latin typeface="Consolas"/>
+                <a:cs typeface="Consolas"/>
+              </a:rPr>
+              <a:t>$file </a:t>
+            </a:r>
+            <a:r>
+              <a:rPr lang="en-US" sz="2900" dirty="0">
+                <a:latin typeface="Consolas"/>
+                <a:cs typeface="Consolas"/>
+              </a:rPr>
+              <a:t>-out </a:t>
+            </a:r>
+            <a:r>
+              <a:rPr lang="en-US" sz="2900" dirty="0">
+                <a:solidFill>
+                  <a:schemeClr val="tx2">
+                    <a:lumMod val="60000"/>
+                    <a:lumOff val="40000"/>
+                  </a:schemeClr>
+                </a:solidFill>
+                <a:latin typeface="Consolas"/>
+                <a:cs typeface="Consolas"/>
+              </a:rPr>
+              <a:t>$</a:t>
             </a:r>
             <a:r>
               <a:rPr lang="en-US" sz="2900" dirty="0" err="1">
+                <a:solidFill>
+                  <a:schemeClr val="tx2">
+                    <a:lumMod val="60000"/>
+                    <a:lumOff val="40000"/>
+                  </a:schemeClr>
+                </a:solidFill>
                 <a:latin typeface="Consolas"/>
                 <a:cs typeface="Consolas"/>
               </a:rPr>
               <a:t>file.new</a:t>
             </a:r>
             <a:endParaRPr lang="en-US" sz="2900" dirty="0">
+              <a:solidFill>
+                <a:schemeClr val="tx2">
+                  <a:lumMod val="60000"/>
+                  <a:lumOff val="40000"/>
+                </a:schemeClr>
+              </a:solidFill>
               <a:latin typeface="Consolas"/>
               <a:cs typeface="Consolas"/>
             </a:endParaRPr>
@@ -18785,10 +18859,42 @@
                 <a:latin typeface="Consolas"/>
                 <a:cs typeface="Consolas"/>
               </a:rPr>
-              <a:t>for file in *.</a:t>
+              <a:t>for </a:t>
+            </a:r>
+            <a:r>
+              <a:rPr lang="en-US" sz="2900" dirty="0">
+                <a:solidFill>
+                  <a:schemeClr val="accent3">
+                    <a:lumMod val="75000"/>
+                  </a:schemeClr>
+                </a:solidFill>
+                <a:latin typeface="Consolas"/>
+                <a:cs typeface="Consolas"/>
+              </a:rPr>
+              <a:t>file </a:t>
+            </a:r>
+            <a:r>
+              <a:rPr lang="en-US" sz="2900" dirty="0">
+                <a:latin typeface="Consolas"/>
+                <a:cs typeface="Consolas"/>
+              </a:rPr>
+              <a:t>in </a:t>
+            </a:r>
+            <a:r>
+              <a:rPr lang="en-US" sz="2900" dirty="0">
+                <a:solidFill>
+                  <a:srgbClr val="77933C"/>
+                </a:solidFill>
+                <a:latin typeface="Consolas"/>
+                <a:cs typeface="Consolas"/>
+              </a:rPr>
+              <a:t>*.</a:t>
             </a:r>
             <a:r>
               <a:rPr lang="en-US" sz="2900" dirty="0" err="1">
+                <a:solidFill>
+                  <a:srgbClr val="77933C"/>
+                </a:solidFill>
                 <a:latin typeface="Consolas"/>
                 <a:cs typeface="Consolas"/>
               </a:rPr>
@@ -18825,15 +18931,78 @@
                 <a:latin typeface="Consolas"/>
                 <a:cs typeface="Consolas"/>
               </a:rPr>
-              <a:t> -in $file -out $</a:t>
+              <a:t> -in </a:t>
+            </a:r>
+            <a:r>
+              <a:rPr lang="en-US" sz="2900" dirty="0">
+                <a:solidFill>
+                  <a:srgbClr val="77933C"/>
+                </a:solidFill>
+                <a:latin typeface="Consolas"/>
+                <a:cs typeface="Consolas"/>
+              </a:rPr>
+              <a:t>$file </a:t>
+            </a:r>
+            <a:r>
+              <a:rPr lang="en-US" sz="2900" dirty="0">
+                <a:latin typeface="Consolas"/>
+                <a:cs typeface="Consolas"/>
+              </a:rPr>
+              <a:t>-out </a:t>
+            </a:r>
+            <a:r>
+              <a:rPr lang="en-US" sz="2900" dirty="0">
+                <a:solidFill>
+                  <a:schemeClr val="tx2">
+                    <a:lumMod val="60000"/>
+                    <a:lumOff val="40000"/>
+                  </a:schemeClr>
+                </a:solidFill>
+                <a:latin typeface="Consolas"/>
+                <a:cs typeface="Consolas"/>
+              </a:rPr>
+              <a:t>$</a:t>
             </a:r>
             <a:r>
               <a:rPr lang="en-US" sz="2900" dirty="0" err="1">
+                <a:solidFill>
+                  <a:schemeClr val="tx2">
+                    <a:lumMod val="60000"/>
+                    <a:lumOff val="40000"/>
+                  </a:schemeClr>
+                </a:solidFill>
                 <a:latin typeface="Consolas"/>
                 <a:cs typeface="Consolas"/>
               </a:rPr>
               <a:t>file.new</a:t>
             </a:r>
+            <a:endParaRPr lang="en-US" sz="2900" dirty="0">
+              <a:solidFill>
+                <a:schemeClr val="tx2">
+                  <a:lumMod val="60000"/>
+                  <a:lumOff val="40000"/>
+                </a:schemeClr>
+              </a:solidFill>
+              <a:latin typeface="Consolas"/>
+              <a:cs typeface="Consolas"/>
+            </a:endParaRPr>
+          </a:p>
+          <a:p>
+            <a:pPr marL="0" indent="0">
+              <a:buNone/>
+            </a:pPr>
+            <a:r>
+              <a:rPr lang="en-US" sz="2900" dirty="0">
+                <a:latin typeface="Consolas"/>
+                <a:cs typeface="Consolas"/>
+              </a:rPr>
+              <a:t>done</a:t>
+            </a:r>
+          </a:p>
+          <a:p>
+            <a:pPr marL="0" indent="0">
+              <a:buNone/>
+            </a:pPr>
             <a:endParaRPr lang="en-US" sz="2900" dirty="0">
               <a:latin typeface="Consolas"/>
               <a:cs typeface="Consolas"/>
@@ -18848,70 +19017,104 @@
                 <a:latin typeface="Consolas"/>
                 <a:cs typeface="Consolas"/>
               </a:rPr>
-              <a:t>done</a:t>
+              <a:t>parallel </a:t>
+            </a:r>
+            <a:r>
+              <a:rPr lang="en-US" sz="2900" dirty="0" err="1">
+                <a:latin typeface="Consolas"/>
+                <a:cs typeface="Consolas"/>
+              </a:rPr>
+              <a:t>do_something</a:t>
+            </a:r>
+            <a:r>
+              <a:rPr lang="en-US" sz="2900" dirty="0">
+                <a:latin typeface="Consolas"/>
+                <a:cs typeface="Consolas"/>
+              </a:rPr>
+              <a:t> -in </a:t>
+            </a:r>
+            <a:r>
+              <a:rPr lang="en-US" sz="2900" dirty="0">
+                <a:solidFill>
+                  <a:schemeClr val="accent3">
+                    <a:lumMod val="75000"/>
+                  </a:schemeClr>
+                </a:solidFill>
+                <a:latin typeface="Consolas"/>
+                <a:cs typeface="Consolas"/>
+              </a:rPr>
+              <a:t>{}</a:t>
+            </a:r>
+            <a:r>
+              <a:rPr lang="en-US" sz="2900" dirty="0">
+                <a:latin typeface="Consolas"/>
+                <a:cs typeface="Consolas"/>
+              </a:rPr>
+              <a:t> -out </a:t>
+            </a:r>
+            <a:r>
+              <a:rPr lang="en-US" sz="2900" dirty="0">
+                <a:solidFill>
+                  <a:srgbClr val="558ED5"/>
+                </a:solidFill>
+                <a:latin typeface="Consolas"/>
+                <a:cs typeface="Consolas"/>
+              </a:rPr>
+              <a:t>{}.new </a:t>
+            </a:r>
+            <a:r>
+              <a:rPr lang="en-US" sz="2900" dirty="0">
+                <a:solidFill>
+                  <a:srgbClr val="E46C0A"/>
+                </a:solidFill>
+                <a:latin typeface="Consolas"/>
+                <a:cs typeface="Consolas"/>
+              </a:rPr>
+              <a:t>\</a:t>
             </a:r>
           </a:p>
           <a:p>
             <a:pPr marL="0" indent="0">
               <a:buNone/>
             </a:pPr>
+            <a:r>
+              <a:rPr lang="en-US" sz="2900" dirty="0">
+                <a:latin typeface="Consolas"/>
+                <a:cs typeface="Consolas"/>
+              </a:rPr>
+              <a:t> </a:t>
+            </a:r>
+            <a:r>
+              <a:rPr lang="en-US" sz="2900" dirty="0">
+                <a:latin typeface="Consolas"/>
+                <a:cs typeface="Consolas"/>
+              </a:rPr>
+              <a:t> ::: </a:t>
+            </a:r>
+            <a:r>
+              <a:rPr lang="en-US" sz="2900" dirty="0">
+                <a:solidFill>
+                  <a:srgbClr val="77933C"/>
+                </a:solidFill>
+                <a:latin typeface="Consolas"/>
+                <a:cs typeface="Consolas"/>
+              </a:rPr>
+              <a:t>*.</a:t>
+            </a:r>
+            <a:r>
+              <a:rPr lang="en-US" sz="2900" dirty="0" err="1">
+                <a:solidFill>
+                  <a:srgbClr val="77933C"/>
+                </a:solidFill>
+                <a:latin typeface="Consolas"/>
+                <a:cs typeface="Consolas"/>
+              </a:rPr>
+              <a:t>fasta</a:t>
+            </a:r>
             <a:endParaRPr lang="en-US" sz="2900" dirty="0">
-              <a:latin typeface="Consolas"/>
-              <a:cs typeface="Consolas"/>
-            </a:endParaRPr>
-          </a:p>
-          <a:p>
-            <a:pPr marL="0" indent="0">
-              <a:buNone/>
-            </a:pPr>
-            <a:r>
-              <a:rPr lang="en-US" sz="2900" dirty="0">
-                <a:latin typeface="Consolas"/>
-                <a:cs typeface="Consolas"/>
-              </a:rPr>
-              <a:t>parallel </a:t>
-            </a:r>
-            <a:r>
-              <a:rPr lang="en-US" sz="2900" dirty="0" err="1">
-                <a:latin typeface="Consolas"/>
-                <a:cs typeface="Consolas"/>
-              </a:rPr>
-              <a:t>do_something</a:t>
-            </a:r>
-            <a:r>
-              <a:rPr lang="en-US" sz="2900" dirty="0">
-                <a:latin typeface="Consolas"/>
-                <a:cs typeface="Consolas"/>
-              </a:rPr>
-              <a:t> -in {} -out {}.new \</a:t>
-            </a:r>
-          </a:p>
-          <a:p>
-            <a:pPr marL="0" indent="0">
-              <a:buNone/>
-            </a:pPr>
-            <a:r>
-              <a:rPr lang="en-US" sz="2900" dirty="0">
-                <a:latin typeface="Consolas"/>
-                <a:cs typeface="Consolas"/>
-              </a:rPr>
-              <a:t> </a:t>
-            </a:r>
-            <a:r>
-              <a:rPr lang="en-US" sz="2900" dirty="0">
-                <a:latin typeface="Consolas"/>
-                <a:cs typeface="Consolas"/>
-              </a:rPr>
-              <a:t> ::: *.</a:t>
-            </a:r>
-            <a:r>
-              <a:rPr lang="en-US" sz="2900" dirty="0" err="1">
-                <a:latin typeface="Consolas"/>
-                <a:cs typeface="Consolas"/>
-              </a:rPr>
-              <a:t>fasta</a:t>
-            </a:r>
-            <a:endParaRPr lang="en-US" sz="2900" dirty="0">
+              <a:solidFill>
+                <a:srgbClr val="77933C"/>
+              </a:solidFill>
               <a:latin typeface="Consolas"/>
               <a:cs typeface="Consolas"/>
             </a:endParaRPr>

</xml_diff>

<commit_message>
Export slides and notes as PDF
Remove slides-only PDF as it's pretty useless without notes.
</commit_message>
<xml_diff>
--- a/CBG-2014-05-21.pptx
+++ b/CBG-2014-05-21.pptx
@@ -2655,12 +2655,8 @@
               <a:t>Let’s talk about some </a:t>
             </a:r>
             <a:r>
-              <a:rPr lang="en-US" baseline="0" dirty="0" err="1" smtClean="0"/>
-              <a:t>gotchas</a:t>
-            </a:r>
-            <a:r>
               <a:rPr lang="en-US" baseline="0" dirty="0" smtClean="0"/>
-              <a:t> when using </a:t>
+              <a:t>gotchas when using </a:t>
             </a:r>
             <a:r>
               <a:rPr lang="en-US" baseline="0" dirty="0" err="1" smtClean="0"/>
@@ -2668,17 +2664,19 @@
             </a:r>
             <a:r>
               <a:rPr lang="en-US" baseline="0" dirty="0" smtClean="0"/>
-              <a:t>.</a:t>
-            </a:r>
-            <a:endParaRPr lang="en-US" dirty="0" smtClean="0"/>
-          </a:p>
-          <a:p>
-            <a:endParaRPr lang="en-US" dirty="0" smtClean="0"/>
-          </a:p>
-          <a:p>
+              <a:t>.  The </a:t>
+            </a:r>
             <a:r>
               <a:rPr lang="en-US" baseline="0" dirty="0" smtClean="0"/>
-              <a:t>The most common by far is that the action part of a recipe must use hard tabs for the first indent, not spaces.  This is often a source of problems.  All editors should have a way of highlighting hard tabs vs. spaces.</a:t>
+              <a:t>most common by far is that the action part of a recipe must use hard tabs for the first indent, not spaces.  This is often a source of problems.  </a:t>
+            </a:r>
+            <a:r>
+              <a:rPr lang="en-US" baseline="0" dirty="0" smtClean="0"/>
+              <a:t>However, all </a:t>
+            </a:r>
+            <a:r>
+              <a:rPr lang="en-US" baseline="0" dirty="0" smtClean="0"/>
+              <a:t>editors should have a way of highlighting hard tabs vs. spaces.</a:t>
             </a:r>
           </a:p>
           <a:p>
@@ -2740,16 +2738,23 @@
             </a:r>
             <a:r>
               <a:rPr lang="en-US" baseline="0" dirty="0" smtClean="0"/>
-              <a:t> last command in a pipeline is considered for errors, even if a command in the middle fails partway through the data.  You can change this by using the first two lines here which change the command shell make uses to run your recipes and sets an option for the shell.</a:t>
-            </a:r>
-          </a:p>
-          <a:p>
-            <a:endParaRPr lang="en-US" baseline="0" dirty="0" smtClean="0"/>
-          </a:p>
-          <a:p>
+              <a:t> last command in a pipeline is considered for errors, even if a command in the middle fails partway through the data.  You can change this by using the first two lines here which change the command shell make uses to run your recipes and sets an option for the </a:t>
+            </a:r>
             <a:r>
               <a:rPr lang="en-US" baseline="0" dirty="0" smtClean="0"/>
-              <a:t>When make does catch an error, it leaves any partially made target files around.  This can be confusing at first if you don’t notice there was an error.  You can include the special empty target “.DELETE_ON_ERROR:” to force make to delete any partially-complete target files if the recipe fails.  This avoids manually running other recipes later which may use the partial data left around.</a:t>
+              <a:t>shell.  When </a:t>
+            </a:r>
+            <a:r>
+              <a:rPr lang="en-US" baseline="0" dirty="0" smtClean="0"/>
+              <a:t>make </a:t>
+            </a:r>
+            <a:r>
+              <a:rPr lang="en-US" i="1" baseline="0" dirty="0" smtClean="0"/>
+              <a:t>does</a:t>
+            </a:r>
+            <a:r>
+              <a:rPr lang="en-US" baseline="0" dirty="0" smtClean="0"/>
+              <a:t> catch an error, it leaves any partially made target files around.  This can be confusing at first if you don’t notice there was an error.  You can include the special empty target “.DELETE_ON_ERROR:” to force make to delete any partially-complete target files if the recipe fails.  This avoids manually running other recipes later which may use the partial data left around.</a:t>
             </a:r>
           </a:p>
           <a:p>

</xml_diff>